<commit_message>
Slide 18 updated for accuracy regarding 3.4 release date.
</commit_message>
<xml_diff>
--- a/MUG Download/MUG Download #7-1 - 3.4 Bug Hunt.pptx
+++ b/MUG Download/MUG Download #7-1 - 3.4 Bug Hunt.pptx
@@ -1,35 +1,35 @@
 
 <file path=ppt/presentation.xml><?xml version="1.0" encoding="utf-8"?>
-<p:presentation xmlns:a="http://schemas.openxmlformats.org/drawingml/2006/main" xmlns:r="http://schemas.openxmlformats.org/officeDocument/2006/relationships" xmlns:p="http://schemas.openxmlformats.org/presentationml/2006/main">
+<p:presentation xmlns:a="http://schemas.openxmlformats.org/drawingml/2006/main" xmlns:r="http://schemas.openxmlformats.org/officeDocument/2006/relationships" xmlns:p="http://schemas.openxmlformats.org/presentationml/2006/main" saveSubsetFonts="1">
   <p:sldMasterIdLst>
-    <p:sldMasterId id="2147483648" r:id="rId5"/>
+    <p:sldMasterId id="2147483648" r:id="rId1"/>
   </p:sldMasterIdLst>
   <p:notesMasterIdLst>
-    <p:notesMasterId r:id="rId7"/>
+    <p:notesMasterId r:id="rId24"/>
   </p:notesMasterIdLst>
   <p:sldIdLst>
-    <p:sldId id="256" r:id="rId8"/>
-    <p:sldId id="257" r:id="rId9"/>
-    <p:sldId id="258" r:id="rId10"/>
-    <p:sldId id="259" r:id="rId11"/>
-    <p:sldId id="260" r:id="rId12"/>
-    <p:sldId id="261" r:id="rId13"/>
-    <p:sldId id="262" r:id="rId14"/>
-    <p:sldId id="263" r:id="rId15"/>
-    <p:sldId id="264" r:id="rId16"/>
-    <p:sldId id="265" r:id="rId17"/>
-    <p:sldId id="266" r:id="rId18"/>
-    <p:sldId id="267" r:id="rId19"/>
-    <p:sldId id="268" r:id="rId20"/>
-    <p:sldId id="269" r:id="rId21"/>
-    <p:sldId id="270" r:id="rId22"/>
-    <p:sldId id="271" r:id="rId23"/>
-    <p:sldId id="272" r:id="rId24"/>
-    <p:sldId id="273" r:id="rId25"/>
-    <p:sldId id="274" r:id="rId26"/>
-    <p:sldId id="275" r:id="rId27"/>
-    <p:sldId id="276" r:id="rId28"/>
-    <p:sldId id="277" r:id="rId29"/>
+    <p:sldId id="256" r:id="rId2"/>
+    <p:sldId id="257" r:id="rId3"/>
+    <p:sldId id="258" r:id="rId4"/>
+    <p:sldId id="259" r:id="rId5"/>
+    <p:sldId id="260" r:id="rId6"/>
+    <p:sldId id="261" r:id="rId7"/>
+    <p:sldId id="262" r:id="rId8"/>
+    <p:sldId id="263" r:id="rId9"/>
+    <p:sldId id="264" r:id="rId10"/>
+    <p:sldId id="265" r:id="rId11"/>
+    <p:sldId id="266" r:id="rId12"/>
+    <p:sldId id="267" r:id="rId13"/>
+    <p:sldId id="268" r:id="rId14"/>
+    <p:sldId id="269" r:id="rId15"/>
+    <p:sldId id="270" r:id="rId16"/>
+    <p:sldId id="271" r:id="rId17"/>
+    <p:sldId id="272" r:id="rId18"/>
+    <p:sldId id="273" r:id="rId19"/>
+    <p:sldId id="274" r:id="rId20"/>
+    <p:sldId id="275" r:id="rId21"/>
+    <p:sldId id="276" r:id="rId22"/>
+    <p:sldId id="277" r:id="rId23"/>
   </p:sldIdLst>
   <p:sldSz cx="13004800" cy="9753600"/>
   <p:notesSz cx="6858000" cy="9144000"/>
@@ -49,7 +49,7 @@
       <a:buFontTx/>
       <a:buNone/>
       <a:tabLst/>
-      <a:defRPr b="0" baseline="0" cap="none" i="0" spc="0" strike="noStrike" sz="1800" u="none" kumimoji="0" normalizeH="0">
+      <a:defRPr kumimoji="0" sz="1800" b="0" i="0" u="none" strike="noStrike" cap="none" spc="0" normalizeH="0" baseline="0">
         <a:ln>
           <a:noFill/>
         </a:ln>
@@ -75,7 +75,7 @@
       <a:buFontTx/>
       <a:buNone/>
       <a:tabLst/>
-      <a:defRPr b="0" baseline="0" cap="none" i="0" spc="0" strike="noStrike" sz="2000" u="none" kumimoji="0" normalizeH="0">
+      <a:defRPr kumimoji="0" sz="2000" b="0" i="0" u="none" strike="noStrike" cap="none" spc="0" normalizeH="0" baseline="0">
         <a:ln>
           <a:noFill/>
         </a:ln>
@@ -105,7 +105,7 @@
       <a:buFontTx/>
       <a:buNone/>
       <a:tabLst/>
-      <a:defRPr b="0" baseline="0" cap="none" i="0" spc="0" strike="noStrike" sz="2000" u="none" kumimoji="0" normalizeH="0">
+      <a:defRPr kumimoji="0" sz="2000" b="0" i="0" u="none" strike="noStrike" cap="none" spc="0" normalizeH="0" baseline="0">
         <a:ln>
           <a:noFill/>
         </a:ln>
@@ -135,7 +135,7 @@
       <a:buFontTx/>
       <a:buNone/>
       <a:tabLst/>
-      <a:defRPr b="0" baseline="0" cap="none" i="0" spc="0" strike="noStrike" sz="2000" u="none" kumimoji="0" normalizeH="0">
+      <a:defRPr kumimoji="0" sz="2000" b="0" i="0" u="none" strike="noStrike" cap="none" spc="0" normalizeH="0" baseline="0">
         <a:ln>
           <a:noFill/>
         </a:ln>
@@ -165,7 +165,7 @@
       <a:buFontTx/>
       <a:buNone/>
       <a:tabLst/>
-      <a:defRPr b="0" baseline="0" cap="none" i="0" spc="0" strike="noStrike" sz="2000" u="none" kumimoji="0" normalizeH="0">
+      <a:defRPr kumimoji="0" sz="2000" b="0" i="0" u="none" strike="noStrike" cap="none" spc="0" normalizeH="0" baseline="0">
         <a:ln>
           <a:noFill/>
         </a:ln>
@@ -195,7 +195,7 @@
       <a:buFontTx/>
       <a:buNone/>
       <a:tabLst/>
-      <a:defRPr b="0" baseline="0" cap="none" i="0" spc="0" strike="noStrike" sz="2000" u="none" kumimoji="0" normalizeH="0">
+      <a:defRPr kumimoji="0" sz="2000" b="0" i="0" u="none" strike="noStrike" cap="none" spc="0" normalizeH="0" baseline="0">
         <a:ln>
           <a:noFill/>
         </a:ln>
@@ -225,7 +225,7 @@
       <a:buFontTx/>
       <a:buNone/>
       <a:tabLst/>
-      <a:defRPr b="0" baseline="0" cap="none" i="0" spc="0" strike="noStrike" sz="2000" u="none" kumimoji="0" normalizeH="0">
+      <a:defRPr kumimoji="0" sz="2000" b="0" i="0" u="none" strike="noStrike" cap="none" spc="0" normalizeH="0" baseline="0">
         <a:ln>
           <a:noFill/>
         </a:ln>
@@ -255,7 +255,7 @@
       <a:buFontTx/>
       <a:buNone/>
       <a:tabLst/>
-      <a:defRPr b="0" baseline="0" cap="none" i="0" spc="0" strike="noStrike" sz="2000" u="none" kumimoji="0" normalizeH="0">
+      <a:defRPr kumimoji="0" sz="2000" b="0" i="0" u="none" strike="noStrike" cap="none" spc="0" normalizeH="0" baseline="0">
         <a:ln>
           <a:noFill/>
         </a:ln>
@@ -285,7 +285,7 @@
       <a:buFontTx/>
       <a:buNone/>
       <a:tabLst/>
-      <a:defRPr b="0" baseline="0" cap="none" i="0" spc="0" strike="noStrike" sz="2000" u="none" kumimoji="0" normalizeH="0">
+      <a:defRPr kumimoji="0" sz="2000" b="0" i="0" u="none" strike="noStrike" cap="none" spc="0" normalizeH="0" baseline="0">
         <a:ln>
           <a:noFill/>
         </a:ln>
@@ -315,7 +315,7 @@
       <a:buFontTx/>
       <a:buNone/>
       <a:tabLst/>
-      <a:defRPr b="0" baseline="0" cap="none" i="0" spc="0" strike="noStrike" sz="2000" u="none" kumimoji="0" normalizeH="0">
+      <a:defRPr kumimoji="0" sz="2000" b="0" i="0" u="none" strike="noStrike" cap="none" spc="0" normalizeH="0" baseline="0">
         <a:ln>
           <a:noFill/>
         </a:ln>
@@ -334,13 +334,14 @@
 </p:presentation>
 </file>
 
-<file path=ppt/commentAuthors.xml><?xml version="1.0" encoding="utf-8"?>
-<p:cmAuthorLst xmlns:a="http://schemas.openxmlformats.org/drawingml/2006/main" xmlns:r="http://schemas.openxmlformats.org/officeDocument/2006/relationships" xmlns:p="http://schemas.openxmlformats.org/presentationml/2006/main"/>
-</file>
-
 <file path=ppt/notesMasters/notesMaster1.xml><?xml version="1.0" encoding="utf-8"?>
 <p:notesMaster xmlns:a="http://schemas.openxmlformats.org/drawingml/2006/main" xmlns:r="http://schemas.openxmlformats.org/officeDocument/2006/relationships" xmlns:p="http://schemas.openxmlformats.org/presentationml/2006/main">
   <p:cSld>
+    <p:bg>
+      <p:bgRef idx="1001">
+        <a:schemeClr val="bg1"/>
+      </p:bgRef>
+    </p:bg>
     <p:spTree>
       <p:nvGrpSpPr>
         <p:cNvPr id="1" name=""/>
@@ -358,7 +359,9 @@
       <p:sp>
         <p:nvSpPr>
           <p:cNvPr id="163" name="Shape 163"/>
-          <p:cNvSpPr/>
+          <p:cNvSpPr>
+            <a:spLocks noGrp="1" noRot="1" noChangeAspect="1"/>
+          </p:cNvSpPr>
           <p:nvPr>
             <p:ph type="sldImg"/>
           </p:nvPr>
@@ -376,14 +379,16 @@
           <a:bodyPr/>
           <a:lstStyle/>
           <a:p>
-            <a:pPr/>
+            <a:endParaRPr/>
           </a:p>
         </p:txBody>
       </p:sp>
       <p:sp>
         <p:nvSpPr>
           <p:cNvPr id="164" name="Shape 164"/>
-          <p:cNvSpPr/>
+          <p:cNvSpPr>
+            <a:spLocks noGrp="1"/>
+          </p:cNvSpPr>
           <p:nvPr>
             <p:ph type="body" sz="quarter" idx="1"/>
           </p:nvPr>
@@ -401,11 +406,16 @@
           <a:bodyPr/>
           <a:lstStyle/>
           <a:p>
-            <a:pPr/>
+            <a:endParaRPr/>
           </a:p>
         </p:txBody>
       </p:sp>
     </p:spTree>
+    <p:extLst>
+      <p:ext uri="{BB962C8B-B14F-4D97-AF65-F5344CB8AC3E}">
+        <p14:creationId xmlns:p14="http://schemas.microsoft.com/office/powerpoint/2010/main" val="1766654714"/>
+      </p:ext>
+    </p:extLst>
   </p:cSld>
   <p:clrMap bg1="lt1" tx1="dk1" bg2="lt2" tx2="dk2" accent1="accent1" accent2="accent2" accent3="accent3" accent4="accent4" accent5="accent5" accent6="accent6" hlink="hlink" folHlink="folHlink"/>
   <p:notesStyle>
@@ -513,13 +523,14 @@
 </file>
 
 <file path=ppt/slideLayouts/slideLayout1.xml><?xml version="1.0" encoding="utf-8"?>
-<p:sldLayout xmlns:a="http://schemas.openxmlformats.org/drawingml/2006/main" xmlns:r="http://schemas.openxmlformats.org/officeDocument/2006/relationships" xmlns:p="http://schemas.openxmlformats.org/presentationml/2006/main" type="title" showMasterSp="0" showMasterPhAnim="1">
+<p:sldLayout xmlns:a="http://schemas.openxmlformats.org/drawingml/2006/main" xmlns:r="http://schemas.openxmlformats.org/officeDocument/2006/relationships" xmlns:p="http://schemas.openxmlformats.org/presentationml/2006/main" showMasterSp="0" type="title">
   <p:cSld name="Title &amp; Subtitle">
     <p:bg>
       <p:bgPr>
         <a:solidFill>
           <a:srgbClr val="222222"/>
         </a:solidFill>
+        <a:effectLst/>
       </p:bgPr>
     </p:bg>
     <p:spTree>
@@ -575,13 +586,16 @@
                 <a:sym typeface="Helvetica"/>
               </a:defRPr>
             </a:pPr>
+            <a:endParaRPr/>
           </a:p>
         </p:txBody>
       </p:sp>
       <p:sp>
         <p:nvSpPr>
           <p:cNvPr id="13" name="Shape 13"/>
-          <p:cNvSpPr/>
+          <p:cNvSpPr>
+            <a:spLocks noGrp="1"/>
+          </p:cNvSpPr>
           <p:nvPr>
             <p:ph type="title"/>
           </p:nvPr>
@@ -606,7 +620,6 @@
             </a:lvl1pPr>
           </a:lstStyle>
           <a:p>
-            <a:pPr/>
             <a:r>
               <a:t>Title Text</a:t>
             </a:r>
@@ -616,7 +629,9 @@
       <p:sp>
         <p:nvSpPr>
           <p:cNvPr id="14" name="Shape 14"/>
-          <p:cNvSpPr/>
+          <p:cNvSpPr>
+            <a:spLocks noGrp="1"/>
+          </p:cNvSpPr>
           <p:nvPr>
             <p:ph type="body" sz="quarter" idx="1"/>
           </p:nvPr>
@@ -644,7 +659,7 @@
               <a:buSzTx/>
               <a:buFontTx/>
               <a:buNone/>
-              <a:defRPr cap="all" sz="5400">
+              <a:defRPr sz="5400" cap="all">
                 <a:solidFill>
                   <a:srgbClr val="A6AAA9"/>
                 </a:solidFill>
@@ -665,7 +680,7 @@
               <a:buSzTx/>
               <a:buFontTx/>
               <a:buNone/>
-              <a:defRPr cap="all" sz="5400">
+              <a:defRPr sz="5400" cap="all">
                 <a:solidFill>
                   <a:srgbClr val="A6AAA9"/>
                 </a:solidFill>
@@ -686,7 +701,7 @@
               <a:buSzTx/>
               <a:buFontTx/>
               <a:buNone/>
-              <a:defRPr cap="all" sz="5400">
+              <a:defRPr sz="5400" cap="all">
                 <a:solidFill>
                   <a:srgbClr val="A6AAA9"/>
                 </a:solidFill>
@@ -707,7 +722,7 @@
               <a:buSzTx/>
               <a:buFontTx/>
               <a:buNone/>
-              <a:defRPr cap="all" sz="5400">
+              <a:defRPr sz="5400" cap="all">
                 <a:solidFill>
                   <a:srgbClr val="A6AAA9"/>
                 </a:solidFill>
@@ -728,7 +743,7 @@
               <a:buSzTx/>
               <a:buFontTx/>
               <a:buNone/>
-              <a:defRPr cap="all" sz="5400">
+              <a:defRPr sz="5400" cap="all">
                 <a:solidFill>
                   <a:srgbClr val="A6AAA9"/>
                 </a:solidFill>
@@ -740,7 +755,6 @@
             </a:lvl5pPr>
           </a:lstStyle>
           <a:p>
-            <a:pPr/>
             <a:r>
               <a:t>Body Level One</a:t>
             </a:r>
@@ -774,7 +788,9 @@
       <p:sp>
         <p:nvSpPr>
           <p:cNvPr id="15" name="Shape 15"/>
-          <p:cNvSpPr/>
+          <p:cNvSpPr>
+            <a:spLocks noGrp="1"/>
+          </p:cNvSpPr>
           <p:nvPr>
             <p:ph type="sldNum" sz="quarter" idx="2"/>
           </p:nvPr>
@@ -792,8 +808,10 @@
           <a:bodyPr/>
           <a:lstStyle/>
           <a:p>
-            <a:pPr/>
-            <a:fld id="{86CB4B4D-7CA3-9044-876B-883B54F8677D}" type="slidenum"/>
+            <a:fld id="{86CB4B4D-7CA3-9044-876B-883B54F8677D}" type="slidenum">
+              <a:t>‹#›</a:t>
+            </a:fld>
+            <a:endParaRPr/>
           </a:p>
         </p:txBody>
       </p:sp>
@@ -802,18 +820,19 @@
   <p:clrMapOvr>
     <a:masterClrMapping/>
   </p:clrMapOvr>
-  <p:transition xmlns:p14="http://schemas.microsoft.com/office/powerpoint/2010/main" spd="med" advClick="1"/>
+  <p:transition spd="med"/>
 </p:sldLayout>
 </file>
 
 <file path=ppt/slideLayouts/slideLayout10.xml><?xml version="1.0" encoding="utf-8"?>
-<p:sldLayout xmlns:a="http://schemas.openxmlformats.org/drawingml/2006/main" xmlns:r="http://schemas.openxmlformats.org/officeDocument/2006/relationships" xmlns:p="http://schemas.openxmlformats.org/presentationml/2006/main" type="tx" showMasterSp="1" showMasterPhAnim="1">
+<p:sldLayout xmlns:a="http://schemas.openxmlformats.org/drawingml/2006/main" xmlns:r="http://schemas.openxmlformats.org/officeDocument/2006/relationships" xmlns:p="http://schemas.openxmlformats.org/presentationml/2006/main" type="tx">
   <p:cSld name="Bullets">
     <p:bg>
       <p:bgPr>
         <a:solidFill>
           <a:srgbClr val="222222"/>
         </a:solidFill>
+        <a:effectLst/>
       </p:bgPr>
     </p:bg>
     <p:spTree>
@@ -833,7 +852,9 @@
       <p:sp>
         <p:nvSpPr>
           <p:cNvPr id="102" name="Shape 102"/>
-          <p:cNvSpPr/>
+          <p:cNvSpPr>
+            <a:spLocks noGrp="1"/>
+          </p:cNvSpPr>
           <p:nvPr>
             <p:ph type="body" sz="quarter" idx="13"/>
           </p:nvPr>
@@ -863,7 +884,7 @@
               <a:buSzTx/>
               <a:buFontTx/>
               <a:buNone/>
-              <a:defRPr cap="all" spc="120" sz="2400">
+              <a:defRPr sz="2400" cap="all" spc="120">
                 <a:latin typeface="DIN Alternate"/>
                 <a:ea typeface="DIN Alternate"/>
                 <a:cs typeface="DIN Alternate"/>
@@ -872,7 +893,6 @@
             </a:lvl1pPr>
           </a:lstStyle>
           <a:p>
-            <a:pPr/>
             <a:r>
               <a:t>Text</a:t>
             </a:r>
@@ -882,7 +902,9 @@
       <p:sp>
         <p:nvSpPr>
           <p:cNvPr id="103" name="Shape 103"/>
-          <p:cNvSpPr/>
+          <p:cNvSpPr>
+            <a:spLocks noGrp="1"/>
+          </p:cNvSpPr>
           <p:nvPr>
             <p:ph type="body" idx="1"/>
           </p:nvPr>
@@ -927,7 +949,6 @@
             </a:lvl5pPr>
           </a:lstStyle>
           <a:p>
-            <a:pPr/>
             <a:r>
               <a:t>Body Level One</a:t>
             </a:r>
@@ -961,7 +982,9 @@
       <p:sp>
         <p:nvSpPr>
           <p:cNvPr id="104" name="Shape 104"/>
-          <p:cNvSpPr/>
+          <p:cNvSpPr>
+            <a:spLocks noGrp="1"/>
+          </p:cNvSpPr>
           <p:nvPr>
             <p:ph type="sldNum" sz="quarter" idx="2"/>
           </p:nvPr>
@@ -975,8 +998,10 @@
           <a:bodyPr/>
           <a:lstStyle/>
           <a:p>
-            <a:pPr/>
-            <a:fld id="{86CB4B4D-7CA3-9044-876B-883B54F8677D}" type="slidenum"/>
+            <a:fld id="{86CB4B4D-7CA3-9044-876B-883B54F8677D}" type="slidenum">
+              <a:t>‹#›</a:t>
+            </a:fld>
+            <a:endParaRPr/>
           </a:p>
         </p:txBody>
       </p:sp>
@@ -985,18 +1010,19 @@
   <p:clrMapOvr>
     <a:masterClrMapping/>
   </p:clrMapOvr>
-  <p:transition xmlns:p14="http://schemas.microsoft.com/office/powerpoint/2010/main" spd="med" advClick="1"/>
+  <p:transition spd="med"/>
 </p:sldLayout>
 </file>
 
 <file path=ppt/slideLayouts/slideLayout11.xml><?xml version="1.0" encoding="utf-8"?>
-<p:sldLayout xmlns:a="http://schemas.openxmlformats.org/drawingml/2006/main" xmlns:r="http://schemas.openxmlformats.org/officeDocument/2006/relationships" xmlns:p="http://schemas.openxmlformats.org/presentationml/2006/main" type="tx" showMasterSp="0" showMasterPhAnim="1">
+<p:sldLayout xmlns:a="http://schemas.openxmlformats.org/drawingml/2006/main" xmlns:r="http://schemas.openxmlformats.org/officeDocument/2006/relationships" xmlns:p="http://schemas.openxmlformats.org/presentationml/2006/main" showMasterSp="0" type="tx">
   <p:cSld name="Photo - 3 Up">
     <p:bg>
       <p:bgPr>
         <a:solidFill>
           <a:srgbClr val="222222"/>
         </a:solidFill>
+        <a:effectLst/>
       </p:bgPr>
     </p:bg>
     <p:spTree>
@@ -1016,7 +1042,9 @@
       <p:sp>
         <p:nvSpPr>
           <p:cNvPr id="111" name="Shape 111"/>
-          <p:cNvSpPr/>
+          <p:cNvSpPr>
+            <a:spLocks noGrp="1"/>
+          </p:cNvSpPr>
           <p:nvPr>
             <p:ph type="pic" sz="half" idx="13"/>
           </p:nvPr>
@@ -1036,14 +1064,16 @@
           </a:bodyPr>
           <a:lstStyle/>
           <a:p>
-            <a:pPr/>
+            <a:endParaRPr/>
           </a:p>
         </p:txBody>
       </p:sp>
       <p:sp>
         <p:nvSpPr>
           <p:cNvPr id="112" name="Shape 112"/>
-          <p:cNvSpPr/>
+          <p:cNvSpPr>
+            <a:spLocks noGrp="1"/>
+          </p:cNvSpPr>
           <p:nvPr>
             <p:ph type="pic" sz="half" idx="14"/>
           </p:nvPr>
@@ -1063,14 +1093,16 @@
           </a:bodyPr>
           <a:lstStyle/>
           <a:p>
-            <a:pPr/>
+            <a:endParaRPr/>
           </a:p>
         </p:txBody>
       </p:sp>
       <p:sp>
         <p:nvSpPr>
           <p:cNvPr id="113" name="Shape 113"/>
-          <p:cNvSpPr/>
+          <p:cNvSpPr>
+            <a:spLocks noGrp="1"/>
+          </p:cNvSpPr>
           <p:nvPr>
             <p:ph type="pic" idx="15"/>
           </p:nvPr>
@@ -1090,14 +1122,16 @@
           </a:bodyPr>
           <a:lstStyle/>
           <a:p>
-            <a:pPr/>
+            <a:endParaRPr/>
           </a:p>
         </p:txBody>
       </p:sp>
       <p:sp>
         <p:nvSpPr>
           <p:cNvPr id="114" name="Shape 114"/>
-          <p:cNvSpPr/>
+          <p:cNvSpPr>
+            <a:spLocks noGrp="1"/>
+          </p:cNvSpPr>
           <p:nvPr>
             <p:ph type="sldNum" sz="quarter" idx="2"/>
           </p:nvPr>
@@ -1111,8 +1145,10 @@
           <a:bodyPr/>
           <a:lstStyle/>
           <a:p>
-            <a:pPr/>
-            <a:fld id="{86CB4B4D-7CA3-9044-876B-883B54F8677D}" type="slidenum"/>
+            <a:fld id="{86CB4B4D-7CA3-9044-876B-883B54F8677D}" type="slidenum">
+              <a:t>‹#›</a:t>
+            </a:fld>
+            <a:endParaRPr/>
           </a:p>
         </p:txBody>
       </p:sp>
@@ -1121,18 +1157,19 @@
   <p:clrMapOvr>
     <a:masterClrMapping/>
   </p:clrMapOvr>
-  <p:transition xmlns:p14="http://schemas.microsoft.com/office/powerpoint/2010/main" spd="med" advClick="1"/>
+  <p:transition spd="med"/>
 </p:sldLayout>
 </file>
 
 <file path=ppt/slideLayouts/slideLayout12.xml><?xml version="1.0" encoding="utf-8"?>
-<p:sldLayout xmlns:a="http://schemas.openxmlformats.org/drawingml/2006/main" xmlns:r="http://schemas.openxmlformats.org/officeDocument/2006/relationships" xmlns:p="http://schemas.openxmlformats.org/presentationml/2006/main" type="tx" showMasterSp="1" showMasterPhAnim="1">
+<p:sldLayout xmlns:a="http://schemas.openxmlformats.org/drawingml/2006/main" xmlns:r="http://schemas.openxmlformats.org/officeDocument/2006/relationships" xmlns:p="http://schemas.openxmlformats.org/presentationml/2006/main" type="tx">
   <p:cSld name="Quote">
     <p:bg>
       <p:bgPr>
         <a:solidFill>
           <a:srgbClr val="222222"/>
         </a:solidFill>
+        <a:effectLst/>
       </p:bgPr>
     </p:bg>
     <p:spTree>
@@ -1180,7 +1217,7 @@
             </a:cxnLst>
             <a:rect l="0" t="0" r="r" b="b"/>
             <a:pathLst>
-              <a:path w="21600" h="21600" fill="norm" stroke="1" extrusionOk="0">
+              <a:path w="21600" h="21600" extrusionOk="0">
                 <a:moveTo>
                   <a:pt x="224" y="0"/>
                 </a:moveTo>
@@ -1247,7 +1284,7 @@
               <a:spcBef>
                 <a:spcPts val="0"/>
               </a:spcBef>
-              <a:defRPr cap="all" sz="2800">
+              <a:defRPr sz="2800" cap="all">
                 <a:solidFill>
                   <a:srgbClr val="FFFFFF"/>
                 </a:solidFill>
@@ -1257,13 +1294,16 @@
                 <a:sym typeface="DIN Condensed"/>
               </a:defRPr>
             </a:pPr>
+            <a:endParaRPr/>
           </a:p>
         </p:txBody>
       </p:sp>
       <p:sp>
         <p:nvSpPr>
           <p:cNvPr id="122" name="Shape 122"/>
-          <p:cNvSpPr/>
+          <p:cNvSpPr>
+            <a:spLocks noGrp="1"/>
+          </p:cNvSpPr>
           <p:nvPr>
             <p:ph type="body" sz="quarter" idx="13"/>
           </p:nvPr>
@@ -1293,7 +1333,7 @@
               <a:buSzTx/>
               <a:buFontTx/>
               <a:buNone/>
-              <a:defRPr cap="all" sz="9400">
+              <a:defRPr sz="9400" cap="all">
                 <a:solidFill>
                   <a:srgbClr val="FFFFFF"/>
                 </a:solidFill>
@@ -1305,7 +1345,6 @@
             </a:lvl1pPr>
           </a:lstStyle>
           <a:p>
-            <a:pPr/>
             <a:r>
               <a:t>Type a quote here.</a:t>
             </a:r>
@@ -1315,7 +1354,9 @@
       <p:sp>
         <p:nvSpPr>
           <p:cNvPr id="123" name="Shape 123"/>
-          <p:cNvSpPr/>
+          <p:cNvSpPr>
+            <a:spLocks noGrp="1"/>
+          </p:cNvSpPr>
           <p:nvPr>
             <p:ph type="body" sz="quarter" idx="14"/>
           </p:nvPr>
@@ -1354,7 +1395,6 @@
             </a:lvl1pPr>
           </a:lstStyle>
           <a:p>
-            <a:pPr/>
             <a:r>
               <a:t>Johnny Appleseed</a:t>
             </a:r>
@@ -1364,7 +1404,9 @@
       <p:sp>
         <p:nvSpPr>
           <p:cNvPr id="124" name="Shape 124"/>
-          <p:cNvSpPr/>
+          <p:cNvSpPr>
+            <a:spLocks noGrp="1"/>
+          </p:cNvSpPr>
           <p:nvPr>
             <p:ph type="body" sz="quarter" idx="15"/>
           </p:nvPr>
@@ -1394,7 +1436,7 @@
               <a:buSzTx/>
               <a:buFontTx/>
               <a:buNone/>
-              <a:defRPr cap="all" spc="120" sz="2400">
+              <a:defRPr sz="2400" cap="all" spc="120">
                 <a:latin typeface="DIN Alternate"/>
                 <a:ea typeface="DIN Alternate"/>
                 <a:cs typeface="DIN Alternate"/>
@@ -1403,7 +1445,6 @@
             </a:lvl1pPr>
           </a:lstStyle>
           <a:p>
-            <a:pPr/>
             <a:r>
               <a:t>Text</a:t>
             </a:r>
@@ -1413,7 +1454,9 @@
       <p:sp>
         <p:nvSpPr>
           <p:cNvPr id="125" name="Shape 125"/>
-          <p:cNvSpPr/>
+          <p:cNvSpPr>
+            <a:spLocks noGrp="1"/>
+          </p:cNvSpPr>
           <p:nvPr>
             <p:ph type="sldNum" sz="quarter" idx="2"/>
           </p:nvPr>
@@ -1427,8 +1470,10 @@
           <a:bodyPr/>
           <a:lstStyle/>
           <a:p>
-            <a:pPr/>
-            <a:fld id="{86CB4B4D-7CA3-9044-876B-883B54F8677D}" type="slidenum"/>
+            <a:fld id="{86CB4B4D-7CA3-9044-876B-883B54F8677D}" type="slidenum">
+              <a:t>‹#›</a:t>
+            </a:fld>
+            <a:endParaRPr/>
           </a:p>
         </p:txBody>
       </p:sp>
@@ -1437,18 +1482,19 @@
   <p:clrMapOvr>
     <a:masterClrMapping/>
   </p:clrMapOvr>
-  <p:transition xmlns:p14="http://schemas.microsoft.com/office/powerpoint/2010/main" spd="med" advClick="1"/>
+  <p:transition spd="med"/>
 </p:sldLayout>
 </file>
 
 <file path=ppt/slideLayouts/slideLayout13.xml><?xml version="1.0" encoding="utf-8"?>
-<p:sldLayout xmlns:a="http://schemas.openxmlformats.org/drawingml/2006/main" xmlns:r="http://schemas.openxmlformats.org/officeDocument/2006/relationships" xmlns:p="http://schemas.openxmlformats.org/presentationml/2006/main" type="tx" showMasterSp="0" showMasterPhAnim="1">
+<p:sldLayout xmlns:a="http://schemas.openxmlformats.org/drawingml/2006/main" xmlns:r="http://schemas.openxmlformats.org/officeDocument/2006/relationships" xmlns:p="http://schemas.openxmlformats.org/presentationml/2006/main" showMasterSp="0" type="tx">
   <p:cSld name="Quote Alt">
     <p:bg>
       <p:bgPr>
         <a:solidFill>
           <a:schemeClr val="accent1"/>
         </a:solidFill>
+        <a:effectLst/>
       </p:bgPr>
     </p:bg>
     <p:spTree>
@@ -1468,7 +1514,9 @@
       <p:sp>
         <p:nvSpPr>
           <p:cNvPr id="132" name="Shape 132"/>
-          <p:cNvSpPr/>
+          <p:cNvSpPr>
+            <a:spLocks noGrp="1"/>
+          </p:cNvSpPr>
           <p:nvPr>
             <p:ph type="body" sz="quarter" idx="13"/>
           </p:nvPr>
@@ -1498,7 +1546,7 @@
               <a:buSzTx/>
               <a:buFontTx/>
               <a:buNone/>
-              <a:defRPr cap="all" sz="9400">
+              <a:defRPr sz="9400" cap="all">
                 <a:solidFill>
                   <a:srgbClr val="FFFFFF"/>
                 </a:solidFill>
@@ -1510,7 +1558,6 @@
             </a:lvl1pPr>
           </a:lstStyle>
           <a:p>
-            <a:pPr/>
             <a:r>
               <a:t>Type a quote here.</a:t>
             </a:r>
@@ -1520,7 +1567,9 @@
       <p:sp>
         <p:nvSpPr>
           <p:cNvPr id="133" name="Shape 133"/>
-          <p:cNvSpPr/>
+          <p:cNvSpPr>
+            <a:spLocks noGrp="1"/>
+          </p:cNvSpPr>
           <p:nvPr>
             <p:ph type="pic" idx="14"/>
           </p:nvPr>
@@ -1540,14 +1589,16 @@
           </a:bodyPr>
           <a:lstStyle/>
           <a:p>
-            <a:pPr/>
+            <a:endParaRPr/>
           </a:p>
         </p:txBody>
       </p:sp>
       <p:sp>
         <p:nvSpPr>
           <p:cNvPr id="134" name="Shape 134"/>
-          <p:cNvSpPr/>
+          <p:cNvSpPr>
+            <a:spLocks noGrp="1"/>
+          </p:cNvSpPr>
           <p:nvPr>
             <p:ph type="body" sz="quarter" idx="15"/>
           </p:nvPr>
@@ -1586,7 +1637,6 @@
             </a:lvl1pPr>
           </a:lstStyle>
           <a:p>
-            <a:pPr/>
             <a:r>
               <a:t>Johnny Appleseed</a:t>
             </a:r>
@@ -1596,7 +1646,9 @@
       <p:sp>
         <p:nvSpPr>
           <p:cNvPr id="135" name="Shape 135"/>
-          <p:cNvSpPr/>
+          <p:cNvSpPr>
+            <a:spLocks noGrp="1"/>
+          </p:cNvSpPr>
           <p:nvPr>
             <p:ph type="sldNum" sz="quarter" idx="2"/>
           </p:nvPr>
@@ -1610,8 +1662,10 @@
           <a:bodyPr/>
           <a:lstStyle/>
           <a:p>
-            <a:pPr/>
-            <a:fld id="{86CB4B4D-7CA3-9044-876B-883B54F8677D}" type="slidenum"/>
+            <a:fld id="{86CB4B4D-7CA3-9044-876B-883B54F8677D}" type="slidenum">
+              <a:t>‹#›</a:t>
+            </a:fld>
+            <a:endParaRPr/>
           </a:p>
         </p:txBody>
       </p:sp>
@@ -1620,18 +1674,19 @@
   <p:clrMapOvr>
     <a:masterClrMapping/>
   </p:clrMapOvr>
-  <p:transition xmlns:p14="http://schemas.microsoft.com/office/powerpoint/2010/main" spd="med" advClick="1"/>
+  <p:transition spd="med"/>
 </p:sldLayout>
 </file>
 
 <file path=ppt/slideLayouts/slideLayout14.xml><?xml version="1.0" encoding="utf-8"?>
-<p:sldLayout xmlns:a="http://schemas.openxmlformats.org/drawingml/2006/main" xmlns:r="http://schemas.openxmlformats.org/officeDocument/2006/relationships" xmlns:p="http://schemas.openxmlformats.org/presentationml/2006/main" type="tx" showMasterSp="0" showMasterPhAnim="1">
+<p:sldLayout xmlns:a="http://schemas.openxmlformats.org/drawingml/2006/main" xmlns:r="http://schemas.openxmlformats.org/officeDocument/2006/relationships" xmlns:p="http://schemas.openxmlformats.org/presentationml/2006/main" showMasterSp="0" type="tx">
   <p:cSld name="Photo">
     <p:bg>
       <p:bgPr>
         <a:solidFill>
           <a:srgbClr val="222222"/>
         </a:solidFill>
+        <a:effectLst/>
       </p:bgPr>
     </p:bg>
     <p:spTree>
@@ -1651,7 +1706,9 @@
       <p:sp>
         <p:nvSpPr>
           <p:cNvPr id="142" name="Shape 142"/>
-          <p:cNvSpPr/>
+          <p:cNvSpPr>
+            <a:spLocks noGrp="1"/>
+          </p:cNvSpPr>
           <p:nvPr>
             <p:ph type="pic" idx="13"/>
           </p:nvPr>
@@ -1671,14 +1728,16 @@
           </a:bodyPr>
           <a:lstStyle/>
           <a:p>
-            <a:pPr/>
+            <a:endParaRPr/>
           </a:p>
         </p:txBody>
       </p:sp>
       <p:sp>
         <p:nvSpPr>
           <p:cNvPr id="143" name="Shape 143"/>
-          <p:cNvSpPr/>
+          <p:cNvSpPr>
+            <a:spLocks noGrp="1"/>
+          </p:cNvSpPr>
           <p:nvPr>
             <p:ph type="sldNum" sz="quarter" idx="2"/>
           </p:nvPr>
@@ -1692,8 +1751,10 @@
           <a:bodyPr/>
           <a:lstStyle/>
           <a:p>
-            <a:pPr/>
-            <a:fld id="{86CB4B4D-7CA3-9044-876B-883B54F8677D}" type="slidenum"/>
+            <a:fld id="{86CB4B4D-7CA3-9044-876B-883B54F8677D}" type="slidenum">
+              <a:t>‹#›</a:t>
+            </a:fld>
+            <a:endParaRPr/>
           </a:p>
         </p:txBody>
       </p:sp>
@@ -1702,18 +1763,19 @@
   <p:clrMapOvr>
     <a:masterClrMapping/>
   </p:clrMapOvr>
-  <p:transition xmlns:p14="http://schemas.microsoft.com/office/powerpoint/2010/main" spd="med" advClick="1"/>
+  <p:transition spd="med"/>
 </p:sldLayout>
 </file>
 
 <file path=ppt/slideLayouts/slideLayout15.xml><?xml version="1.0" encoding="utf-8"?>
-<p:sldLayout xmlns:a="http://schemas.openxmlformats.org/drawingml/2006/main" xmlns:r="http://schemas.openxmlformats.org/officeDocument/2006/relationships" xmlns:p="http://schemas.openxmlformats.org/presentationml/2006/main" type="tx" showMasterSp="0" showMasterPhAnim="1">
+<p:sldLayout xmlns:a="http://schemas.openxmlformats.org/drawingml/2006/main" xmlns:r="http://schemas.openxmlformats.org/officeDocument/2006/relationships" xmlns:p="http://schemas.openxmlformats.org/presentationml/2006/main" showMasterSp="0" type="tx">
   <p:cSld name="Blank">
     <p:bg>
       <p:bgPr>
         <a:solidFill>
           <a:srgbClr val="222222"/>
         </a:solidFill>
+        <a:effectLst/>
       </p:bgPr>
     </p:bg>
     <p:spTree>
@@ -1733,7 +1795,9 @@
       <p:sp>
         <p:nvSpPr>
           <p:cNvPr id="150" name="Shape 150"/>
-          <p:cNvSpPr/>
+          <p:cNvSpPr>
+            <a:spLocks noGrp="1"/>
+          </p:cNvSpPr>
           <p:nvPr>
             <p:ph type="sldNum" sz="quarter" idx="2"/>
           </p:nvPr>
@@ -1747,8 +1811,10 @@
           <a:bodyPr/>
           <a:lstStyle/>
           <a:p>
-            <a:pPr/>
-            <a:fld id="{86CB4B4D-7CA3-9044-876B-883B54F8677D}" type="slidenum"/>
+            <a:fld id="{86CB4B4D-7CA3-9044-876B-883B54F8677D}" type="slidenum">
+              <a:t>‹#›</a:t>
+            </a:fld>
+            <a:endParaRPr/>
           </a:p>
         </p:txBody>
       </p:sp>
@@ -1757,12 +1823,12 @@
   <p:clrMapOvr>
     <a:masterClrMapping/>
   </p:clrMapOvr>
-  <p:transition xmlns:p14="http://schemas.microsoft.com/office/powerpoint/2010/main" spd="med" advClick="1"/>
+  <p:transition spd="med"/>
 </p:sldLayout>
 </file>
 
 <file path=ppt/slideLayouts/slideLayout16.xml><?xml version="1.0" encoding="utf-8"?>
-<p:sldLayout xmlns:a="http://schemas.openxmlformats.org/drawingml/2006/main" xmlns:r="http://schemas.openxmlformats.org/officeDocument/2006/relationships" xmlns:p="http://schemas.openxmlformats.org/presentationml/2006/main" type="tx" showMasterSp="0" showMasterPhAnim="1">
+<p:sldLayout xmlns:a="http://schemas.openxmlformats.org/drawingml/2006/main" xmlns:r="http://schemas.openxmlformats.org/officeDocument/2006/relationships" xmlns:p="http://schemas.openxmlformats.org/presentationml/2006/main" showMasterSp="0" type="tx">
   <p:cSld name="Blank Alt">
     <p:spTree>
       <p:nvGrpSpPr>
@@ -1781,7 +1847,9 @@
       <p:sp>
         <p:nvSpPr>
           <p:cNvPr id="157" name="Shape 157"/>
-          <p:cNvSpPr/>
+          <p:cNvSpPr>
+            <a:spLocks noGrp="1"/>
+          </p:cNvSpPr>
           <p:nvPr>
             <p:ph type="sldNum" sz="quarter" idx="2"/>
           </p:nvPr>
@@ -1795,8 +1863,10 @@
           <a:bodyPr/>
           <a:lstStyle/>
           <a:p>
-            <a:pPr/>
-            <a:fld id="{86CB4B4D-7CA3-9044-876B-883B54F8677D}" type="slidenum"/>
+            <a:fld id="{86CB4B4D-7CA3-9044-876B-883B54F8677D}" type="slidenum">
+              <a:t>‹#›</a:t>
+            </a:fld>
+            <a:endParaRPr/>
           </a:p>
         </p:txBody>
       </p:sp>
@@ -1805,18 +1875,19 @@
   <p:clrMapOvr>
     <a:masterClrMapping/>
   </p:clrMapOvr>
-  <p:transition xmlns:p14="http://schemas.microsoft.com/office/powerpoint/2010/main" spd="med" advClick="1"/>
+  <p:transition spd="med"/>
 </p:sldLayout>
 </file>
 
 <file path=ppt/slideLayouts/slideLayout2.xml><?xml version="1.0" encoding="utf-8"?>
-<p:sldLayout xmlns:a="http://schemas.openxmlformats.org/drawingml/2006/main" xmlns:r="http://schemas.openxmlformats.org/officeDocument/2006/relationships" xmlns:p="http://schemas.openxmlformats.org/presentationml/2006/main" type="tx" showMasterSp="0" showMasterPhAnim="1">
+<p:sldLayout xmlns:a="http://schemas.openxmlformats.org/drawingml/2006/main" xmlns:r="http://schemas.openxmlformats.org/officeDocument/2006/relationships" xmlns:p="http://schemas.openxmlformats.org/presentationml/2006/main" showMasterSp="0" type="tx">
   <p:cSld name="Photo - Horizontal">
     <p:bg>
       <p:bgPr>
         <a:solidFill>
           <a:srgbClr val="222222"/>
         </a:solidFill>
+        <a:effectLst/>
       </p:bgPr>
     </p:bg>
     <p:spTree>
@@ -1836,7 +1907,9 @@
       <p:sp>
         <p:nvSpPr>
           <p:cNvPr id="22" name="Shape 22"/>
-          <p:cNvSpPr/>
+          <p:cNvSpPr>
+            <a:spLocks noGrp="1"/>
+          </p:cNvSpPr>
           <p:nvPr>
             <p:ph type="pic" idx="13"/>
           </p:nvPr>
@@ -1856,14 +1929,16 @@
           </a:bodyPr>
           <a:lstStyle/>
           <a:p>
-            <a:pPr/>
+            <a:endParaRPr/>
           </a:p>
         </p:txBody>
       </p:sp>
       <p:sp>
         <p:nvSpPr>
           <p:cNvPr id="23" name="Shape 23"/>
-          <p:cNvSpPr/>
+          <p:cNvSpPr>
+            <a:spLocks noGrp="1"/>
+          </p:cNvSpPr>
           <p:nvPr>
             <p:ph type="body" sz="quarter" idx="14"/>
           </p:nvPr>
@@ -1906,13 +1981,16 @@
                 <a:sym typeface="Helvetica"/>
               </a:defRPr>
             </a:pPr>
+            <a:endParaRPr/>
           </a:p>
         </p:txBody>
       </p:sp>
       <p:sp>
         <p:nvSpPr>
           <p:cNvPr id="24" name="Shape 24"/>
-          <p:cNvSpPr/>
+          <p:cNvSpPr>
+            <a:spLocks noGrp="1"/>
+          </p:cNvSpPr>
           <p:nvPr>
             <p:ph type="title"/>
           </p:nvPr>
@@ -1937,7 +2015,6 @@
             </a:lvl1pPr>
           </a:lstStyle>
           <a:p>
-            <a:pPr/>
             <a:r>
               <a:t>Title Text</a:t>
             </a:r>
@@ -1947,7 +2024,9 @@
       <p:sp>
         <p:nvSpPr>
           <p:cNvPr id="25" name="Shape 25"/>
-          <p:cNvSpPr/>
+          <p:cNvSpPr>
+            <a:spLocks noGrp="1"/>
+          </p:cNvSpPr>
           <p:nvPr>
             <p:ph type="body" sz="quarter" idx="1"/>
           </p:nvPr>
@@ -1975,7 +2054,7 @@
               <a:buSzTx/>
               <a:buFontTx/>
               <a:buNone/>
-              <a:defRPr cap="all" sz="5400">
+              <a:defRPr sz="5400" cap="all">
                 <a:solidFill>
                   <a:srgbClr val="A6AAA9"/>
                 </a:solidFill>
@@ -1996,7 +2075,7 @@
               <a:buSzTx/>
               <a:buFontTx/>
               <a:buNone/>
-              <a:defRPr cap="all" sz="5400">
+              <a:defRPr sz="5400" cap="all">
                 <a:solidFill>
                   <a:srgbClr val="A6AAA9"/>
                 </a:solidFill>
@@ -2017,7 +2096,7 @@
               <a:buSzTx/>
               <a:buFontTx/>
               <a:buNone/>
-              <a:defRPr cap="all" sz="5400">
+              <a:defRPr sz="5400" cap="all">
                 <a:solidFill>
                   <a:srgbClr val="A6AAA9"/>
                 </a:solidFill>
@@ -2038,7 +2117,7 @@
               <a:buSzTx/>
               <a:buFontTx/>
               <a:buNone/>
-              <a:defRPr cap="all" sz="5400">
+              <a:defRPr sz="5400" cap="all">
                 <a:solidFill>
                   <a:srgbClr val="A6AAA9"/>
                 </a:solidFill>
@@ -2059,7 +2138,7 @@
               <a:buSzTx/>
               <a:buFontTx/>
               <a:buNone/>
-              <a:defRPr cap="all" sz="5400">
+              <a:defRPr sz="5400" cap="all">
                 <a:solidFill>
                   <a:srgbClr val="A6AAA9"/>
                 </a:solidFill>
@@ -2071,7 +2150,6 @@
             </a:lvl5pPr>
           </a:lstStyle>
           <a:p>
-            <a:pPr/>
             <a:r>
               <a:t>Body Level One</a:t>
             </a:r>
@@ -2105,7 +2183,9 @@
       <p:sp>
         <p:nvSpPr>
           <p:cNvPr id="26" name="Shape 26"/>
-          <p:cNvSpPr/>
+          <p:cNvSpPr>
+            <a:spLocks noGrp="1"/>
+          </p:cNvSpPr>
           <p:nvPr>
             <p:ph type="sldNum" sz="quarter" idx="2"/>
           </p:nvPr>
@@ -2123,8 +2203,10 @@
           <a:bodyPr/>
           <a:lstStyle/>
           <a:p>
-            <a:pPr/>
-            <a:fld id="{86CB4B4D-7CA3-9044-876B-883B54F8677D}" type="slidenum"/>
+            <a:fld id="{86CB4B4D-7CA3-9044-876B-883B54F8677D}" type="slidenum">
+              <a:t>‹#›</a:t>
+            </a:fld>
+            <a:endParaRPr/>
           </a:p>
         </p:txBody>
       </p:sp>
@@ -2133,12 +2215,12 @@
   <p:clrMapOvr>
     <a:masterClrMapping/>
   </p:clrMapOvr>
-  <p:transition xmlns:p14="http://schemas.microsoft.com/office/powerpoint/2010/main" spd="med" advClick="1"/>
+  <p:transition spd="med"/>
 </p:sldLayout>
 </file>
 
 <file path=ppt/slideLayouts/slideLayout3.xml><?xml version="1.0" encoding="utf-8"?>
-<p:sldLayout xmlns:a="http://schemas.openxmlformats.org/drawingml/2006/main" xmlns:r="http://schemas.openxmlformats.org/officeDocument/2006/relationships" xmlns:p="http://schemas.openxmlformats.org/presentationml/2006/main" type="tx" showMasterSp="0" showMasterPhAnim="1">
+<p:sldLayout xmlns:a="http://schemas.openxmlformats.org/drawingml/2006/main" xmlns:r="http://schemas.openxmlformats.org/officeDocument/2006/relationships" xmlns:p="http://schemas.openxmlformats.org/presentationml/2006/main" showMasterSp="0" type="tx">
   <p:cSld name="Title &amp; Subtitle Alt">
     <p:spTree>
       <p:nvGrpSpPr>
@@ -2193,13 +2275,16 @@
                 <a:sym typeface="Helvetica"/>
               </a:defRPr>
             </a:pPr>
+            <a:endParaRPr/>
           </a:p>
         </p:txBody>
       </p:sp>
       <p:sp>
         <p:nvSpPr>
           <p:cNvPr id="34" name="Shape 34"/>
-          <p:cNvSpPr/>
+          <p:cNvSpPr>
+            <a:spLocks noGrp="1"/>
+          </p:cNvSpPr>
           <p:nvPr>
             <p:ph type="title"/>
           </p:nvPr>
@@ -2224,7 +2309,6 @@
             </a:lvl1pPr>
           </a:lstStyle>
           <a:p>
-            <a:pPr/>
             <a:r>
               <a:t>Title Text</a:t>
             </a:r>
@@ -2234,7 +2318,9 @@
       <p:sp>
         <p:nvSpPr>
           <p:cNvPr id="35" name="Shape 35"/>
-          <p:cNvSpPr/>
+          <p:cNvSpPr>
+            <a:spLocks noGrp="1"/>
+          </p:cNvSpPr>
           <p:nvPr>
             <p:ph type="body" sz="quarter" idx="1"/>
           </p:nvPr>
@@ -2262,7 +2348,7 @@
               <a:buSzTx/>
               <a:buFontTx/>
               <a:buNone/>
-              <a:defRPr cap="all" sz="5400">
+              <a:defRPr sz="5400" cap="all">
                 <a:solidFill>
                   <a:srgbClr val="A6AAA9"/>
                 </a:solidFill>
@@ -2283,7 +2369,7 @@
               <a:buSzTx/>
               <a:buFontTx/>
               <a:buNone/>
-              <a:defRPr cap="all" sz="5400">
+              <a:defRPr sz="5400" cap="all">
                 <a:solidFill>
                   <a:srgbClr val="A6AAA9"/>
                 </a:solidFill>
@@ -2304,7 +2390,7 @@
               <a:buSzTx/>
               <a:buFontTx/>
               <a:buNone/>
-              <a:defRPr cap="all" sz="5400">
+              <a:defRPr sz="5400" cap="all">
                 <a:solidFill>
                   <a:srgbClr val="A6AAA9"/>
                 </a:solidFill>
@@ -2325,7 +2411,7 @@
               <a:buSzTx/>
               <a:buFontTx/>
               <a:buNone/>
-              <a:defRPr cap="all" sz="5400">
+              <a:defRPr sz="5400" cap="all">
                 <a:solidFill>
                   <a:srgbClr val="A6AAA9"/>
                 </a:solidFill>
@@ -2346,7 +2432,7 @@
               <a:buSzTx/>
               <a:buFontTx/>
               <a:buNone/>
-              <a:defRPr cap="all" sz="5400">
+              <a:defRPr sz="5400" cap="all">
                 <a:solidFill>
                   <a:srgbClr val="A6AAA9"/>
                 </a:solidFill>
@@ -2358,7 +2444,6 @@
             </a:lvl5pPr>
           </a:lstStyle>
           <a:p>
-            <a:pPr/>
             <a:r>
               <a:t>Body Level One</a:t>
             </a:r>
@@ -2392,7 +2477,9 @@
       <p:sp>
         <p:nvSpPr>
           <p:cNvPr id="36" name="Shape 36"/>
-          <p:cNvSpPr/>
+          <p:cNvSpPr>
+            <a:spLocks noGrp="1"/>
+          </p:cNvSpPr>
           <p:nvPr>
             <p:ph type="sldNum" sz="quarter" idx="2"/>
           </p:nvPr>
@@ -2410,8 +2497,10 @@
           <a:bodyPr/>
           <a:lstStyle/>
           <a:p>
-            <a:pPr/>
-            <a:fld id="{86CB4B4D-7CA3-9044-876B-883B54F8677D}" type="slidenum"/>
+            <a:fld id="{86CB4B4D-7CA3-9044-876B-883B54F8677D}" type="slidenum">
+              <a:t>‹#›</a:t>
+            </a:fld>
+            <a:endParaRPr/>
           </a:p>
         </p:txBody>
       </p:sp>
@@ -2420,18 +2509,19 @@
   <p:clrMapOvr>
     <a:masterClrMapping/>
   </p:clrMapOvr>
-  <p:transition xmlns:p14="http://schemas.microsoft.com/office/powerpoint/2010/main" spd="med" advClick="1"/>
+  <p:transition spd="med"/>
 </p:sldLayout>
 </file>
 
 <file path=ppt/slideLayouts/slideLayout4.xml><?xml version="1.0" encoding="utf-8"?>
-<p:sldLayout xmlns:a="http://schemas.openxmlformats.org/drawingml/2006/main" xmlns:r="http://schemas.openxmlformats.org/officeDocument/2006/relationships" xmlns:p="http://schemas.openxmlformats.org/presentationml/2006/main" type="tx" showMasterSp="0" showMasterPhAnim="1">
+<p:sldLayout xmlns:a="http://schemas.openxmlformats.org/drawingml/2006/main" xmlns:r="http://schemas.openxmlformats.org/officeDocument/2006/relationships" xmlns:p="http://schemas.openxmlformats.org/presentationml/2006/main" showMasterSp="0" type="tx">
   <p:cSld name="Title - Center">
     <p:bg>
       <p:bgPr>
         <a:solidFill>
           <a:srgbClr val="222222"/>
         </a:solidFill>
+        <a:effectLst/>
       </p:bgPr>
     </p:bg>
     <p:spTree>
@@ -2451,7 +2541,9 @@
       <p:sp>
         <p:nvSpPr>
           <p:cNvPr id="43" name="Shape 43"/>
-          <p:cNvSpPr/>
+          <p:cNvSpPr>
+            <a:spLocks noGrp="1"/>
+          </p:cNvSpPr>
           <p:nvPr>
             <p:ph type="title"/>
           </p:nvPr>
@@ -2476,7 +2568,6 @@
             </a:lvl1pPr>
           </a:lstStyle>
           <a:p>
-            <a:pPr/>
             <a:r>
               <a:t>Title Text</a:t>
             </a:r>
@@ -2486,7 +2577,9 @@
       <p:sp>
         <p:nvSpPr>
           <p:cNvPr id="44" name="Shape 44"/>
-          <p:cNvSpPr/>
+          <p:cNvSpPr>
+            <a:spLocks noGrp="1"/>
+          </p:cNvSpPr>
           <p:nvPr>
             <p:ph type="sldNum" sz="quarter" idx="2"/>
           </p:nvPr>
@@ -2504,8 +2597,10 @@
           <a:bodyPr/>
           <a:lstStyle/>
           <a:p>
-            <a:pPr/>
-            <a:fld id="{86CB4B4D-7CA3-9044-876B-883B54F8677D}" type="slidenum"/>
+            <a:fld id="{86CB4B4D-7CA3-9044-876B-883B54F8677D}" type="slidenum">
+              <a:t>‹#›</a:t>
+            </a:fld>
+            <a:endParaRPr/>
           </a:p>
         </p:txBody>
       </p:sp>
@@ -2514,18 +2609,19 @@
   <p:clrMapOvr>
     <a:masterClrMapping/>
   </p:clrMapOvr>
-  <p:transition xmlns:p14="http://schemas.microsoft.com/office/powerpoint/2010/main" spd="med" advClick="1"/>
+  <p:transition spd="med"/>
 </p:sldLayout>
 </file>
 
 <file path=ppt/slideLayouts/slideLayout5.xml><?xml version="1.0" encoding="utf-8"?>
-<p:sldLayout xmlns:a="http://schemas.openxmlformats.org/drawingml/2006/main" xmlns:r="http://schemas.openxmlformats.org/officeDocument/2006/relationships" xmlns:p="http://schemas.openxmlformats.org/presentationml/2006/main" type="tx" showMasterSp="0" showMasterPhAnim="1">
+<p:sldLayout xmlns:a="http://schemas.openxmlformats.org/drawingml/2006/main" xmlns:r="http://schemas.openxmlformats.org/officeDocument/2006/relationships" xmlns:p="http://schemas.openxmlformats.org/presentationml/2006/main" showMasterSp="0" type="tx">
   <p:cSld name="Photo - Vertical">
     <p:bg>
       <p:bgPr>
         <a:solidFill>
           <a:srgbClr val="222222"/>
         </a:solidFill>
+        <a:effectLst/>
       </p:bgPr>
     </p:bg>
     <p:spTree>
@@ -2581,13 +2677,16 @@
                 <a:sym typeface="Helvetica"/>
               </a:defRPr>
             </a:pPr>
+            <a:endParaRPr/>
           </a:p>
         </p:txBody>
       </p:sp>
       <p:sp>
         <p:nvSpPr>
           <p:cNvPr id="52" name="Shape 52"/>
-          <p:cNvSpPr/>
+          <p:cNvSpPr>
+            <a:spLocks noGrp="1"/>
+          </p:cNvSpPr>
           <p:nvPr>
             <p:ph type="pic" idx="13"/>
           </p:nvPr>
@@ -2607,14 +2706,16 @@
           </a:bodyPr>
           <a:lstStyle/>
           <a:p>
-            <a:pPr/>
+            <a:endParaRPr/>
           </a:p>
         </p:txBody>
       </p:sp>
       <p:sp>
         <p:nvSpPr>
           <p:cNvPr id="53" name="Shape 53"/>
-          <p:cNvSpPr/>
+          <p:cNvSpPr>
+            <a:spLocks noGrp="1"/>
+          </p:cNvSpPr>
           <p:nvPr>
             <p:ph type="title"/>
           </p:nvPr>
@@ -2639,7 +2740,6 @@
             </a:lvl1pPr>
           </a:lstStyle>
           <a:p>
-            <a:pPr/>
             <a:r>
               <a:t>Title Text</a:t>
             </a:r>
@@ -2649,7 +2749,9 @@
       <p:sp>
         <p:nvSpPr>
           <p:cNvPr id="54" name="Shape 54"/>
-          <p:cNvSpPr/>
+          <p:cNvSpPr>
+            <a:spLocks noGrp="1"/>
+          </p:cNvSpPr>
           <p:nvPr>
             <p:ph type="body" sz="quarter" idx="1"/>
           </p:nvPr>
@@ -2677,7 +2779,7 @@
               <a:buSzTx/>
               <a:buFontTx/>
               <a:buNone/>
-              <a:defRPr cap="all" sz="5400">
+              <a:defRPr sz="5400" cap="all">
                 <a:solidFill>
                   <a:srgbClr val="A6AAA9"/>
                 </a:solidFill>
@@ -2698,7 +2800,7 @@
               <a:buSzTx/>
               <a:buFontTx/>
               <a:buNone/>
-              <a:defRPr cap="all" sz="5400">
+              <a:defRPr sz="5400" cap="all">
                 <a:solidFill>
                   <a:srgbClr val="A6AAA9"/>
                 </a:solidFill>
@@ -2719,7 +2821,7 @@
               <a:buSzTx/>
               <a:buFontTx/>
               <a:buNone/>
-              <a:defRPr cap="all" sz="5400">
+              <a:defRPr sz="5400" cap="all">
                 <a:solidFill>
                   <a:srgbClr val="A6AAA9"/>
                 </a:solidFill>
@@ -2740,7 +2842,7 @@
               <a:buSzTx/>
               <a:buFontTx/>
               <a:buNone/>
-              <a:defRPr cap="all" sz="5400">
+              <a:defRPr sz="5400" cap="all">
                 <a:solidFill>
                   <a:srgbClr val="A6AAA9"/>
                 </a:solidFill>
@@ -2761,7 +2863,7 @@
               <a:buSzTx/>
               <a:buFontTx/>
               <a:buNone/>
-              <a:defRPr cap="all" sz="5400">
+              <a:defRPr sz="5400" cap="all">
                 <a:solidFill>
                   <a:srgbClr val="A6AAA9"/>
                 </a:solidFill>
@@ -2773,7 +2875,6 @@
             </a:lvl5pPr>
           </a:lstStyle>
           <a:p>
-            <a:pPr/>
             <a:r>
               <a:t>Body Level One</a:t>
             </a:r>
@@ -2807,7 +2908,9 @@
       <p:sp>
         <p:nvSpPr>
           <p:cNvPr id="55" name="Shape 55"/>
-          <p:cNvSpPr/>
+          <p:cNvSpPr>
+            <a:spLocks noGrp="1"/>
+          </p:cNvSpPr>
           <p:nvPr>
             <p:ph type="sldNum" sz="quarter" idx="2"/>
           </p:nvPr>
@@ -2825,8 +2928,10 @@
           <a:bodyPr/>
           <a:lstStyle/>
           <a:p>
-            <a:pPr/>
-            <a:fld id="{86CB4B4D-7CA3-9044-876B-883B54F8677D}" type="slidenum"/>
+            <a:fld id="{86CB4B4D-7CA3-9044-876B-883B54F8677D}" type="slidenum">
+              <a:t>‹#›</a:t>
+            </a:fld>
+            <a:endParaRPr/>
           </a:p>
         </p:txBody>
       </p:sp>
@@ -2835,12 +2940,12 @@
   <p:clrMapOvr>
     <a:masterClrMapping/>
   </p:clrMapOvr>
-  <p:transition xmlns:p14="http://schemas.microsoft.com/office/powerpoint/2010/main" spd="med" advClick="1"/>
+  <p:transition spd="med"/>
 </p:sldLayout>
 </file>
 
 <file path=ppt/slideLayouts/slideLayout6.xml><?xml version="1.0" encoding="utf-8"?>
-<p:sldLayout xmlns:a="http://schemas.openxmlformats.org/drawingml/2006/main" xmlns:r="http://schemas.openxmlformats.org/officeDocument/2006/relationships" xmlns:p="http://schemas.openxmlformats.org/presentationml/2006/main" type="tx" showMasterSp="1" showMasterPhAnim="1">
+<p:sldLayout xmlns:a="http://schemas.openxmlformats.org/drawingml/2006/main" xmlns:r="http://schemas.openxmlformats.org/officeDocument/2006/relationships" xmlns:p="http://schemas.openxmlformats.org/presentationml/2006/main" type="tx">
   <p:cSld name="Title - Top">
     <p:spTree>
       <p:nvGrpSpPr>
@@ -2859,7 +2964,9 @@
       <p:sp>
         <p:nvSpPr>
           <p:cNvPr id="62" name="Shape 62"/>
-          <p:cNvSpPr/>
+          <p:cNvSpPr>
+            <a:spLocks noGrp="1"/>
+          </p:cNvSpPr>
           <p:nvPr>
             <p:ph type="body" sz="quarter" idx="13"/>
           </p:nvPr>
@@ -2889,7 +2996,7 @@
               <a:buSzTx/>
               <a:buFontTx/>
               <a:buNone/>
-              <a:defRPr cap="all" spc="120" sz="2400">
+              <a:defRPr sz="2400" cap="all" spc="120">
                 <a:latin typeface="DIN Alternate"/>
                 <a:ea typeface="DIN Alternate"/>
                 <a:cs typeface="DIN Alternate"/>
@@ -2898,7 +3005,6 @@
             </a:lvl1pPr>
           </a:lstStyle>
           <a:p>
-            <a:pPr/>
             <a:r>
               <a:t>Text</a:t>
             </a:r>
@@ -2908,7 +3014,9 @@
       <p:sp>
         <p:nvSpPr>
           <p:cNvPr id="63" name="Shape 63"/>
-          <p:cNvSpPr/>
+          <p:cNvSpPr>
+            <a:spLocks noGrp="1"/>
+          </p:cNvSpPr>
           <p:nvPr>
             <p:ph type="title"/>
           </p:nvPr>
@@ -2922,7 +3030,6 @@
           <a:bodyPr/>
           <a:lstStyle/>
           <a:p>
-            <a:pPr/>
             <a:r>
               <a:t>Title Text</a:t>
             </a:r>
@@ -2932,7 +3039,9 @@
       <p:sp>
         <p:nvSpPr>
           <p:cNvPr id="64" name="Shape 64"/>
-          <p:cNvSpPr/>
+          <p:cNvSpPr>
+            <a:spLocks noGrp="1"/>
+          </p:cNvSpPr>
           <p:nvPr>
             <p:ph type="sldNum" sz="quarter" idx="2"/>
           </p:nvPr>
@@ -2946,8 +3055,10 @@
           <a:bodyPr/>
           <a:lstStyle/>
           <a:p>
-            <a:pPr/>
-            <a:fld id="{86CB4B4D-7CA3-9044-876B-883B54F8677D}" type="slidenum"/>
+            <a:fld id="{86CB4B4D-7CA3-9044-876B-883B54F8677D}" type="slidenum">
+              <a:t>‹#›</a:t>
+            </a:fld>
+            <a:endParaRPr/>
           </a:p>
         </p:txBody>
       </p:sp>
@@ -2956,18 +3067,19 @@
   <p:clrMapOvr>
     <a:masterClrMapping/>
   </p:clrMapOvr>
-  <p:transition xmlns:p14="http://schemas.microsoft.com/office/powerpoint/2010/main" spd="med" advClick="1"/>
+  <p:transition spd="med"/>
 </p:sldLayout>
 </file>
 
 <file path=ppt/slideLayouts/slideLayout7.xml><?xml version="1.0" encoding="utf-8"?>
-<p:sldLayout xmlns:a="http://schemas.openxmlformats.org/drawingml/2006/main" xmlns:r="http://schemas.openxmlformats.org/officeDocument/2006/relationships" xmlns:p="http://schemas.openxmlformats.org/presentationml/2006/main" type="tx" showMasterSp="1" showMasterPhAnim="1">
+<p:sldLayout xmlns:a="http://schemas.openxmlformats.org/drawingml/2006/main" xmlns:r="http://schemas.openxmlformats.org/officeDocument/2006/relationships" xmlns:p="http://schemas.openxmlformats.org/presentationml/2006/main" type="tx">
   <p:cSld name="Title &amp; Bullets">
     <p:bg>
       <p:bgPr>
         <a:solidFill>
           <a:srgbClr val="222222"/>
         </a:solidFill>
+        <a:effectLst/>
       </p:bgPr>
     </p:bg>
     <p:spTree>
@@ -2987,7 +3099,9 @@
       <p:sp>
         <p:nvSpPr>
           <p:cNvPr id="71" name="Shape 71"/>
-          <p:cNvSpPr/>
+          <p:cNvSpPr>
+            <a:spLocks noGrp="1"/>
+          </p:cNvSpPr>
           <p:nvPr>
             <p:ph type="body" sz="quarter" idx="13"/>
           </p:nvPr>
@@ -3017,7 +3131,7 @@
               <a:buSzTx/>
               <a:buFontTx/>
               <a:buNone/>
-              <a:defRPr cap="all" spc="120" sz="2400">
+              <a:defRPr sz="2400" cap="all" spc="120">
                 <a:latin typeface="DIN Alternate"/>
                 <a:ea typeface="DIN Alternate"/>
                 <a:cs typeface="DIN Alternate"/>
@@ -3026,7 +3140,6 @@
             </a:lvl1pPr>
           </a:lstStyle>
           <a:p>
-            <a:pPr/>
             <a:r>
               <a:t>Text</a:t>
             </a:r>
@@ -3036,7 +3149,9 @@
       <p:sp>
         <p:nvSpPr>
           <p:cNvPr id="72" name="Shape 72"/>
-          <p:cNvSpPr/>
+          <p:cNvSpPr>
+            <a:spLocks noGrp="1"/>
+          </p:cNvSpPr>
           <p:nvPr>
             <p:ph type="title"/>
           </p:nvPr>
@@ -3050,7 +3165,6 @@
           <a:bodyPr/>
           <a:lstStyle/>
           <a:p>
-            <a:pPr/>
             <a:r>
               <a:t>Title Text</a:t>
             </a:r>
@@ -3060,7 +3174,9 @@
       <p:sp>
         <p:nvSpPr>
           <p:cNvPr id="73" name="Shape 73"/>
-          <p:cNvSpPr/>
+          <p:cNvSpPr>
+            <a:spLocks noGrp="1"/>
+          </p:cNvSpPr>
           <p:nvPr>
             <p:ph type="body" idx="1"/>
           </p:nvPr>
@@ -3105,7 +3221,6 @@
             </a:lvl5pPr>
           </a:lstStyle>
           <a:p>
-            <a:pPr/>
             <a:r>
               <a:t>Body Level One</a:t>
             </a:r>
@@ -3139,7 +3254,9 @@
       <p:sp>
         <p:nvSpPr>
           <p:cNvPr id="74" name="Shape 74"/>
-          <p:cNvSpPr/>
+          <p:cNvSpPr>
+            <a:spLocks noGrp="1"/>
+          </p:cNvSpPr>
           <p:nvPr>
             <p:ph type="sldNum" sz="quarter" idx="2"/>
           </p:nvPr>
@@ -3153,8 +3270,10 @@
           <a:bodyPr/>
           <a:lstStyle/>
           <a:p>
-            <a:pPr/>
-            <a:fld id="{86CB4B4D-7CA3-9044-876B-883B54F8677D}" type="slidenum"/>
+            <a:fld id="{86CB4B4D-7CA3-9044-876B-883B54F8677D}" type="slidenum">
+              <a:t>‹#›</a:t>
+            </a:fld>
+            <a:endParaRPr/>
           </a:p>
         </p:txBody>
       </p:sp>
@@ -3163,12 +3282,12 @@
   <p:clrMapOvr>
     <a:masterClrMapping/>
   </p:clrMapOvr>
-  <p:transition xmlns:p14="http://schemas.microsoft.com/office/powerpoint/2010/main" spd="med" advClick="1"/>
+  <p:transition spd="med"/>
 </p:sldLayout>
 </file>
 
 <file path=ppt/slideLayouts/slideLayout8.xml><?xml version="1.0" encoding="utf-8"?>
-<p:sldLayout xmlns:a="http://schemas.openxmlformats.org/drawingml/2006/main" xmlns:r="http://schemas.openxmlformats.org/officeDocument/2006/relationships" xmlns:p="http://schemas.openxmlformats.org/presentationml/2006/main" type="tx" showMasterSp="1" showMasterPhAnim="1">
+<p:sldLayout xmlns:a="http://schemas.openxmlformats.org/drawingml/2006/main" xmlns:r="http://schemas.openxmlformats.org/officeDocument/2006/relationships" xmlns:p="http://schemas.openxmlformats.org/presentationml/2006/main" type="tx">
   <p:cSld name="Title &amp; Bullets Alt">
     <p:spTree>
       <p:nvGrpSpPr>
@@ -3187,7 +3306,9 @@
       <p:sp>
         <p:nvSpPr>
           <p:cNvPr id="81" name="Shape 81"/>
-          <p:cNvSpPr/>
+          <p:cNvSpPr>
+            <a:spLocks noGrp="1"/>
+          </p:cNvSpPr>
           <p:nvPr>
             <p:ph type="body" sz="quarter" idx="13"/>
           </p:nvPr>
@@ -3217,7 +3338,7 @@
               <a:buSzTx/>
               <a:buFontTx/>
               <a:buNone/>
-              <a:defRPr cap="all" spc="120" sz="2400">
+              <a:defRPr sz="2400" cap="all" spc="120">
                 <a:latin typeface="DIN Alternate"/>
                 <a:ea typeface="DIN Alternate"/>
                 <a:cs typeface="DIN Alternate"/>
@@ -3226,7 +3347,6 @@
             </a:lvl1pPr>
           </a:lstStyle>
           <a:p>
-            <a:pPr/>
             <a:r>
               <a:t>Text</a:t>
             </a:r>
@@ -3236,7 +3356,9 @@
       <p:sp>
         <p:nvSpPr>
           <p:cNvPr id="82" name="Shape 82"/>
-          <p:cNvSpPr/>
+          <p:cNvSpPr>
+            <a:spLocks noGrp="1"/>
+          </p:cNvSpPr>
           <p:nvPr>
             <p:ph type="title"/>
           </p:nvPr>
@@ -3250,7 +3372,6 @@
           <a:bodyPr/>
           <a:lstStyle/>
           <a:p>
-            <a:pPr/>
             <a:r>
               <a:t>Title Text</a:t>
             </a:r>
@@ -3260,7 +3381,9 @@
       <p:sp>
         <p:nvSpPr>
           <p:cNvPr id="83" name="Shape 83"/>
-          <p:cNvSpPr/>
+          <p:cNvSpPr>
+            <a:spLocks noGrp="1"/>
+          </p:cNvSpPr>
           <p:nvPr>
             <p:ph type="body" idx="1"/>
           </p:nvPr>
@@ -3305,7 +3428,6 @@
             </a:lvl5pPr>
           </a:lstStyle>
           <a:p>
-            <a:pPr/>
             <a:r>
               <a:t>Body Level One</a:t>
             </a:r>
@@ -3339,7 +3461,9 @@
       <p:sp>
         <p:nvSpPr>
           <p:cNvPr id="84" name="Shape 84"/>
-          <p:cNvSpPr/>
+          <p:cNvSpPr>
+            <a:spLocks noGrp="1"/>
+          </p:cNvSpPr>
           <p:nvPr>
             <p:ph type="sldNum" sz="quarter" idx="2"/>
           </p:nvPr>
@@ -3353,8 +3477,10 @@
           <a:bodyPr/>
           <a:lstStyle/>
           <a:p>
-            <a:pPr/>
-            <a:fld id="{86CB4B4D-7CA3-9044-876B-883B54F8677D}" type="slidenum"/>
+            <a:fld id="{86CB4B4D-7CA3-9044-876B-883B54F8677D}" type="slidenum">
+              <a:t>‹#›</a:t>
+            </a:fld>
+            <a:endParaRPr/>
           </a:p>
         </p:txBody>
       </p:sp>
@@ -3363,18 +3489,19 @@
   <p:clrMapOvr>
     <a:masterClrMapping/>
   </p:clrMapOvr>
-  <p:transition xmlns:p14="http://schemas.microsoft.com/office/powerpoint/2010/main" spd="med" advClick="1"/>
+  <p:transition spd="med"/>
 </p:sldLayout>
 </file>
 
 <file path=ppt/slideLayouts/slideLayout9.xml><?xml version="1.0" encoding="utf-8"?>
-<p:sldLayout xmlns:a="http://schemas.openxmlformats.org/drawingml/2006/main" xmlns:r="http://schemas.openxmlformats.org/officeDocument/2006/relationships" xmlns:p="http://schemas.openxmlformats.org/presentationml/2006/main" type="tx" showMasterSp="1" showMasterPhAnim="1">
+<p:sldLayout xmlns:a="http://schemas.openxmlformats.org/drawingml/2006/main" xmlns:r="http://schemas.openxmlformats.org/officeDocument/2006/relationships" xmlns:p="http://schemas.openxmlformats.org/presentationml/2006/main" type="tx">
   <p:cSld name="Title, Bullets &amp; Photo">
     <p:bg>
       <p:bgPr>
         <a:solidFill>
           <a:srgbClr val="222222"/>
         </a:solidFill>
+        <a:effectLst/>
       </p:bgPr>
     </p:bg>
     <p:spTree>
@@ -3394,7 +3521,9 @@
       <p:sp>
         <p:nvSpPr>
           <p:cNvPr id="91" name="Shape 91"/>
-          <p:cNvSpPr/>
+          <p:cNvSpPr>
+            <a:spLocks noGrp="1"/>
+          </p:cNvSpPr>
           <p:nvPr>
             <p:ph type="body" sz="quarter" idx="13"/>
           </p:nvPr>
@@ -3424,7 +3553,7 @@
               <a:buSzTx/>
               <a:buFontTx/>
               <a:buNone/>
-              <a:defRPr cap="all" spc="120" sz="2400">
+              <a:defRPr sz="2400" cap="all" spc="120">
                 <a:latin typeface="DIN Alternate"/>
                 <a:ea typeface="DIN Alternate"/>
                 <a:cs typeface="DIN Alternate"/>
@@ -3433,7 +3562,6 @@
             </a:lvl1pPr>
           </a:lstStyle>
           <a:p>
-            <a:pPr/>
             <a:r>
               <a:t>Text</a:t>
             </a:r>
@@ -3443,7 +3571,9 @@
       <p:sp>
         <p:nvSpPr>
           <p:cNvPr id="92" name="Shape 92"/>
-          <p:cNvSpPr/>
+          <p:cNvSpPr>
+            <a:spLocks noGrp="1"/>
+          </p:cNvSpPr>
           <p:nvPr>
             <p:ph type="pic" sz="half" idx="14"/>
           </p:nvPr>
@@ -3463,14 +3593,16 @@
           </a:bodyPr>
           <a:lstStyle/>
           <a:p>
-            <a:pPr/>
+            <a:endParaRPr/>
           </a:p>
         </p:txBody>
       </p:sp>
       <p:sp>
         <p:nvSpPr>
           <p:cNvPr id="93" name="Shape 93"/>
-          <p:cNvSpPr/>
+          <p:cNvSpPr>
+            <a:spLocks noGrp="1"/>
+          </p:cNvSpPr>
           <p:nvPr>
             <p:ph type="title"/>
           </p:nvPr>
@@ -3488,7 +3620,6 @@
           <a:bodyPr/>
           <a:lstStyle/>
           <a:p>
-            <a:pPr/>
             <a:r>
               <a:t>Title Text</a:t>
             </a:r>
@@ -3498,7 +3629,9 @@
       <p:sp>
         <p:nvSpPr>
           <p:cNvPr id="94" name="Shape 94"/>
-          <p:cNvSpPr/>
+          <p:cNvSpPr>
+            <a:spLocks noGrp="1"/>
+          </p:cNvSpPr>
           <p:nvPr>
             <p:ph type="body" sz="half" idx="1"/>
           </p:nvPr>
@@ -3552,7 +3685,6 @@
             </a:lvl5pPr>
           </a:lstStyle>
           <a:p>
-            <a:pPr/>
             <a:r>
               <a:t>Body Level One</a:t>
             </a:r>
@@ -3586,7 +3718,9 @@
       <p:sp>
         <p:nvSpPr>
           <p:cNvPr id="95" name="Shape 95"/>
-          <p:cNvSpPr/>
+          <p:cNvSpPr>
+            <a:spLocks noGrp="1"/>
+          </p:cNvSpPr>
           <p:nvPr>
             <p:ph type="sldNum" sz="quarter" idx="2"/>
           </p:nvPr>
@@ -3600,8 +3734,10 @@
           <a:bodyPr/>
           <a:lstStyle/>
           <a:p>
-            <a:pPr/>
-            <a:fld id="{86CB4B4D-7CA3-9044-876B-883B54F8677D}" type="slidenum"/>
+            <a:fld id="{86CB4B4D-7CA3-9044-876B-883B54F8677D}" type="slidenum">
+              <a:t>‹#›</a:t>
+            </a:fld>
+            <a:endParaRPr/>
           </a:p>
         </p:txBody>
       </p:sp>
@@ -3610,7 +3746,7 @@
   <p:clrMapOvr>
     <a:masterClrMapping/>
   </p:clrMapOvr>
-  <p:transition xmlns:p14="http://schemas.microsoft.com/office/powerpoint/2010/main" spd="med" advClick="1"/>
+  <p:transition spd="med"/>
 </p:sldLayout>
 </file>
 
@@ -3622,6 +3758,7 @@
         <a:solidFill>
           <a:srgbClr val="FFFFFF"/>
         </a:solidFill>
+        <a:effectLst/>
       </p:bgPr>
     </p:bg>
     <p:spTree>
@@ -3677,13 +3814,16 @@
                 <a:sym typeface="Helvetica"/>
               </a:defRPr>
             </a:pPr>
+            <a:endParaRPr/>
           </a:p>
         </p:txBody>
       </p:sp>
       <p:sp>
         <p:nvSpPr>
           <p:cNvPr id="3" name="Shape 3"/>
-          <p:cNvSpPr/>
+          <p:cNvSpPr>
+            <a:spLocks noGrp="1"/>
+          </p:cNvSpPr>
           <p:nvPr>
             <p:ph type="title"/>
           </p:nvPr>
@@ -3707,11 +3847,10 @@
         </p:spPr>
         <p:txBody>
           <a:bodyPr lIns="50800" tIns="50800" rIns="50800" bIns="50800">
-            <a:normAutofit fontScale="100000" lnSpcReduction="0"/>
+            <a:normAutofit/>
           </a:bodyPr>
           <a:lstStyle/>
           <a:p>
-            <a:pPr/>
             <a:r>
               <a:t>Title Text</a:t>
             </a:r>
@@ -3721,7 +3860,9 @@
       <p:sp>
         <p:nvSpPr>
           <p:cNvPr id="4" name="Shape 4"/>
-          <p:cNvSpPr/>
+          <p:cNvSpPr>
+            <a:spLocks noGrp="1"/>
+          </p:cNvSpPr>
           <p:nvPr>
             <p:ph type="body" idx="1"/>
           </p:nvPr>
@@ -3745,11 +3886,10 @@
         </p:spPr>
         <p:txBody>
           <a:bodyPr lIns="50800" tIns="50800" rIns="50800" bIns="50800">
-            <a:normAutofit fontScale="100000" lnSpcReduction="0"/>
+            <a:normAutofit/>
           </a:bodyPr>
           <a:lstStyle/>
           <a:p>
-            <a:pPr/>
             <a:r>
               <a:t>Body Level One</a:t>
             </a:r>
@@ -3783,7 +3923,9 @@
       <p:sp>
         <p:nvSpPr>
           <p:cNvPr id="5" name="Shape 5"/>
-          <p:cNvSpPr/>
+          <p:cNvSpPr>
+            <a:spLocks noGrp="1"/>
+          </p:cNvSpPr>
           <p:nvPr>
             <p:ph type="sldNum" sz="quarter" idx="2"/>
           </p:nvPr>
@@ -3821,8 +3963,10 @@
             </a:lvl1pPr>
           </a:lstStyle>
           <a:p>
-            <a:pPr/>
-            <a:fld id="{86CB4B4D-7CA3-9044-876B-883B54F8677D}" type="slidenum"/>
+            <a:fld id="{86CB4B4D-7CA3-9044-876B-883B54F8677D}" type="slidenum">
+              <a:t>‹#›</a:t>
+            </a:fld>
+            <a:endParaRPr/>
           </a:p>
         </p:txBody>
       </p:sp>
@@ -3830,24 +3974,24 @@
   </p:cSld>
   <p:clrMap bg1="dk1" tx1="lt1" bg2="dk2" tx2="lt2" accent1="accent1" accent2="accent2" accent3="accent3" accent4="accent4" accent5="accent5" accent6="accent6" hlink="hlink" folHlink="folHlink"/>
   <p:sldLayoutIdLst>
-    <p:sldLayoutId id="2147483649" r:id="rId2"/>
-    <p:sldLayoutId id="2147483650" r:id="rId3"/>
-    <p:sldLayoutId id="2147483651" r:id="rId4"/>
-    <p:sldLayoutId id="2147483652" r:id="rId5"/>
-    <p:sldLayoutId id="2147483653" r:id="rId6"/>
-    <p:sldLayoutId id="2147483654" r:id="rId7"/>
-    <p:sldLayoutId id="2147483655" r:id="rId8"/>
-    <p:sldLayoutId id="2147483656" r:id="rId9"/>
-    <p:sldLayoutId id="2147483657" r:id="rId10"/>
-    <p:sldLayoutId id="2147483658" r:id="rId11"/>
-    <p:sldLayoutId id="2147483659" r:id="rId12"/>
-    <p:sldLayoutId id="2147483660" r:id="rId13"/>
-    <p:sldLayoutId id="2147483661" r:id="rId14"/>
-    <p:sldLayoutId id="2147483662" r:id="rId15"/>
-    <p:sldLayoutId id="2147483663" r:id="rId16"/>
-    <p:sldLayoutId id="2147483664" r:id="rId17"/>
+    <p:sldLayoutId id="2147483649" r:id="rId1"/>
+    <p:sldLayoutId id="2147483650" r:id="rId2"/>
+    <p:sldLayoutId id="2147483651" r:id="rId3"/>
+    <p:sldLayoutId id="2147483652" r:id="rId4"/>
+    <p:sldLayoutId id="2147483653" r:id="rId5"/>
+    <p:sldLayoutId id="2147483654" r:id="rId6"/>
+    <p:sldLayoutId id="2147483655" r:id="rId7"/>
+    <p:sldLayoutId id="2147483656" r:id="rId8"/>
+    <p:sldLayoutId id="2147483657" r:id="rId9"/>
+    <p:sldLayoutId id="2147483658" r:id="rId10"/>
+    <p:sldLayoutId id="2147483659" r:id="rId11"/>
+    <p:sldLayoutId id="2147483660" r:id="rId12"/>
+    <p:sldLayoutId id="2147483661" r:id="rId13"/>
+    <p:sldLayoutId id="2147483662" r:id="rId14"/>
+    <p:sldLayoutId id="2147483663" r:id="rId15"/>
+    <p:sldLayoutId id="2147483664" r:id="rId16"/>
   </p:sldLayoutIdLst>
-  <p:transition xmlns:p14="http://schemas.microsoft.com/office/powerpoint/2010/main" spd="med" advClick="1"/>
+  <p:transition spd="med"/>
   <p:txStyles>
     <p:titleStyle>
       <a:lvl1pPr marL="0" marR="0" indent="0" algn="l" defTabSz="584200" rtl="0" latinLnBrk="0">
@@ -3865,7 +4009,7 @@
         <a:buFontTx/>
         <a:buNone/>
         <a:tabLst/>
-        <a:defRPr b="0" baseline="0" cap="all" i="0" spc="0" strike="noStrike" sz="6000" u="none">
+        <a:defRPr sz="6000" b="0" i="0" u="none" strike="noStrike" cap="all" spc="0" baseline="0">
           <a:ln>
             <a:noFill/>
           </a:ln>
@@ -3894,7 +4038,7 @@
         <a:buFontTx/>
         <a:buNone/>
         <a:tabLst/>
-        <a:defRPr b="0" baseline="0" cap="all" i="0" spc="0" strike="noStrike" sz="6000" u="none">
+        <a:defRPr sz="6000" b="0" i="0" u="none" strike="noStrike" cap="all" spc="0" baseline="0">
           <a:ln>
             <a:noFill/>
           </a:ln>
@@ -3923,7 +4067,7 @@
         <a:buFontTx/>
         <a:buNone/>
         <a:tabLst/>
-        <a:defRPr b="0" baseline="0" cap="all" i="0" spc="0" strike="noStrike" sz="6000" u="none">
+        <a:defRPr sz="6000" b="0" i="0" u="none" strike="noStrike" cap="all" spc="0" baseline="0">
           <a:ln>
             <a:noFill/>
           </a:ln>
@@ -3952,7 +4096,7 @@
         <a:buFontTx/>
         <a:buNone/>
         <a:tabLst/>
-        <a:defRPr b="0" baseline="0" cap="all" i="0" spc="0" strike="noStrike" sz="6000" u="none">
+        <a:defRPr sz="6000" b="0" i="0" u="none" strike="noStrike" cap="all" spc="0" baseline="0">
           <a:ln>
             <a:noFill/>
           </a:ln>
@@ -3981,7 +4125,7 @@
         <a:buFontTx/>
         <a:buNone/>
         <a:tabLst/>
-        <a:defRPr b="0" baseline="0" cap="all" i="0" spc="0" strike="noStrike" sz="6000" u="none">
+        <a:defRPr sz="6000" b="0" i="0" u="none" strike="noStrike" cap="all" spc="0" baseline="0">
           <a:ln>
             <a:noFill/>
           </a:ln>
@@ -4010,7 +4154,7 @@
         <a:buFontTx/>
         <a:buNone/>
         <a:tabLst/>
-        <a:defRPr b="0" baseline="0" cap="all" i="0" spc="0" strike="noStrike" sz="6000" u="none">
+        <a:defRPr sz="6000" b="0" i="0" u="none" strike="noStrike" cap="all" spc="0" baseline="0">
           <a:ln>
             <a:noFill/>
           </a:ln>
@@ -4039,7 +4183,7 @@
         <a:buFontTx/>
         <a:buNone/>
         <a:tabLst/>
-        <a:defRPr b="0" baseline="0" cap="all" i="0" spc="0" strike="noStrike" sz="6000" u="none">
+        <a:defRPr sz="6000" b="0" i="0" u="none" strike="noStrike" cap="all" spc="0" baseline="0">
           <a:ln>
             <a:noFill/>
           </a:ln>
@@ -4068,7 +4212,7 @@
         <a:buFontTx/>
         <a:buNone/>
         <a:tabLst/>
-        <a:defRPr b="0" baseline="0" cap="all" i="0" spc="0" strike="noStrike" sz="6000" u="none">
+        <a:defRPr sz="6000" b="0" i="0" u="none" strike="noStrike" cap="all" spc="0" baseline="0">
           <a:ln>
             <a:noFill/>
           </a:ln>
@@ -4097,7 +4241,7 @@
         <a:buFontTx/>
         <a:buNone/>
         <a:tabLst/>
-        <a:defRPr b="0" baseline="0" cap="all" i="0" spc="0" strike="noStrike" sz="6000" u="none">
+        <a:defRPr sz="6000" b="0" i="0" u="none" strike="noStrike" cap="all" spc="0" baseline="0">
           <a:ln>
             <a:noFill/>
           </a:ln>
@@ -4132,7 +4276,7 @@
         <a:buFont typeface="Avenir Next"/>
         <a:buChar char="‣"/>
         <a:tabLst/>
-        <a:defRPr b="0" baseline="0" cap="none" i="0" spc="0" strike="noStrike" sz="3400" u="none">
+        <a:defRPr sz="3400" b="0" i="0" u="none" strike="noStrike" cap="none" spc="0" baseline="0">
           <a:ln>
             <a:noFill/>
           </a:ln>
@@ -4165,7 +4309,7 @@
         <a:buFont typeface="Avenir Next"/>
         <a:buChar char="‣"/>
         <a:tabLst/>
-        <a:defRPr b="0" baseline="0" cap="none" i="0" spc="0" strike="noStrike" sz="3400" u="none">
+        <a:defRPr sz="3400" b="0" i="0" u="none" strike="noStrike" cap="none" spc="0" baseline="0">
           <a:ln>
             <a:noFill/>
           </a:ln>
@@ -4198,7 +4342,7 @@
         <a:buFont typeface="Avenir Next"/>
         <a:buChar char="‣"/>
         <a:tabLst/>
-        <a:defRPr b="0" baseline="0" cap="none" i="0" spc="0" strike="noStrike" sz="3400" u="none">
+        <a:defRPr sz="3400" b="0" i="0" u="none" strike="noStrike" cap="none" spc="0" baseline="0">
           <a:ln>
             <a:noFill/>
           </a:ln>
@@ -4231,7 +4375,7 @@
         <a:buFont typeface="Avenir Next"/>
         <a:buChar char="‣"/>
         <a:tabLst/>
-        <a:defRPr b="0" baseline="0" cap="none" i="0" spc="0" strike="noStrike" sz="3400" u="none">
+        <a:defRPr sz="3400" b="0" i="0" u="none" strike="noStrike" cap="none" spc="0" baseline="0">
           <a:ln>
             <a:noFill/>
           </a:ln>
@@ -4264,7 +4408,7 @@
         <a:buFont typeface="Avenir Next"/>
         <a:buChar char="‣"/>
         <a:tabLst/>
-        <a:defRPr b="0" baseline="0" cap="none" i="0" spc="0" strike="noStrike" sz="3400" u="none">
+        <a:defRPr sz="3400" b="0" i="0" u="none" strike="noStrike" cap="none" spc="0" baseline="0">
           <a:ln>
             <a:noFill/>
           </a:ln>
@@ -4297,7 +4441,7 @@
         <a:buFont typeface="Avenir Next"/>
         <a:buChar char="‣"/>
         <a:tabLst/>
-        <a:defRPr b="0" baseline="0" cap="none" i="0" spc="0" strike="noStrike" sz="3400" u="none">
+        <a:defRPr sz="3400" b="0" i="0" u="none" strike="noStrike" cap="none" spc="0" baseline="0">
           <a:ln>
             <a:noFill/>
           </a:ln>
@@ -4330,7 +4474,7 @@
         <a:buFont typeface="Avenir Next"/>
         <a:buChar char="‣"/>
         <a:tabLst/>
-        <a:defRPr b="0" baseline="0" cap="none" i="0" spc="0" strike="noStrike" sz="3400" u="none">
+        <a:defRPr sz="3400" b="0" i="0" u="none" strike="noStrike" cap="none" spc="0" baseline="0">
           <a:ln>
             <a:noFill/>
           </a:ln>
@@ -4363,7 +4507,7 @@
         <a:buFont typeface="Avenir Next"/>
         <a:buChar char="‣"/>
         <a:tabLst/>
-        <a:defRPr b="0" baseline="0" cap="none" i="0" spc="0" strike="noStrike" sz="3400" u="none">
+        <a:defRPr sz="3400" b="0" i="0" u="none" strike="noStrike" cap="none" spc="0" baseline="0">
           <a:ln>
             <a:noFill/>
           </a:ln>
@@ -4396,7 +4540,7 @@
         <a:buFont typeface="Avenir Next"/>
         <a:buChar char="‣"/>
         <a:tabLst/>
-        <a:defRPr b="0" baseline="0" cap="none" i="0" spc="0" strike="noStrike" sz="3400" u="none">
+        <a:defRPr sz="3400" b="0" i="0" u="none" strike="noStrike" cap="none" spc="0" baseline="0">
           <a:ln>
             <a:noFill/>
           </a:ln>
@@ -4427,7 +4571,7 @@
         <a:buFontTx/>
         <a:buNone/>
         <a:tabLst/>
-        <a:defRPr b="0" baseline="0" cap="none" i="0" spc="0" strike="noStrike" sz="2400" u="none">
+        <a:defRPr sz="2400" b="0" i="0" u="none" strike="noStrike" cap="none" spc="0" baseline="0">
           <a:ln>
             <a:noFill/>
           </a:ln>
@@ -4456,7 +4600,7 @@
         <a:buFontTx/>
         <a:buNone/>
         <a:tabLst/>
-        <a:defRPr b="0" baseline="0" cap="none" i="0" spc="0" strike="noStrike" sz="2400" u="none">
+        <a:defRPr sz="2400" b="0" i="0" u="none" strike="noStrike" cap="none" spc="0" baseline="0">
           <a:ln>
             <a:noFill/>
           </a:ln>
@@ -4485,7 +4629,7 @@
         <a:buFontTx/>
         <a:buNone/>
         <a:tabLst/>
-        <a:defRPr b="0" baseline="0" cap="none" i="0" spc="0" strike="noStrike" sz="2400" u="none">
+        <a:defRPr sz="2400" b="0" i="0" u="none" strike="noStrike" cap="none" spc="0" baseline="0">
           <a:ln>
             <a:noFill/>
           </a:ln>
@@ -4514,7 +4658,7 @@
         <a:buFontTx/>
         <a:buNone/>
         <a:tabLst/>
-        <a:defRPr b="0" baseline="0" cap="none" i="0" spc="0" strike="noStrike" sz="2400" u="none">
+        <a:defRPr sz="2400" b="0" i="0" u="none" strike="noStrike" cap="none" spc="0" baseline="0">
           <a:ln>
             <a:noFill/>
           </a:ln>
@@ -4543,7 +4687,7 @@
         <a:buFontTx/>
         <a:buNone/>
         <a:tabLst/>
-        <a:defRPr b="0" baseline="0" cap="none" i="0" spc="0" strike="noStrike" sz="2400" u="none">
+        <a:defRPr sz="2400" b="0" i="0" u="none" strike="noStrike" cap="none" spc="0" baseline="0">
           <a:ln>
             <a:noFill/>
           </a:ln>
@@ -4572,7 +4716,7 @@
         <a:buFontTx/>
         <a:buNone/>
         <a:tabLst/>
-        <a:defRPr b="0" baseline="0" cap="none" i="0" spc="0" strike="noStrike" sz="2400" u="none">
+        <a:defRPr sz="2400" b="0" i="0" u="none" strike="noStrike" cap="none" spc="0" baseline="0">
           <a:ln>
             <a:noFill/>
           </a:ln>
@@ -4601,7 +4745,7 @@
         <a:buFontTx/>
         <a:buNone/>
         <a:tabLst/>
-        <a:defRPr b="0" baseline="0" cap="none" i="0" spc="0" strike="noStrike" sz="2400" u="none">
+        <a:defRPr sz="2400" b="0" i="0" u="none" strike="noStrike" cap="none" spc="0" baseline="0">
           <a:ln>
             <a:noFill/>
           </a:ln>
@@ -4630,7 +4774,7 @@
         <a:buFontTx/>
         <a:buNone/>
         <a:tabLst/>
-        <a:defRPr b="0" baseline="0" cap="none" i="0" spc="0" strike="noStrike" sz="2400" u="none">
+        <a:defRPr sz="2400" b="0" i="0" u="none" strike="noStrike" cap="none" spc="0" baseline="0">
           <a:ln>
             <a:noFill/>
           </a:ln>
@@ -4659,7 +4803,7 @@
         <a:buFontTx/>
         <a:buNone/>
         <a:tabLst/>
-        <a:defRPr b="0" baseline="0" cap="none" i="0" spc="0" strike="noStrike" sz="2400" u="none">
+        <a:defRPr sz="2400" b="0" i="0" u="none" strike="noStrike" cap="none" spc="0" baseline="0">
           <a:ln>
             <a:noFill/>
           </a:ln>
@@ -4679,7 +4823,7 @@
 </file>
 
 <file path=ppt/slides/slide1.xml><?xml version="1.0" encoding="utf-8"?>
-<p:sld xmlns:a="http://schemas.openxmlformats.org/drawingml/2006/main" xmlns:r="http://schemas.openxmlformats.org/officeDocument/2006/relationships" xmlns:p="http://schemas.openxmlformats.org/presentationml/2006/main" showMasterSp="1" showMasterPhAnim="1">
+<p:sld xmlns:a="http://schemas.openxmlformats.org/drawingml/2006/main" xmlns:r="http://schemas.openxmlformats.org/officeDocument/2006/relationships" xmlns:p="http://schemas.openxmlformats.org/presentationml/2006/main">
   <p:cSld>
     <p:spTree>
       <p:nvGrpSpPr>
@@ -4727,7 +4871,9 @@
       <p:sp>
         <p:nvSpPr>
           <p:cNvPr id="167" name="Shape 167"/>
-          <p:cNvSpPr/>
+          <p:cNvSpPr>
+            <a:spLocks noGrp="1"/>
+          </p:cNvSpPr>
           <p:nvPr>
             <p:ph type="title"/>
           </p:nvPr>
@@ -4741,7 +4887,7 @@
             <a:avLst/>
           </a:prstGeom>
           <a:effectLst>
-            <a:outerShdw sx="100000" sy="100000" kx="0" ky="0" algn="b" rotWithShape="0" blurRad="96734" dist="86405" dir="5400000">
+            <a:outerShdw blurRad="96734" dist="86405" dir="5400000" rotWithShape="0">
               <a:srgbClr val="000000">
                 <a:alpha val="50000"/>
               </a:srgbClr>
@@ -4755,6 +4901,7 @@
             <a:pPr algn="ctr" defTabSz="578358">
               <a:defRPr sz="7128"/>
             </a:pPr>
+            <a:endParaRPr/>
           </a:p>
           <a:p>
             <a:pPr algn="ctr" defTabSz="578358">
@@ -4787,12 +4934,12 @@
   <p:clrMapOvr>
     <a:masterClrMapping/>
   </p:clrMapOvr>
-  <p:transition xmlns:p14="http://schemas.microsoft.com/office/powerpoint/2010/main" spd="med" advClick="1"/>
+  <p:transition spd="med"/>
 </p:sld>
 </file>
 
 <file path=ppt/slides/slide10.xml><?xml version="1.0" encoding="utf-8"?>
-<p:sld xmlns:a="http://schemas.openxmlformats.org/drawingml/2006/main" xmlns:r="http://schemas.openxmlformats.org/officeDocument/2006/relationships" xmlns:p="http://schemas.openxmlformats.org/presentationml/2006/main" showMasterSp="1" showMasterPhAnim="1">
+<p:sld xmlns:a="http://schemas.openxmlformats.org/drawingml/2006/main" xmlns:r="http://schemas.openxmlformats.org/officeDocument/2006/relationships" xmlns:p="http://schemas.openxmlformats.org/presentationml/2006/main">
   <p:cSld>
     <p:spTree>
       <p:nvGrpSpPr>
@@ -4811,7 +4958,9 @@
       <p:sp>
         <p:nvSpPr>
           <p:cNvPr id="200" name="Shape 200"/>
-          <p:cNvSpPr/>
+          <p:cNvSpPr>
+            <a:spLocks noGrp="1"/>
+          </p:cNvSpPr>
           <p:nvPr>
             <p:ph type="title"/>
           </p:nvPr>
@@ -4836,7 +4985,6 @@
             </a:lvl1pPr>
           </a:lstStyle>
           <a:p>
-            <a:pPr/>
             <a:r>
               <a:t>What to include</a:t>
             </a:r>
@@ -4846,7 +4994,9 @@
       <p:sp>
         <p:nvSpPr>
           <p:cNvPr id="201" name="Shape 201"/>
-          <p:cNvSpPr/>
+          <p:cNvSpPr>
+            <a:spLocks noGrp="1"/>
+          </p:cNvSpPr>
           <p:nvPr>
             <p:ph type="body" idx="1"/>
           </p:nvPr>
@@ -4860,31 +5010,26 @@
           <a:bodyPr anchor="ctr"/>
           <a:lstStyle/>
           <a:p>
-            <a:pPr/>
             <a:r>
               <a:t>A session transcript</a:t>
             </a:r>
           </a:p>
           <a:p>
-            <a:pPr/>
             <a:r>
               <a:t>A shell reproducer in JavaScript is best</a:t>
             </a:r>
           </a:p>
           <a:p>
-            <a:pPr/>
             <a:r>
               <a:t> A reproducer in other language helps too</a:t>
             </a:r>
           </a:p>
           <a:p>
-            <a:pPr/>
             <a:r>
               <a:t>Logs for all affected nodes</a:t>
             </a:r>
           </a:p>
           <a:p>
-            <a:pPr/>
             <a:r>
               <a:t>Contents of the </a:t>
             </a:r>
@@ -4905,7 +5050,6 @@
             </a:r>
           </a:p>
           <a:p>
-            <a:pPr/>
             <a:r>
               <a:t>MongoDB server/driver/platform versions</a:t>
             </a:r>
@@ -4917,12 +5061,12 @@
   <p:clrMapOvr>
     <a:masterClrMapping/>
   </p:clrMapOvr>
-  <p:transition xmlns:p14="http://schemas.microsoft.com/office/powerpoint/2010/main" spd="med" advClick="1" p14:dur="1000"/>
+  <p:transition spd="slow"/>
 </p:sld>
 </file>
 
 <file path=ppt/slides/slide11.xml><?xml version="1.0" encoding="utf-8"?>
-<p:sld xmlns:a="http://schemas.openxmlformats.org/drawingml/2006/main" xmlns:r="http://schemas.openxmlformats.org/officeDocument/2006/relationships" xmlns:p="http://schemas.openxmlformats.org/presentationml/2006/main" showMasterSp="1" showMasterPhAnim="1">
+<p:sld xmlns:a="http://schemas.openxmlformats.org/drawingml/2006/main" xmlns:r="http://schemas.openxmlformats.org/officeDocument/2006/relationships" xmlns:p="http://schemas.openxmlformats.org/presentationml/2006/main">
   <p:cSld>
     <p:spTree>
       <p:nvGrpSpPr>
@@ -5007,7 +5151,7 @@
               <a:spcBef>
                 <a:spcPts val="0"/>
               </a:spcBef>
-              <a:defRPr cap="all" sz="2800">
+              <a:defRPr sz="2800" cap="all">
                 <a:solidFill>
                   <a:srgbClr val="232323"/>
                 </a:solidFill>
@@ -5019,7 +5163,6 @@
             </a:lvl1pPr>
           </a:lstStyle>
           <a:p>
-            <a:pPr/>
             <a:r>
               <a:t>GOOD TICKEt!</a:t>
             </a:r>
@@ -5031,12 +5174,12 @@
   <p:clrMapOvr>
     <a:masterClrMapping/>
   </p:clrMapOvr>
-  <p:transition xmlns:p14="http://schemas.microsoft.com/office/powerpoint/2010/main" spd="med" advClick="1" p14:dur="1000"/>
+  <p:transition spd="slow"/>
 </p:sld>
 </file>
 
 <file path=ppt/slides/slide12.xml><?xml version="1.0" encoding="utf-8"?>
-<p:sld xmlns:a="http://schemas.openxmlformats.org/drawingml/2006/main" xmlns:r="http://schemas.openxmlformats.org/officeDocument/2006/relationships" xmlns:p="http://schemas.openxmlformats.org/presentationml/2006/main" showMasterSp="1" showMasterPhAnim="1">
+<p:sld xmlns:a="http://schemas.openxmlformats.org/drawingml/2006/main" xmlns:r="http://schemas.openxmlformats.org/officeDocument/2006/relationships" xmlns:p="http://schemas.openxmlformats.org/presentationml/2006/main">
   <p:cSld>
     <p:spTree>
       <p:nvGrpSpPr>
@@ -5056,7 +5199,7 @@
         <p:nvPicPr>
           <p:cNvPr id="206" name="elmo1.png"/>
           <p:cNvPicPr>
-            <a:picLocks noChangeAspect="1"/>
+            <a:picLocks noGrp="1" noChangeAspect="1"/>
           </p:cNvPicPr>
           <p:nvPr>
             <p:ph type="pic" idx="14"/>
@@ -5066,7 +5209,7 @@
           <a:blip r:embed="rId2">
             <a:extLst/>
           </a:blip>
-          <a:srcRect l="18338" t="0" r="18338" b="0"/>
+          <a:srcRect l="18338" r="18338"/>
           <a:stretch>
             <a:fillRect/>
           </a:stretch>
@@ -5084,7 +5227,9 @@
       <p:sp>
         <p:nvSpPr>
           <p:cNvPr id="207" name="Shape 207"/>
-          <p:cNvSpPr/>
+          <p:cNvSpPr>
+            <a:spLocks noGrp="1"/>
+          </p:cNvSpPr>
           <p:nvPr>
             <p:ph type="title"/>
           </p:nvPr>
@@ -5109,7 +5254,6 @@
             </a:lvl1pPr>
           </a:lstStyle>
           <a:p>
-            <a:pPr/>
             <a:r>
               <a:t>Is this a bug?</a:t>
             </a:r>
@@ -5119,7 +5263,9 @@
       <p:sp>
         <p:nvSpPr>
           <p:cNvPr id="208" name="Shape 208"/>
-          <p:cNvSpPr/>
+          <p:cNvSpPr>
+            <a:spLocks noGrp="1"/>
+          </p:cNvSpPr>
           <p:nvPr>
             <p:ph type="body" sz="half" idx="1"/>
           </p:nvPr>
@@ -5148,7 +5294,7 @@
               <a:buSzTx/>
               <a:buFontTx/>
               <a:buNone/>
-              <a:defRPr cap="all" sz="4628">
+              <a:defRPr sz="4628" cap="all">
                 <a:solidFill>
                   <a:schemeClr val="accent1"/>
                 </a:solidFill>
@@ -5251,12 +5397,12 @@
   <p:clrMapOvr>
     <a:masterClrMapping/>
   </p:clrMapOvr>
-  <p:transition xmlns:p14="http://schemas.microsoft.com/office/powerpoint/2010/main" spd="med" advClick="1" p14:dur="1000"/>
+  <p:transition spd="slow"/>
 </p:sld>
 </file>
 
 <file path=ppt/slides/slide13.xml><?xml version="1.0" encoding="utf-8"?>
-<p:sld xmlns:a="http://schemas.openxmlformats.org/drawingml/2006/main" xmlns:r="http://schemas.openxmlformats.org/officeDocument/2006/relationships" xmlns:p="http://schemas.openxmlformats.org/presentationml/2006/main" showMasterSp="1" showMasterPhAnim="1">
+<p:sld xmlns:a="http://schemas.openxmlformats.org/drawingml/2006/main" xmlns:r="http://schemas.openxmlformats.org/officeDocument/2006/relationships" xmlns:p="http://schemas.openxmlformats.org/presentationml/2006/main">
   <p:cSld>
     <p:spTree>
       <p:nvGrpSpPr>
@@ -5276,7 +5422,7 @@
         <p:nvPicPr>
           <p:cNvPr id="210" name="elmer.jpg"/>
           <p:cNvPicPr>
-            <a:picLocks noChangeAspect="1"/>
+            <a:picLocks noGrp="1" noChangeAspect="1"/>
           </p:cNvPicPr>
           <p:nvPr>
             <p:ph type="pic" idx="14"/>
@@ -5304,7 +5450,9 @@
       <p:sp>
         <p:nvSpPr>
           <p:cNvPr id="211" name="Shape 211"/>
-          <p:cNvSpPr/>
+          <p:cNvSpPr>
+            <a:spLocks noGrp="1"/>
+          </p:cNvSpPr>
           <p:nvPr>
             <p:ph type="title"/>
           </p:nvPr>
@@ -5329,7 +5477,6 @@
             </a:lvl1pPr>
           </a:lstStyle>
           <a:p>
-            <a:pPr/>
             <a:r>
               <a:t>Get Ready for the HUNT</a:t>
             </a:r>
@@ -5339,7 +5486,9 @@
       <p:sp>
         <p:nvSpPr>
           <p:cNvPr id="212" name="Shape 212"/>
-          <p:cNvSpPr/>
+          <p:cNvSpPr>
+            <a:spLocks noGrp="1"/>
+          </p:cNvSpPr>
           <p:nvPr>
             <p:ph type="body" sz="half" idx="1"/>
           </p:nvPr>
@@ -5359,6 +5508,7 @@
               </a:spcBef>
               <a:defRPr sz="2584"/>
             </a:pPr>
+            <a:endParaRPr/>
           </a:p>
           <a:p>
             <a:pPr marL="410209" indent="-410209" defTabSz="443991">
@@ -5367,6 +5517,7 @@
               </a:spcBef>
               <a:defRPr sz="2584"/>
             </a:pPr>
+            <a:endParaRPr/>
           </a:p>
           <a:p>
             <a:pPr marL="410209" indent="-410209" defTabSz="443991">
@@ -5396,7 +5547,7 @@
             </a:pPr>
             <a:r>
               <a:rPr u="sng">
-                <a:hlinkClick r:id="rId3" invalidUrl="" action="" tgtFrame="" tooltip="" history="1" highlightClick="0" endSnd="0"/>
+                <a:hlinkClick r:id="rId3"/>
               </a:rPr>
               <a:t>www.mongodb.com/download-center</a:t>
             </a:r>
@@ -5456,12 +5607,12 @@
   <p:clrMapOvr>
     <a:masterClrMapping/>
   </p:clrMapOvr>
-  <p:transition xmlns:p14="http://schemas.microsoft.com/office/powerpoint/2010/main" spd="med" advClick="1" p14:dur="1000"/>
+  <p:transition spd="slow"/>
 </p:sld>
 </file>
 
 <file path=ppt/slides/slide14.xml><?xml version="1.0" encoding="utf-8"?>
-<p:sld xmlns:a="http://schemas.openxmlformats.org/drawingml/2006/main" xmlns:r="http://schemas.openxmlformats.org/officeDocument/2006/relationships" xmlns:p="http://schemas.openxmlformats.org/presentationml/2006/main" showMasterSp="1" showMasterPhAnim="1">
+<p:sld xmlns:a="http://schemas.openxmlformats.org/drawingml/2006/main" xmlns:r="http://schemas.openxmlformats.org/officeDocument/2006/relationships" xmlns:p="http://schemas.openxmlformats.org/presentationml/2006/main">
   <p:cSld>
     <p:spTree>
       <p:nvGrpSpPr>
@@ -5480,7 +5631,9 @@
       <p:sp>
         <p:nvSpPr>
           <p:cNvPr id="214" name="Shape 214"/>
-          <p:cNvSpPr/>
+          <p:cNvSpPr>
+            <a:spLocks noGrp="1"/>
+          </p:cNvSpPr>
           <p:nvPr>
             <p:ph type="title"/>
           </p:nvPr>
@@ -5505,7 +5658,6 @@
             </a:lvl1pPr>
           </a:lstStyle>
           <a:p>
-            <a:pPr/>
             <a:r>
               <a:t>More advanced testing</a:t>
             </a:r>
@@ -5515,7 +5667,9 @@
       <p:sp>
         <p:nvSpPr>
           <p:cNvPr id="215" name="Shape 215"/>
-          <p:cNvSpPr/>
+          <p:cNvSpPr>
+            <a:spLocks noGrp="1"/>
+          </p:cNvSpPr>
           <p:nvPr>
             <p:ph type="body" idx="1"/>
           </p:nvPr>
@@ -5613,7 +5767,7 @@
                     <a:lumOff val="22179"/>
                   </a:schemeClr>
                 </a:solidFill>
-                <a:hlinkClick r:id="rId2" invalidUrl="" action="" tgtFrame="" tooltip="" history="1" highlightClick="0" endSnd="0"/>
+                <a:hlinkClick r:id="rId2"/>
               </a:rPr>
               <a:t>https://github.com/rueckstiess/mtools</a:t>
             </a:r>
@@ -5659,7 +5813,7 @@
                     <a:lumOff val="22179"/>
                   </a:schemeClr>
                 </a:solidFill>
-                <a:hlinkClick r:id="rId3" invalidUrl="" action="" tgtFrame="" tooltip="" history="1" highlightClick="0" endSnd="0"/>
+                <a:hlinkClick r:id="rId3"/>
               </a:rPr>
               <a:t>github.com/mongodb/mongo/tree/master/jstests</a:t>
             </a:r>
@@ -5671,12 +5825,12 @@
   <p:clrMapOvr>
     <a:masterClrMapping/>
   </p:clrMapOvr>
-  <p:transition xmlns:p14="http://schemas.microsoft.com/office/powerpoint/2010/main" spd="med" advClick="1" p14:dur="1000"/>
+  <p:transition spd="slow"/>
 </p:sld>
 </file>
 
 <file path=ppt/slides/slide15.xml><?xml version="1.0" encoding="utf-8"?>
-<p:sld xmlns:a="http://schemas.openxmlformats.org/drawingml/2006/main" xmlns:r="http://schemas.openxmlformats.org/officeDocument/2006/relationships" xmlns:p="http://schemas.openxmlformats.org/presentationml/2006/main" showMasterSp="1" showMasterPhAnim="1">
+<p:sld xmlns:a="http://schemas.openxmlformats.org/drawingml/2006/main" xmlns:r="http://schemas.openxmlformats.org/officeDocument/2006/relationships" xmlns:p="http://schemas.openxmlformats.org/presentationml/2006/main">
   <p:cSld>
     <p:spTree>
       <p:nvGrpSpPr>
@@ -5695,7 +5849,9 @@
       <p:sp>
         <p:nvSpPr>
           <p:cNvPr id="217" name="Shape 217"/>
-          <p:cNvSpPr/>
+          <p:cNvSpPr>
+            <a:spLocks noGrp="1"/>
+          </p:cNvSpPr>
           <p:nvPr>
             <p:ph type="title"/>
           </p:nvPr>
@@ -5720,7 +5876,6 @@
             </a:lvl1pPr>
           </a:lstStyle>
           <a:p>
-            <a:pPr/>
             <a:r>
               <a:t>MongoDB 3.4</a:t>
             </a:r>
@@ -5761,12 +5916,12 @@
   <p:clrMapOvr>
     <a:masterClrMapping/>
   </p:clrMapOvr>
-  <p:transition xmlns:p14="http://schemas.microsoft.com/office/powerpoint/2010/main" spd="med" advClick="1" p14:dur="1000"/>
+  <p:transition spd="slow"/>
 </p:sld>
 </file>
 
 <file path=ppt/slides/slide16.xml><?xml version="1.0" encoding="utf-8"?>
-<p:sld xmlns:a="http://schemas.openxmlformats.org/drawingml/2006/main" xmlns:r="http://schemas.openxmlformats.org/officeDocument/2006/relationships" xmlns:p="http://schemas.openxmlformats.org/presentationml/2006/main" showMasterSp="1" showMasterPhAnim="1">
+<p:sld xmlns:a="http://schemas.openxmlformats.org/drawingml/2006/main" xmlns:r="http://schemas.openxmlformats.org/officeDocument/2006/relationships" xmlns:p="http://schemas.openxmlformats.org/presentationml/2006/main">
   <p:cSld>
     <p:spTree>
       <p:nvGrpSpPr>
@@ -5785,7 +5940,9 @@
       <p:sp>
         <p:nvSpPr>
           <p:cNvPr id="220" name="Shape 220"/>
-          <p:cNvSpPr/>
+          <p:cNvSpPr>
+            <a:spLocks noGrp="1"/>
+          </p:cNvSpPr>
           <p:nvPr>
             <p:ph type="title"/>
           </p:nvPr>
@@ -5810,7 +5967,6 @@
             </a:lvl1pPr>
           </a:lstStyle>
           <a:p>
-            <a:pPr/>
             <a:r>
               <a:t>Tons of foundational work</a:t>
             </a:r>
@@ -5820,7 +5976,9 @@
       <p:sp>
         <p:nvSpPr>
           <p:cNvPr id="221" name="Shape 221"/>
-          <p:cNvSpPr/>
+          <p:cNvSpPr>
+            <a:spLocks noGrp="1"/>
+          </p:cNvSpPr>
           <p:nvPr>
             <p:ph type="body" idx="1"/>
           </p:nvPr>
@@ -5834,31 +5992,26 @@
           <a:bodyPr anchor="ctr"/>
           <a:lstStyle/>
           <a:p>
-            <a:pPr/>
             <a:r>
               <a:t>Shard zones support</a:t>
             </a:r>
           </a:p>
           <a:p>
-            <a:pPr/>
             <a:r>
               <a:t>Faster auto-balancing</a:t>
             </a:r>
           </a:p>
           <a:p>
-            <a:pPr/>
             <a:r>
               <a:t>Intra-cluster compression</a:t>
             </a:r>
           </a:p>
           <a:p>
-            <a:pPr/>
             <a:r>
               <a:t>Robust initial sync</a:t>
             </a:r>
           </a:p>
           <a:p>
-            <a:pPr/>
             <a:r>
               <a:t>New architecture support</a:t>
             </a:r>
@@ -5870,12 +6023,12 @@
   <p:clrMapOvr>
     <a:masterClrMapping/>
   </p:clrMapOvr>
-  <p:transition xmlns:p14="http://schemas.microsoft.com/office/powerpoint/2010/main" spd="med" advClick="1" p14:dur="1000"/>
+  <p:transition spd="slow"/>
 </p:sld>
 </file>
 
 <file path=ppt/slides/slide17.xml><?xml version="1.0" encoding="utf-8"?>
-<p:sld xmlns:a="http://schemas.openxmlformats.org/drawingml/2006/main" xmlns:r="http://schemas.openxmlformats.org/officeDocument/2006/relationships" xmlns:p="http://schemas.openxmlformats.org/presentationml/2006/main" showMasterSp="1" showMasterPhAnim="1">
+<p:sld xmlns:a="http://schemas.openxmlformats.org/drawingml/2006/main" xmlns:r="http://schemas.openxmlformats.org/officeDocument/2006/relationships" xmlns:p="http://schemas.openxmlformats.org/presentationml/2006/main">
   <p:cSld>
     <p:spTree>
       <p:nvGrpSpPr>
@@ -5894,7 +6047,9 @@
       <p:sp>
         <p:nvSpPr>
           <p:cNvPr id="223" name="Shape 223"/>
-          <p:cNvSpPr/>
+          <p:cNvSpPr>
+            <a:spLocks noGrp="1"/>
+          </p:cNvSpPr>
           <p:nvPr>
             <p:ph type="title"/>
           </p:nvPr>
@@ -5919,7 +6074,6 @@
             </a:lvl1pPr>
           </a:lstStyle>
           <a:p>
-            <a:pPr/>
             <a:r>
               <a:t>Lots of user-facing features</a:t>
             </a:r>
@@ -5929,7 +6083,9 @@
       <p:sp>
         <p:nvSpPr>
           <p:cNvPr id="224" name="Shape 224"/>
-          <p:cNvSpPr/>
+          <p:cNvSpPr>
+            <a:spLocks noGrp="1"/>
+          </p:cNvSpPr>
           <p:nvPr>
             <p:ph type="body" idx="1"/>
           </p:nvPr>
@@ -5943,37 +6099,31 @@
           <a:bodyPr anchor="ctr"/>
           <a:lstStyle/>
           <a:p>
-            <a:pPr/>
             <a:r>
               <a:t>Read-only views</a:t>
             </a:r>
           </a:p>
           <a:p>
-            <a:pPr/>
             <a:r>
               <a:t>Graph lookup</a:t>
             </a:r>
           </a:p>
           <a:p>
-            <a:pPr/>
             <a:r>
               <a:t>Collation support</a:t>
             </a:r>
           </a:p>
           <a:p>
-            <a:pPr/>
             <a:r>
               <a:t>Decimal support</a:t>
             </a:r>
           </a:p>
           <a:p>
-            <a:pPr/>
             <a:r>
               <a:t>Aggregation improvements</a:t>
             </a:r>
           </a:p>
           <a:p>
-            <a:pPr/>
             <a:r>
               <a:t>Faceted search</a:t>
             </a:r>
@@ -5985,12 +6135,12 @@
   <p:clrMapOvr>
     <a:masterClrMapping/>
   </p:clrMapOvr>
-  <p:transition xmlns:p14="http://schemas.microsoft.com/office/powerpoint/2010/main" spd="med" advClick="1" p14:dur="1000"/>
+  <p:transition spd="slow"/>
 </p:sld>
 </file>
 
 <file path=ppt/slides/slide18.xml><?xml version="1.0" encoding="utf-8"?>
-<p:sld xmlns:a="http://schemas.openxmlformats.org/drawingml/2006/main" xmlns:r="http://schemas.openxmlformats.org/officeDocument/2006/relationships" xmlns:p="http://schemas.openxmlformats.org/presentationml/2006/main" showMasterSp="1" showMasterPhAnim="1">
+<p:sld xmlns:a="http://schemas.openxmlformats.org/drawingml/2006/main" xmlns:r="http://schemas.openxmlformats.org/officeDocument/2006/relationships" xmlns:p="http://schemas.openxmlformats.org/presentationml/2006/main">
   <p:cSld>
     <p:spTree>
       <p:nvGrpSpPr>
@@ -6009,7 +6159,9 @@
       <p:sp>
         <p:nvSpPr>
           <p:cNvPr id="226" name="Shape 226"/>
-          <p:cNvSpPr/>
+          <p:cNvSpPr>
+            <a:spLocks noGrp="1"/>
+          </p:cNvSpPr>
           <p:nvPr>
             <p:ph type="title"/>
           </p:nvPr>
@@ -6024,7 +6176,9 @@
           </a:prstGeom>
         </p:spPr>
         <p:txBody>
-          <a:bodyPr/>
+          <a:bodyPr>
+            <a:normAutofit fontScale="90000"/>
+          </a:bodyPr>
           <a:lstStyle>
             <a:lvl1pPr algn="ctr" defTabSz="233679">
               <a:spcBef>
@@ -6034,7 +6188,6 @@
             </a:lvl1pPr>
           </a:lstStyle>
           <a:p>
-            <a:pPr/>
             <a:r>
               <a:t>The 3.4 schedule</a:t>
             </a:r>
@@ -6044,7 +6197,9 @@
       <p:sp>
         <p:nvSpPr>
           <p:cNvPr id="227" name="Shape 227"/>
-          <p:cNvSpPr/>
+          <p:cNvSpPr>
+            <a:spLocks noGrp="1"/>
+          </p:cNvSpPr>
           <p:nvPr>
             <p:ph type="body" idx="1"/>
           </p:nvPr>
@@ -6058,32 +6213,38 @@
           <a:bodyPr anchor="ctr"/>
           <a:lstStyle/>
           <a:p>
-            <a:pPr/>
-            <a:r>
-              <a:t>MongoDB 3.4 is scheduled for publication on November 15</a:t>
-            </a:r>
-          </a:p>
-          <a:p>
-            <a:pPr/>
-            <a:r>
+            <a:r>
+              <a:rPr dirty="0"/>
+              <a:t>MongoDB 3.4 is scheduled for publication </a:t>
+            </a:r>
+            <a:r>
+              <a:rPr lang="en-US" dirty="0" smtClean="0"/>
+              <a:t>before the end of the year</a:t>
+            </a:r>
+            <a:endParaRPr dirty="0"/>
+          </a:p>
+          <a:p>
+            <a:r>
+              <a:rPr dirty="0"/>
               <a:t>We'll be releasing "Release Candidates" until then</a:t>
             </a:r>
           </a:p>
           <a:p>
             <a:pPr lvl="1"/>
             <a:r>
+              <a:rPr dirty="0"/>
               <a:t> e.g.: 3.4.0-rc3</a:t>
             </a:r>
           </a:p>
           <a:p>
-            <a:pPr/>
-            <a:r>
+            <a:r>
+              <a:rPr dirty="0"/>
               <a:t>All bugs submitted between now and the 3.4.0 release are eligible to win the Bug Hunt</a:t>
             </a:r>
           </a:p>
           <a:p>
-            <a:pPr/>
-            <a:r>
+            <a:r>
+              <a:rPr dirty="0"/>
               <a:t>Amazing prizes await our fearless Bug Hunters!</a:t>
             </a:r>
           </a:p>
@@ -6094,12 +6255,12 @@
   <p:clrMapOvr>
     <a:masterClrMapping/>
   </p:clrMapOvr>
-  <p:transition xmlns:p14="http://schemas.microsoft.com/office/powerpoint/2010/main" spd="med" advClick="1" p14:dur="1000"/>
+  <p:transition spd="slow"/>
 </p:sld>
 </file>
 
 <file path=ppt/slides/slide19.xml><?xml version="1.0" encoding="utf-8"?>
-<p:sld xmlns:a="http://schemas.openxmlformats.org/drawingml/2006/main" xmlns:r="http://schemas.openxmlformats.org/officeDocument/2006/relationships" xmlns:p="http://schemas.openxmlformats.org/presentationml/2006/main" showMasterSp="1" showMasterPhAnim="1">
+<p:sld xmlns:a="http://schemas.openxmlformats.org/drawingml/2006/main" xmlns:r="http://schemas.openxmlformats.org/officeDocument/2006/relationships" xmlns:p="http://schemas.openxmlformats.org/presentationml/2006/main">
   <p:cSld>
     <p:spTree>
       <p:nvGrpSpPr>
@@ -6118,7 +6279,9 @@
       <p:sp>
         <p:nvSpPr>
           <p:cNvPr id="229" name="Shape 229"/>
-          <p:cNvSpPr/>
+          <p:cNvSpPr>
+            <a:spLocks noGrp="1"/>
+          </p:cNvSpPr>
           <p:nvPr>
             <p:ph type="title"/>
           </p:nvPr>
@@ -6133,7 +6296,9 @@
           </a:prstGeom>
         </p:spPr>
         <p:txBody>
-          <a:bodyPr/>
+          <a:bodyPr>
+            <a:normAutofit fontScale="90000"/>
+          </a:bodyPr>
           <a:lstStyle>
             <a:lvl1pPr algn="ctr" defTabSz="233679">
               <a:spcBef>
@@ -6143,7 +6308,6 @@
             </a:lvl1pPr>
           </a:lstStyle>
           <a:p>
-            <a:pPr/>
             <a:r>
               <a:t>Summary</a:t>
             </a:r>
@@ -6153,7 +6317,9 @@
       <p:sp>
         <p:nvSpPr>
           <p:cNvPr id="230" name="Shape 230"/>
-          <p:cNvSpPr/>
+          <p:cNvSpPr>
+            <a:spLocks noGrp="1"/>
+          </p:cNvSpPr>
           <p:nvPr>
             <p:ph type="body" idx="1"/>
           </p:nvPr>
@@ -6167,31 +6333,26 @@
           <a:bodyPr anchor="ctr"/>
           <a:lstStyle/>
           <a:p>
-            <a:pPr/>
             <a:r>
               <a:t>The SERVER project tracks bugs and feature requests</a:t>
             </a:r>
           </a:p>
           <a:p>
-            <a:pPr/>
             <a:r>
               <a:t> SERVER, TOOLS, DOCS, DRIVERS</a:t>
             </a:r>
           </a:p>
           <a:p>
-            <a:pPr/>
             <a:r>
               <a:t>Help us help you: ask good questions</a:t>
             </a:r>
           </a:p>
           <a:p>
-            <a:pPr/>
             <a:r>
               <a:t>Easiest way to test is through the shell</a:t>
             </a:r>
           </a:p>
           <a:p>
-            <a:pPr/>
             <a:r>
               <a:t>Start with user-facing features</a:t>
             </a:r>
@@ -6203,12 +6364,12 @@
   <p:clrMapOvr>
     <a:masterClrMapping/>
   </p:clrMapOvr>
-  <p:transition xmlns:p14="http://schemas.microsoft.com/office/powerpoint/2010/main" spd="med" advClick="1" p14:dur="1000"/>
+  <p:transition spd="slow"/>
 </p:sld>
 </file>
 
 <file path=ppt/slides/slide2.xml><?xml version="1.0" encoding="utf-8"?>
-<p:sld xmlns:a="http://schemas.openxmlformats.org/drawingml/2006/main" xmlns:r="http://schemas.openxmlformats.org/officeDocument/2006/relationships" xmlns:p="http://schemas.openxmlformats.org/presentationml/2006/main" showMasterSp="1" showMasterPhAnim="1">
+<p:sld xmlns:a="http://schemas.openxmlformats.org/drawingml/2006/main" xmlns:r="http://schemas.openxmlformats.org/officeDocument/2006/relationships" xmlns:p="http://schemas.openxmlformats.org/presentationml/2006/main">
   <p:cSld>
     <p:spTree>
       <p:nvGrpSpPr>
@@ -6227,7 +6388,9 @@
       <p:sp>
         <p:nvSpPr>
           <p:cNvPr id="169" name="Shape 169"/>
-          <p:cNvSpPr/>
+          <p:cNvSpPr>
+            <a:spLocks noGrp="1"/>
+          </p:cNvSpPr>
           <p:nvPr>
             <p:ph type="title"/>
           </p:nvPr>
@@ -6242,7 +6405,9 @@
           </a:prstGeom>
         </p:spPr>
         <p:txBody>
-          <a:bodyPr/>
+          <a:bodyPr>
+            <a:normAutofit fontScale="90000"/>
+          </a:bodyPr>
           <a:lstStyle>
             <a:lvl1pPr algn="ctr" defTabSz="233679">
               <a:spcBef>
@@ -6252,7 +6417,6 @@
             </a:lvl1pPr>
           </a:lstStyle>
           <a:p>
-            <a:pPr/>
             <a:r>
               <a:t>Preparing your tools for the hunt</a:t>
             </a:r>
@@ -6262,7 +6426,9 @@
       <p:sp>
         <p:nvSpPr>
           <p:cNvPr id="170" name="Shape 170"/>
-          <p:cNvSpPr/>
+          <p:cNvSpPr>
+            <a:spLocks noGrp="1"/>
+          </p:cNvSpPr>
           <p:nvPr>
             <p:ph type="body" idx="1"/>
           </p:nvPr>
@@ -6276,31 +6442,26 @@
           <a:bodyPr anchor="ctr"/>
           <a:lstStyle/>
           <a:p>
-            <a:pPr/>
             <a:r>
               <a:t>MongoDB issue tracking (JIRA)</a:t>
             </a:r>
           </a:p>
           <a:p>
-            <a:pPr/>
             <a:r>
               <a:t>How to file a bug</a:t>
             </a:r>
           </a:p>
           <a:p>
-            <a:pPr/>
             <a:r>
               <a:t>How to test MongoDB</a:t>
             </a:r>
           </a:p>
           <a:p>
-            <a:pPr/>
             <a:r>
               <a:t>The hunting grounds - what's new in 3.4</a:t>
             </a:r>
           </a:p>
           <a:p>
-            <a:pPr/>
             <a:r>
               <a:t>The 3.4 schedule</a:t>
             </a:r>
@@ -6312,12 +6473,12 @@
   <p:clrMapOvr>
     <a:masterClrMapping/>
   </p:clrMapOvr>
-  <p:transition xmlns:p14="http://schemas.microsoft.com/office/powerpoint/2010/main" spd="med" advClick="1" p14:dur="1000"/>
+  <p:transition spd="slow"/>
 </p:sld>
 </file>
 
 <file path=ppt/slides/slide20.xml><?xml version="1.0" encoding="utf-8"?>
-<p:sld xmlns:a="http://schemas.openxmlformats.org/drawingml/2006/main" xmlns:r="http://schemas.openxmlformats.org/officeDocument/2006/relationships" xmlns:p="http://schemas.openxmlformats.org/presentationml/2006/main" showMasterSp="1" showMasterPhAnim="1">
+<p:sld xmlns:a="http://schemas.openxmlformats.org/drawingml/2006/main" xmlns:r="http://schemas.openxmlformats.org/officeDocument/2006/relationships" xmlns:p="http://schemas.openxmlformats.org/presentationml/2006/main">
   <p:cSld>
     <p:spTree>
       <p:nvGrpSpPr>
@@ -6336,7 +6497,9 @@
       <p:sp>
         <p:nvSpPr>
           <p:cNvPr id="232" name="Shape 232"/>
-          <p:cNvSpPr/>
+          <p:cNvSpPr>
+            <a:spLocks noGrp="1"/>
+          </p:cNvSpPr>
           <p:nvPr>
             <p:ph type="title"/>
           </p:nvPr>
@@ -6351,7 +6514,9 @@
           </a:prstGeom>
         </p:spPr>
         <p:txBody>
-          <a:bodyPr/>
+          <a:bodyPr>
+            <a:normAutofit fontScale="90000"/>
+          </a:bodyPr>
           <a:lstStyle>
             <a:lvl1pPr algn="ctr" defTabSz="233679">
               <a:spcBef>
@@ -6361,7 +6526,6 @@
             </a:lvl1pPr>
           </a:lstStyle>
           <a:p>
-            <a:pPr/>
             <a:r>
               <a:t>THE PRIZES</a:t>
             </a:r>
@@ -6393,7 +6557,7 @@
         </p:spPr>
         <p:txBody>
           <a:bodyPr lIns="50800" tIns="50800" rIns="50800" bIns="50800">
-            <a:normAutofit fontScale="100000" lnSpcReduction="0"/>
+            <a:normAutofit/>
           </a:bodyPr>
           <a:lstStyle/>
           <a:p>
@@ -6404,7 +6568,7 @@
               <a:spcBef>
                 <a:spcPts val="1900"/>
               </a:spcBef>
-              <a:defRPr cap="all" sz="3588">
+              <a:defRPr sz="3588" cap="all">
                 <a:solidFill>
                   <a:schemeClr val="accent1"/>
                 </a:solidFill>
@@ -6513,7 +6677,7 @@
         </p:spPr>
         <p:txBody>
           <a:bodyPr lIns="50800" tIns="50800" rIns="50800" bIns="50800">
-            <a:normAutofit fontScale="100000" lnSpcReduction="0"/>
+            <a:normAutofit/>
           </a:bodyPr>
           <a:lstStyle/>
           <a:p>
@@ -6524,7 +6688,7 @@
               <a:spcBef>
                 <a:spcPts val="1900"/>
               </a:spcBef>
-              <a:defRPr cap="all" sz="3588">
+              <a:defRPr sz="3588" cap="all">
                 <a:solidFill>
                   <a:schemeClr val="accent1"/>
                 </a:solidFill>
@@ -6613,12 +6777,12 @@
   <p:clrMapOvr>
     <a:masterClrMapping/>
   </p:clrMapOvr>
-  <p:transition xmlns:p14="http://schemas.microsoft.com/office/powerpoint/2010/main" spd="med" advClick="1" p14:dur="1000"/>
+  <p:transition spd="slow"/>
 </p:sld>
 </file>
 
 <file path=ppt/slides/slide21.xml><?xml version="1.0" encoding="utf-8"?>
-<p:sld xmlns:a="http://schemas.openxmlformats.org/drawingml/2006/main" xmlns:r="http://schemas.openxmlformats.org/officeDocument/2006/relationships" xmlns:p="http://schemas.openxmlformats.org/presentationml/2006/main" showMasterSp="1" showMasterPhAnim="1">
+<p:sld xmlns:a="http://schemas.openxmlformats.org/drawingml/2006/main" xmlns:r="http://schemas.openxmlformats.org/officeDocument/2006/relationships" xmlns:p="http://schemas.openxmlformats.org/presentationml/2006/main">
   <p:cSld>
     <p:spTree>
       <p:nvGrpSpPr>
@@ -6637,7 +6801,9 @@
       <p:sp>
         <p:nvSpPr>
           <p:cNvPr id="236" name="Shape 236"/>
-          <p:cNvSpPr/>
+          <p:cNvSpPr>
+            <a:spLocks noGrp="1"/>
+          </p:cNvSpPr>
           <p:nvPr>
             <p:ph type="title"/>
           </p:nvPr>
@@ -6657,7 +6823,6 @@
             <a:lvl1pPr algn="ctr"/>
           </a:lstStyle>
           <a:p>
-            <a:pPr/>
             <a:r>
               <a:t>QUESTIONS?</a:t>
             </a:r>
@@ -6669,12 +6834,12 @@
   <p:clrMapOvr>
     <a:masterClrMapping/>
   </p:clrMapOvr>
-  <p:transition xmlns:p14="http://schemas.microsoft.com/office/powerpoint/2010/main" spd="med" advClick="1" p14:dur="1000"/>
+  <p:transition spd="slow"/>
 </p:sld>
 </file>
 
 <file path=ppt/slides/slide22.xml><?xml version="1.0" encoding="utf-8"?>
-<p:sld xmlns:a="http://schemas.openxmlformats.org/drawingml/2006/main" xmlns:r="http://schemas.openxmlformats.org/officeDocument/2006/relationships" xmlns:p="http://schemas.openxmlformats.org/presentationml/2006/main" showMasterSp="1" showMasterPhAnim="1">
+<p:sld xmlns:a="http://schemas.openxmlformats.org/drawingml/2006/main" xmlns:r="http://schemas.openxmlformats.org/officeDocument/2006/relationships" xmlns:p="http://schemas.openxmlformats.org/presentationml/2006/main">
   <p:cSld>
     <p:spTree>
       <p:nvGrpSpPr>
@@ -6694,7 +6859,7 @@
         <p:nvPicPr>
           <p:cNvPr id="238" name="keep-calm-and-happy-hunting-1.png"/>
           <p:cNvPicPr>
-            <a:picLocks noChangeAspect="1"/>
+            <a:picLocks noGrp="1" noChangeAspect="1"/>
           </p:cNvPicPr>
           <p:nvPr>
             <p:ph type="pic" idx="14"/>
@@ -6704,7 +6869,7 @@
           <a:blip r:embed="rId2">
             <a:extLst/>
           </a:blip>
-          <a:srcRect l="8957" t="0" r="8957" b="0"/>
+          <a:srcRect l="8957" r="8957"/>
           <a:stretch>
             <a:fillRect/>
           </a:stretch>
@@ -6722,7 +6887,9 @@
       <p:sp>
         <p:nvSpPr>
           <p:cNvPr id="239" name="Shape 239"/>
-          <p:cNvSpPr/>
+          <p:cNvSpPr>
+            <a:spLocks noGrp="1"/>
+          </p:cNvSpPr>
           <p:nvPr>
             <p:ph type="title"/>
           </p:nvPr>
@@ -6737,7 +6904,9 @@
           </a:prstGeom>
         </p:spPr>
         <p:txBody>
-          <a:bodyPr/>
+          <a:bodyPr>
+            <a:normAutofit fontScale="90000"/>
+          </a:bodyPr>
           <a:lstStyle>
             <a:lvl1pPr algn="ctr" defTabSz="233679">
               <a:spcBef>
@@ -6747,7 +6916,6 @@
             </a:lvl1pPr>
           </a:lstStyle>
           <a:p>
-            <a:pPr/>
             <a:r>
               <a:t>RESOURCES</a:t>
             </a:r>
@@ -6757,7 +6925,9 @@
       <p:sp>
         <p:nvSpPr>
           <p:cNvPr id="240" name="Shape 240"/>
-          <p:cNvSpPr/>
+          <p:cNvSpPr>
+            <a:spLocks noGrp="1"/>
+          </p:cNvSpPr>
           <p:nvPr>
             <p:ph type="body" sz="half" idx="1"/>
           </p:nvPr>
@@ -6788,7 +6958,7 @@
             </a:pPr>
             <a:r>
               <a:rPr u="sng">
-                <a:hlinkClick r:id="rId3" invalidUrl="" action="" tgtFrame="" tooltip="" history="1" highlightClick="0" endSnd="0"/>
+                <a:hlinkClick r:id="rId3"/>
               </a:rPr>
               <a:t>github.com/ramonfm/MUG201609</a:t>
             </a:r>
@@ -6807,7 +6977,7 @@
             </a:pPr>
             <a:r>
               <a:rPr u="sng">
-                <a:hlinkClick r:id="rId4" invalidUrl="" action="" tgtFrame="" tooltip="" history="1" highlightClick="0" endSnd="0"/>
+                <a:hlinkClick r:id="rId4"/>
               </a:rPr>
               <a:t>mongodb.com/download-center</a:t>
             </a:r>
@@ -6826,7 +6996,7 @@
             </a:pPr>
             <a:r>
               <a:rPr u="sng">
-                <a:hlinkClick r:id="rId5" invalidUrl="" action="" tgtFrame="" tooltip="" history="1" highlightClick="0" endSnd="0"/>
+                <a:hlinkClick r:id="rId5"/>
               </a:rPr>
               <a:t>docs.mongodb.com/manual/release-notes/3.3-dev-series/</a:t>
             </a:r>
@@ -6838,12 +7008,12 @@
   <p:clrMapOvr>
     <a:masterClrMapping/>
   </p:clrMapOvr>
-  <p:transition xmlns:p14="http://schemas.microsoft.com/office/powerpoint/2010/main" spd="med" advClick="1" p14:dur="1000"/>
+  <p:transition spd="slow"/>
 </p:sld>
 </file>
 
 <file path=ppt/slides/slide3.xml><?xml version="1.0" encoding="utf-8"?>
-<p:sld xmlns:a="http://schemas.openxmlformats.org/drawingml/2006/main" xmlns:r="http://schemas.openxmlformats.org/officeDocument/2006/relationships" xmlns:p="http://schemas.openxmlformats.org/presentationml/2006/main" showMasterSp="1" showMasterPhAnim="1">
+<p:sld xmlns:a="http://schemas.openxmlformats.org/drawingml/2006/main" xmlns:r="http://schemas.openxmlformats.org/officeDocument/2006/relationships" xmlns:p="http://schemas.openxmlformats.org/presentationml/2006/main">
   <p:cSld>
     <p:spTree>
       <p:nvGrpSpPr>
@@ -6862,7 +7032,9 @@
       <p:sp>
         <p:nvSpPr>
           <p:cNvPr id="172" name="Shape 172"/>
-          <p:cNvSpPr/>
+          <p:cNvSpPr>
+            <a:spLocks noGrp="1"/>
+          </p:cNvSpPr>
           <p:nvPr>
             <p:ph type="title"/>
           </p:nvPr>
@@ -6877,7 +7049,9 @@
           </a:prstGeom>
         </p:spPr>
         <p:txBody>
-          <a:bodyPr/>
+          <a:bodyPr>
+            <a:normAutofit fontScale="90000"/>
+          </a:bodyPr>
           <a:lstStyle>
             <a:lvl1pPr algn="ctr" defTabSz="233679">
               <a:spcBef>
@@ -6887,7 +7061,6 @@
             </a:lvl1pPr>
           </a:lstStyle>
           <a:p>
-            <a:pPr/>
             <a:r>
               <a:t>MongoDB issue tracking (JIRA)</a:t>
             </a:r>
@@ -6897,7 +7070,9 @@
       <p:sp>
         <p:nvSpPr>
           <p:cNvPr id="173" name="Shape 173"/>
-          <p:cNvSpPr/>
+          <p:cNvSpPr>
+            <a:spLocks noGrp="1"/>
+          </p:cNvSpPr>
           <p:nvPr>
             <p:ph type="body" idx="1"/>
           </p:nvPr>
@@ -6911,13 +7086,11 @@
           <a:bodyPr anchor="ctr"/>
           <a:lstStyle/>
           <a:p>
-            <a:pPr/>
             <a:r>
               <a:t>All MongoDB work is tracked through JIRA</a:t>
             </a:r>
           </a:p>
           <a:p>
-            <a:pPr/>
             <a:r>
               <a:t> </a:t>
             </a:r>
@@ -6930,19 +7103,17 @@
                     <a:lumOff val="22179"/>
                   </a:schemeClr>
                 </a:solidFill>
-                <a:hlinkClick r:id="rId2" invalidUrl="" action="" tgtFrame="" tooltip="" history="1" highlightClick="0" endSnd="0"/>
+                <a:hlinkClick r:id="rId2"/>
               </a:rPr>
               <a:t>https://jira.mongodb.org</a:t>
             </a:r>
           </a:p>
           <a:p>
-            <a:pPr/>
             <a:r>
               <a:t>SERVER, TOOLS, DOCS and DRIVERS projects are public</a:t>
             </a:r>
           </a:p>
           <a:p>
-            <a:pPr/>
             <a:r>
               <a:t> Need an account to create tickets and comment</a:t>
             </a:r>
@@ -6954,12 +7125,12 @@
   <p:clrMapOvr>
     <a:masterClrMapping/>
   </p:clrMapOvr>
-  <p:transition xmlns:p14="http://schemas.microsoft.com/office/powerpoint/2010/main" spd="med" advClick="1" p14:dur="1000"/>
+  <p:transition spd="slow"/>
 </p:sld>
 </file>
 
 <file path=ppt/slides/slide4.xml><?xml version="1.0" encoding="utf-8"?>
-<p:sld xmlns:a="http://schemas.openxmlformats.org/drawingml/2006/main" xmlns:r="http://schemas.openxmlformats.org/officeDocument/2006/relationships" xmlns:p="http://schemas.openxmlformats.org/presentationml/2006/main" showMasterSp="1" showMasterPhAnim="1">
+<p:sld xmlns:a="http://schemas.openxmlformats.org/drawingml/2006/main" xmlns:r="http://schemas.openxmlformats.org/officeDocument/2006/relationships" xmlns:p="http://schemas.openxmlformats.org/presentationml/2006/main">
   <p:cSld>
     <p:spTree>
       <p:nvGrpSpPr>
@@ -6978,7 +7149,9 @@
       <p:sp>
         <p:nvSpPr>
           <p:cNvPr id="175" name="Shape 175"/>
-          <p:cNvSpPr/>
+          <p:cNvSpPr>
+            <a:spLocks noGrp="1"/>
+          </p:cNvSpPr>
           <p:nvPr>
             <p:ph type="title"/>
           </p:nvPr>
@@ -6993,7 +7166,9 @@
           </a:prstGeom>
         </p:spPr>
         <p:txBody>
-          <a:bodyPr/>
+          <a:bodyPr>
+            <a:normAutofit fontScale="90000"/>
+          </a:bodyPr>
           <a:lstStyle>
             <a:lvl1pPr algn="ctr" defTabSz="233679">
               <a:spcBef>
@@ -7003,7 +7178,6 @@
             </a:lvl1pPr>
           </a:lstStyle>
           <a:p>
-            <a:pPr/>
             <a:r>
               <a:t>The SERVER project</a:t>
             </a:r>
@@ -7013,7 +7187,9 @@
       <p:sp>
         <p:nvSpPr>
           <p:cNvPr id="176" name="Shape 176"/>
-          <p:cNvSpPr/>
+          <p:cNvSpPr>
+            <a:spLocks noGrp="1"/>
+          </p:cNvSpPr>
           <p:nvPr>
             <p:ph type="body" idx="1"/>
           </p:nvPr>
@@ -7027,19 +7203,16 @@
           <a:bodyPr anchor="ctr"/>
           <a:lstStyle/>
           <a:p>
-            <a:pPr/>
             <a:r>
               <a:t>Used to track all server, shell, and mongos development</a:t>
             </a:r>
           </a:p>
           <a:p>
-            <a:pPr/>
             <a:r>
               <a:t>Open a ticket in this project if you find a bug</a:t>
             </a:r>
           </a:p>
           <a:p>
-            <a:pPr/>
             <a:r>
               <a:t> This project is </a:t>
             </a:r>
@@ -7057,13 +7230,11 @@
             </a:r>
           </a:p>
           <a:p>
-            <a:pPr/>
             <a:r>
               <a:t> Use the mongodb-user group instead</a:t>
             </a:r>
           </a:p>
           <a:p>
-            <a:pPr/>
             <a:r>
               <a:t> </a:t>
             </a:r>
@@ -7076,7 +7247,7 @@
                     <a:lumOff val="22179"/>
                   </a:schemeClr>
                 </a:solidFill>
-                <a:hlinkClick r:id="rId2" invalidUrl="" action="" tgtFrame="" tooltip="" history="1" highlightClick="0" endSnd="0"/>
+                <a:hlinkClick r:id="rId2"/>
               </a:rPr>
               <a:t>https://groups.google.com/group/mongodb-user</a:t>
             </a:r>
@@ -7091,12 +7262,12 @@
   <p:clrMapOvr>
     <a:masterClrMapping/>
   </p:clrMapOvr>
-  <p:transition xmlns:p14="http://schemas.microsoft.com/office/powerpoint/2010/main" spd="med" advClick="1" p14:dur="1000"/>
+  <p:transition spd="slow"/>
 </p:sld>
 </file>
 
 <file path=ppt/slides/slide5.xml><?xml version="1.0" encoding="utf-8"?>
-<p:sld xmlns:a="http://schemas.openxmlformats.org/drawingml/2006/main" xmlns:r="http://schemas.openxmlformats.org/officeDocument/2006/relationships" xmlns:p="http://schemas.openxmlformats.org/presentationml/2006/main" showMasterSp="1" showMasterPhAnim="1">
+<p:sld xmlns:a="http://schemas.openxmlformats.org/drawingml/2006/main" xmlns:r="http://schemas.openxmlformats.org/officeDocument/2006/relationships" xmlns:p="http://schemas.openxmlformats.org/presentationml/2006/main">
   <p:cSld>
     <p:spTree>
       <p:nvGrpSpPr>
@@ -7115,7 +7286,9 @@
       <p:sp>
         <p:nvSpPr>
           <p:cNvPr id="178" name="Shape 178"/>
-          <p:cNvSpPr/>
+          <p:cNvSpPr>
+            <a:spLocks noGrp="1"/>
+          </p:cNvSpPr>
           <p:nvPr>
             <p:ph type="title"/>
           </p:nvPr>
@@ -7140,7 +7313,6 @@
             </a:lvl1pPr>
           </a:lstStyle>
           <a:p>
-            <a:pPr/>
             <a:r>
               <a:t>Using JQL to navigate JIRA</a:t>
             </a:r>
@@ -7150,7 +7322,9 @@
       <p:sp>
         <p:nvSpPr>
           <p:cNvPr id="179" name="Shape 179"/>
-          <p:cNvSpPr/>
+          <p:cNvSpPr>
+            <a:spLocks noGrp="1"/>
+          </p:cNvSpPr>
           <p:nvPr>
             <p:ph type="body" idx="1"/>
           </p:nvPr>
@@ -7172,7 +7346,7 @@
               <a:buSzTx/>
               <a:buFontTx/>
               <a:buNone/>
-              <a:defRPr cap="all" sz="6000">
+              <a:defRPr sz="6000" cap="all">
                 <a:solidFill>
                   <a:schemeClr val="accent1"/>
                 </a:solidFill>
@@ -7187,19 +7361,16 @@
             </a:r>
           </a:p>
           <a:p>
-            <a:pPr/>
             <a:r>
               <a:t> _project = SERVER and resolution is empty and summary ~ “collation"_</a:t>
             </a:r>
           </a:p>
           <a:p>
-            <a:pPr/>
             <a:r>
               <a:t> _project = DOCS and fixVersion = "mongodb-3.4" and resolution is empty_</a:t>
             </a:r>
           </a:p>
           <a:p>
-            <a:pPr/>
             <a:r>
               <a:t> _project = SERVER and affectsVersion &gt;= 3.4.0-rc0 and resolution is empty_</a:t>
             </a:r>
@@ -7211,12 +7382,12 @@
   <p:clrMapOvr>
     <a:masterClrMapping/>
   </p:clrMapOvr>
-  <p:transition xmlns:p14="http://schemas.microsoft.com/office/powerpoint/2010/main" spd="med" advClick="1" p14:dur="1000"/>
+  <p:transition spd="slow"/>
 </p:sld>
 </file>
 
 <file path=ppt/slides/slide6.xml><?xml version="1.0" encoding="utf-8"?>
-<p:sld xmlns:a="http://schemas.openxmlformats.org/drawingml/2006/main" xmlns:r="http://schemas.openxmlformats.org/officeDocument/2006/relationships" xmlns:p="http://schemas.openxmlformats.org/presentationml/2006/main" showMasterSp="1" showMasterPhAnim="1">
+<p:sld xmlns:a="http://schemas.openxmlformats.org/drawingml/2006/main" xmlns:r="http://schemas.openxmlformats.org/officeDocument/2006/relationships" xmlns:p="http://schemas.openxmlformats.org/presentationml/2006/main">
   <p:cSld>
     <p:spTree>
       <p:nvGrpSpPr>
@@ -7236,7 +7407,7 @@
         <p:nvPicPr>
           <p:cNvPr id="181" name="bug-key.jpg"/>
           <p:cNvPicPr>
-            <a:picLocks noChangeAspect="1"/>
+            <a:picLocks noGrp="1" noChangeAspect="1"/>
           </p:cNvPicPr>
           <p:nvPr>
             <p:ph type="pic" idx="14"/>
@@ -7246,7 +7417,7 @@
           <a:blip r:embed="rId2">
             <a:extLst/>
           </a:blip>
-          <a:srcRect l="22217" t="0" r="22217" b="0"/>
+          <a:srcRect l="22217" r="22217"/>
           <a:stretch>
             <a:fillRect/>
           </a:stretch>
@@ -7260,7 +7431,9 @@
       <p:sp>
         <p:nvSpPr>
           <p:cNvPr id="182" name="Shape 182"/>
-          <p:cNvSpPr/>
+          <p:cNvSpPr>
+            <a:spLocks noGrp="1"/>
+          </p:cNvSpPr>
           <p:nvPr>
             <p:ph type="title"/>
           </p:nvPr>
@@ -7285,7 +7458,6 @@
             </a:lvl1pPr>
           </a:lstStyle>
           <a:p>
-            <a:pPr/>
             <a:r>
               <a:t>How to file a bug</a:t>
             </a:r>
@@ -7295,7 +7467,9 @@
       <p:sp>
         <p:nvSpPr>
           <p:cNvPr id="183" name="Shape 183"/>
-          <p:cNvSpPr/>
+          <p:cNvSpPr>
+            <a:spLocks noGrp="1"/>
+          </p:cNvSpPr>
           <p:nvPr>
             <p:ph type="body" sz="half" idx="1"/>
           </p:nvPr>
@@ -7309,10 +7483,10 @@
           <a:bodyPr/>
           <a:lstStyle/>
           <a:p>
-            <a:pPr/>
-          </a:p>
-          <a:p>
-            <a:pPr/>
+            <a:endParaRPr/>
+          </a:p>
+          <a:p>
+            <a:endParaRPr/>
           </a:p>
           <a:p>
             <a:pPr marL="0" indent="0">
@@ -7323,7 +7497,7 @@
               <a:buSzTx/>
               <a:buFontTx/>
               <a:buNone/>
-              <a:defRPr cap="all" sz="6000">
+              <a:defRPr sz="6000" cap="all">
                 <a:solidFill>
                   <a:srgbClr val="A6AAA9"/>
                 </a:solidFill>
@@ -7344,12 +7518,12 @@
   <p:clrMapOvr>
     <a:masterClrMapping/>
   </p:clrMapOvr>
-  <p:transition xmlns:p14="http://schemas.microsoft.com/office/powerpoint/2010/main" spd="med" advClick="1" p14:dur="1000"/>
+  <p:transition spd="slow"/>
 </p:sld>
 </file>
 
 <file path=ppt/slides/slide7.xml><?xml version="1.0" encoding="utf-8"?>
-<p:sld xmlns:a="http://schemas.openxmlformats.org/drawingml/2006/main" xmlns:r="http://schemas.openxmlformats.org/officeDocument/2006/relationships" xmlns:p="http://schemas.openxmlformats.org/presentationml/2006/main" showMasterSp="1" showMasterPhAnim="1">
+<p:sld xmlns:a="http://schemas.openxmlformats.org/drawingml/2006/main" xmlns:r="http://schemas.openxmlformats.org/officeDocument/2006/relationships" xmlns:p="http://schemas.openxmlformats.org/presentationml/2006/main">
   <p:cSld>
     <p:spTree>
       <p:nvGrpSpPr>
@@ -7368,7 +7542,9 @@
       <p:sp>
         <p:nvSpPr>
           <p:cNvPr id="185" name="Shape 185"/>
-          <p:cNvSpPr/>
+          <p:cNvSpPr>
+            <a:spLocks noGrp="1"/>
+          </p:cNvSpPr>
           <p:nvPr>
             <p:ph type="title"/>
           </p:nvPr>
@@ -7393,7 +7569,6 @@
             </a:lvl1pPr>
           </a:lstStyle>
           <a:p>
-            <a:pPr/>
             <a:r>
               <a:t>Preparing your tools for the hunt</a:t>
             </a:r>
@@ -7412,7 +7587,7 @@
           <a:blip r:embed="rId2">
             <a:extLst/>
           </a:blip>
-          <a:srcRect l="0" t="0" r="0" b="0"/>
+          <a:srcRect/>
           <a:stretch>
             <a:fillRect/>
           </a:stretch>
@@ -7437,7 +7612,7 @@
           <p:nvPr/>
         </p:nvSpPr>
         <p:spPr>
-          <a:xfrm flipH="1" rot="10799656">
+          <a:xfrm rot="10799656" flipH="1">
             <a:off x="2695752" y="4298594"/>
             <a:ext cx="2335181" cy="1359794"/>
           </a:xfrm>
@@ -7465,7 +7640,7 @@
               <a:spcBef>
                 <a:spcPts val="0"/>
               </a:spcBef>
-              <a:defRPr cap="all" sz="2800">
+              <a:defRPr sz="2800" cap="all">
                 <a:solidFill>
                   <a:srgbClr val="FFFFFF"/>
                 </a:solidFill>
@@ -7475,6 +7650,7 @@
                 <a:sym typeface="DIN Condensed"/>
               </a:defRPr>
             </a:pPr>
+            <a:endParaRPr/>
           </a:p>
         </p:txBody>
       </p:sp>
@@ -7513,7 +7689,7 @@
               <a:spcBef>
                 <a:spcPts val="0"/>
               </a:spcBef>
-              <a:defRPr cap="all" sz="3600">
+              <a:defRPr sz="3600" cap="all">
                 <a:solidFill>
                   <a:srgbClr val="FFFFFF"/>
                 </a:solidFill>
@@ -7525,7 +7701,6 @@
             </a:lvl1pPr>
           </a:lstStyle>
           <a:p>
-            <a:pPr/>
             <a:r>
               <a:t>Don’t do this</a:t>
             </a:r>
@@ -7567,7 +7742,7 @@
               <a:spcBef>
                 <a:spcPts val="0"/>
               </a:spcBef>
-              <a:defRPr cap="all" sz="2800">
+              <a:defRPr sz="2800" cap="all">
                 <a:solidFill>
                   <a:srgbClr val="FFFFFF"/>
                 </a:solidFill>
@@ -7577,6 +7752,7 @@
                 <a:sym typeface="DIN Condensed"/>
               </a:defRPr>
             </a:pPr>
+            <a:endParaRPr/>
           </a:p>
         </p:txBody>
       </p:sp>
@@ -7615,7 +7791,7 @@
               <a:spcBef>
                 <a:spcPts val="0"/>
               </a:spcBef>
-              <a:defRPr cap="all" sz="3600">
+              <a:defRPr sz="3600" cap="all">
                 <a:solidFill>
                   <a:srgbClr val="FFFFFF"/>
                 </a:solidFill>
@@ -7627,7 +7803,6 @@
             </a:lvl1pPr>
           </a:lstStyle>
           <a:p>
-            <a:pPr/>
             <a:r>
               <a:t>Or this</a:t>
             </a:r>
@@ -7636,9 +7811,9 @@
       </p:sp>
       <p:pic>
         <p:nvPicPr>
-          <p:cNvPr id="191" name=""/>
+          <p:cNvPr id="191" name="Picture 190"/>
           <p:cNvPicPr>
-            <a:picLocks noChangeAspect="0"/>
+            <a:picLocks/>
           </p:cNvPicPr>
           <p:nvPr/>
         </p:nvPicPr>
@@ -7665,12 +7840,12 @@
   <p:clrMapOvr>
     <a:masterClrMapping/>
   </p:clrMapOvr>
-  <p:transition xmlns:p14="http://schemas.microsoft.com/office/powerpoint/2010/main" spd="med" advClick="1" p14:dur="1000"/>
+  <p:transition spd="slow"/>
 </p:sld>
 </file>
 
 <file path=ppt/slides/slide8.xml><?xml version="1.0" encoding="utf-8"?>
-<p:sld xmlns:a="http://schemas.openxmlformats.org/drawingml/2006/main" xmlns:r="http://schemas.openxmlformats.org/officeDocument/2006/relationships" xmlns:p="http://schemas.openxmlformats.org/presentationml/2006/main" showMasterSp="1" showMasterPhAnim="1">
+<p:sld xmlns:a="http://schemas.openxmlformats.org/drawingml/2006/main" xmlns:r="http://schemas.openxmlformats.org/officeDocument/2006/relationships" xmlns:p="http://schemas.openxmlformats.org/presentationml/2006/main">
   <p:cSld>
     <p:spTree>
       <p:nvGrpSpPr>
@@ -7689,7 +7864,9 @@
       <p:sp>
         <p:nvSpPr>
           <p:cNvPr id="194" name="Shape 194"/>
-          <p:cNvSpPr/>
+          <p:cNvSpPr>
+            <a:spLocks noGrp="1"/>
+          </p:cNvSpPr>
           <p:nvPr>
             <p:ph type="title"/>
           </p:nvPr>
@@ -7714,7 +7891,6 @@
             </a:lvl1pPr>
           </a:lstStyle>
           <a:p>
-            <a:pPr/>
             <a:r>
               <a:t>Try to answer these questions</a:t>
             </a:r>
@@ -7724,7 +7900,9 @@
       <p:sp>
         <p:nvSpPr>
           <p:cNvPr id="195" name="Shape 195"/>
-          <p:cNvSpPr/>
+          <p:cNvSpPr>
+            <a:spLocks noGrp="1"/>
+          </p:cNvSpPr>
           <p:nvPr>
             <p:ph type="body" idx="1"/>
           </p:nvPr>
@@ -7757,7 +7935,7 @@
             </a:r>
           </a:p>
           <a:p>
-            <a:pPr lvl="1" marL="737869" indent="-368934" defTabSz="484886">
+            <a:pPr marL="737869" lvl="1" indent="-368934" defTabSz="484886">
               <a:spcBef>
                 <a:spcPts val="2300"/>
               </a:spcBef>
@@ -7791,7 +7969,7 @@
             </a:r>
           </a:p>
           <a:p>
-            <a:pPr lvl="1" marL="737869" indent="-368934" defTabSz="484886">
+            <a:pPr marL="737869" lvl="1" indent="-368934" defTabSz="484886">
               <a:spcBef>
                 <a:spcPts val="2300"/>
               </a:spcBef>
@@ -7825,7 +8003,7 @@
             </a:r>
           </a:p>
           <a:p>
-            <a:pPr lvl="1" marL="737869" indent="-368934" defTabSz="484886">
+            <a:pPr marL="737869" lvl="1" indent="-368934" defTabSz="484886">
               <a:spcBef>
                 <a:spcPts val="2300"/>
               </a:spcBef>
@@ -7859,7 +8037,7 @@
             </a:r>
           </a:p>
           <a:p>
-            <a:pPr lvl="1" marL="737869" indent="-368934" defTabSz="484886">
+            <a:pPr marL="737869" lvl="1" indent="-368934" defTabSz="484886">
               <a:spcBef>
                 <a:spcPts val="2300"/>
               </a:spcBef>
@@ -7876,12 +8054,12 @@
   <p:clrMapOvr>
     <a:masterClrMapping/>
   </p:clrMapOvr>
-  <p:transition xmlns:p14="http://schemas.microsoft.com/office/powerpoint/2010/main" spd="med" advClick="1" p14:dur="1000"/>
+  <p:transition spd="slow"/>
 </p:sld>
 </file>
 
 <file path=ppt/slides/slide9.xml><?xml version="1.0" encoding="utf-8"?>
-<p:sld xmlns:a="http://schemas.openxmlformats.org/drawingml/2006/main" xmlns:r="http://schemas.openxmlformats.org/officeDocument/2006/relationships" xmlns:p="http://schemas.openxmlformats.org/presentationml/2006/main" showMasterSp="1" showMasterPhAnim="1">
+<p:sld xmlns:a="http://schemas.openxmlformats.org/drawingml/2006/main" xmlns:r="http://schemas.openxmlformats.org/officeDocument/2006/relationships" xmlns:p="http://schemas.openxmlformats.org/presentationml/2006/main">
   <p:cSld>
     <p:spTree>
       <p:nvGrpSpPr>
@@ -7966,7 +8144,7 @@
               <a:spcBef>
                 <a:spcPts val="0"/>
               </a:spcBef>
-              <a:defRPr cap="all" sz="2800">
+              <a:defRPr sz="2800" cap="all">
                 <a:solidFill>
                   <a:srgbClr val="232323"/>
                 </a:solidFill>
@@ -7978,7 +8156,6 @@
             </a:lvl1pPr>
           </a:lstStyle>
           <a:p>
-            <a:pPr/>
             <a:r>
               <a:t>GOOD TICKEt!</a:t>
             </a:r>
@@ -7990,12 +8167,12 @@
   <p:clrMapOvr>
     <a:masterClrMapping/>
   </p:clrMapOvr>
-  <p:transition xmlns:p14="http://schemas.microsoft.com/office/powerpoint/2010/main" spd="med" advClick="1" p14:dur="1000"/>
+  <p:transition spd="slow"/>
 </p:sld>
 </file>
 
 <file path=ppt/theme/theme1.xml><?xml version="1.0" encoding="utf-8"?>
-<a:theme xmlns:a="http://schemas.openxmlformats.org/drawingml/2006/main" xmlns:r="http://schemas.openxmlformats.org/officeDocument/2006/relationships" name="New_Template7">
+<a:theme xmlns:a="http://schemas.openxmlformats.org/drawingml/2006/main" name="New_Template7">
   <a:themeElements>
     <a:clrScheme name="New_Template7">
       <a:dk1>
@@ -8194,7 +8371,7 @@
         <a:effectLst/>
         <a:sp3d/>
       </a:spPr>
-      <a:bodyPr rot="0" spcFirstLastPara="1" vertOverflow="overflow" horzOverflow="overflow" vert="horz" wrap="square" lIns="50800" tIns="50800" rIns="50800" bIns="50800" numCol="1" spcCol="38100" rtlCol="0" anchor="ctr" upright="0">
+      <a:bodyPr rot="0" spcFirstLastPara="1" vertOverflow="overflow" horzOverflow="overflow" vert="horz" wrap="square" lIns="50800" tIns="50800" rIns="50800" bIns="50800" numCol="1" spcCol="38100" rtlCol="0" anchor="ctr">
         <a:spAutoFit/>
       </a:bodyPr>
       <a:lstStyle>
@@ -8213,7 +8390,7 @@
           <a:buFontTx/>
           <a:buNone/>
           <a:tabLst/>
-          <a:defRPr b="0" baseline="0" cap="all" i="0" spc="0" strike="noStrike" sz="2800" u="none" kumimoji="0" normalizeH="0">
+          <a:defRPr kumimoji="0" sz="2800" b="0" i="0" u="none" strike="noStrike" cap="all" spc="0" normalizeH="0" baseline="0">
             <a:ln>
               <a:noFill/>
             </a:ln>
@@ -8243,7 +8420,7 @@
           <a:buFontTx/>
           <a:buNone/>
           <a:tabLst/>
-          <a:defRPr b="0" baseline="0" cap="none" i="0" spc="0" strike="noStrike" sz="1800" u="none" kumimoji="0" normalizeH="0">
+          <a:defRPr kumimoji="0" sz="1800" b="0" i="0" u="none" strike="noStrike" cap="none" spc="0" normalizeH="0" baseline="0">
             <a:ln>
               <a:noFill/>
             </a:ln>
@@ -8269,7 +8446,7 @@
           <a:buFontTx/>
           <a:buNone/>
           <a:tabLst/>
-          <a:defRPr b="0" baseline="0" cap="none" i="0" spc="0" strike="noStrike" sz="1800" u="none" kumimoji="0" normalizeH="0">
+          <a:defRPr kumimoji="0" sz="1800" b="0" i="0" u="none" strike="noStrike" cap="none" spc="0" normalizeH="0" baseline="0">
             <a:ln>
               <a:noFill/>
             </a:ln>
@@ -8295,7 +8472,7 @@
           <a:buFontTx/>
           <a:buNone/>
           <a:tabLst/>
-          <a:defRPr b="0" baseline="0" cap="none" i="0" spc="0" strike="noStrike" sz="1800" u="none" kumimoji="0" normalizeH="0">
+          <a:defRPr kumimoji="0" sz="1800" b="0" i="0" u="none" strike="noStrike" cap="none" spc="0" normalizeH="0" baseline="0">
             <a:ln>
               <a:noFill/>
             </a:ln>
@@ -8321,7 +8498,7 @@
           <a:buFontTx/>
           <a:buNone/>
           <a:tabLst/>
-          <a:defRPr b="0" baseline="0" cap="none" i="0" spc="0" strike="noStrike" sz="1800" u="none" kumimoji="0" normalizeH="0">
+          <a:defRPr kumimoji="0" sz="1800" b="0" i="0" u="none" strike="noStrike" cap="none" spc="0" normalizeH="0" baseline="0">
             <a:ln>
               <a:noFill/>
             </a:ln>
@@ -8347,7 +8524,7 @@
           <a:buFontTx/>
           <a:buNone/>
           <a:tabLst/>
-          <a:defRPr b="0" baseline="0" cap="none" i="0" spc="0" strike="noStrike" sz="1800" u="none" kumimoji="0" normalizeH="0">
+          <a:defRPr kumimoji="0" sz="1800" b="0" i="0" u="none" strike="noStrike" cap="none" spc="0" normalizeH="0" baseline="0">
             <a:ln>
               <a:noFill/>
             </a:ln>
@@ -8373,7 +8550,7 @@
           <a:buFontTx/>
           <a:buNone/>
           <a:tabLst/>
-          <a:defRPr b="0" baseline="0" cap="none" i="0" spc="0" strike="noStrike" sz="1800" u="none" kumimoji="0" normalizeH="0">
+          <a:defRPr kumimoji="0" sz="1800" b="0" i="0" u="none" strike="noStrike" cap="none" spc="0" normalizeH="0" baseline="0">
             <a:ln>
               <a:noFill/>
             </a:ln>
@@ -8399,7 +8576,7 @@
           <a:buFontTx/>
           <a:buNone/>
           <a:tabLst/>
-          <a:defRPr b="0" baseline="0" cap="none" i="0" spc="0" strike="noStrike" sz="1800" u="none" kumimoji="0" normalizeH="0">
+          <a:defRPr kumimoji="0" sz="1800" b="0" i="0" u="none" strike="noStrike" cap="none" spc="0" normalizeH="0" baseline="0">
             <a:ln>
               <a:noFill/>
             </a:ln>
@@ -8425,7 +8602,7 @@
           <a:buFontTx/>
           <a:buNone/>
           <a:tabLst/>
-          <a:defRPr b="0" baseline="0" cap="none" i="0" spc="0" strike="noStrike" sz="1800" u="none" kumimoji="0" normalizeH="0">
+          <a:defRPr kumimoji="0" sz="1800" b="0" i="0" u="none" strike="noStrike" cap="none" spc="0" normalizeH="0" baseline="0">
             <a:ln>
               <a:noFill/>
             </a:ln>
@@ -8451,7 +8628,7 @@
           <a:buFontTx/>
           <a:buNone/>
           <a:tabLst/>
-          <a:defRPr b="0" baseline="0" cap="none" i="0" spc="0" strike="noStrike" sz="1800" u="none" kumimoji="0" normalizeH="0">
+          <a:defRPr kumimoji="0" sz="1800" b="0" i="0" u="none" strike="noStrike" cap="none" spc="0" normalizeH="0" baseline="0">
             <a:ln>
               <a:noFill/>
             </a:ln>
@@ -8464,9 +8641,15 @@
         </a:lvl9pPr>
       </a:lstStyle>
       <a:style>
-        <a:lnRef idx="0"/>
-        <a:fillRef idx="0"/>
-        <a:effectRef idx="0"/>
+        <a:lnRef idx="0">
+          <a:scrgbClr r="0" g="0" b="0"/>
+        </a:lnRef>
+        <a:fillRef idx="0">
+          <a:scrgbClr r="0" g="0" b="0"/>
+        </a:fillRef>
+        <a:effectRef idx="0">
+          <a:scrgbClr r="0" g="0" b="0"/>
+        </a:effectRef>
         <a:fontRef idx="none"/>
       </a:style>
     </a:spDef>
@@ -8483,7 +8666,7 @@
         <a:effectLst/>
         <a:sp3d/>
       </a:spPr>
-      <a:bodyPr rot="0" spcFirstLastPara="1" vertOverflow="overflow" horzOverflow="overflow" vert="horz" wrap="square" lIns="91439" tIns="45719" rIns="91439" bIns="45719" numCol="1" spcCol="38100" rtlCol="0" anchor="t" upright="0">
+      <a:bodyPr rot="0" spcFirstLastPara="1" vertOverflow="overflow" horzOverflow="overflow" vert="horz" wrap="square" lIns="91439" tIns="45719" rIns="91439" bIns="45719" numCol="1" spcCol="38100" rtlCol="0" anchor="t">
         <a:noAutofit/>
       </a:bodyPr>
       <a:lstStyle>
@@ -8502,7 +8685,7 @@
           <a:buFontTx/>
           <a:buNone/>
           <a:tabLst/>
-          <a:defRPr b="0" baseline="0" cap="none" i="0" spc="0" strike="noStrike" sz="1800" u="none" kumimoji="0" normalizeH="0">
+          <a:defRPr kumimoji="0" sz="1800" b="0" i="0" u="none" strike="noStrike" cap="none" spc="0" normalizeH="0" baseline="0">
             <a:ln>
               <a:noFill/>
             </a:ln>
@@ -8528,7 +8711,7 @@
           <a:buFontTx/>
           <a:buNone/>
           <a:tabLst/>
-          <a:defRPr b="0" baseline="0" cap="none" i="0" spc="0" strike="noStrike" sz="1800" u="none" kumimoji="0" normalizeH="0">
+          <a:defRPr kumimoji="0" sz="1800" b="0" i="0" u="none" strike="noStrike" cap="none" spc="0" normalizeH="0" baseline="0">
             <a:ln>
               <a:noFill/>
             </a:ln>
@@ -8554,7 +8737,7 @@
           <a:buFontTx/>
           <a:buNone/>
           <a:tabLst/>
-          <a:defRPr b="0" baseline="0" cap="none" i="0" spc="0" strike="noStrike" sz="1800" u="none" kumimoji="0" normalizeH="0">
+          <a:defRPr kumimoji="0" sz="1800" b="0" i="0" u="none" strike="noStrike" cap="none" spc="0" normalizeH="0" baseline="0">
             <a:ln>
               <a:noFill/>
             </a:ln>
@@ -8580,7 +8763,7 @@
           <a:buFontTx/>
           <a:buNone/>
           <a:tabLst/>
-          <a:defRPr b="0" baseline="0" cap="none" i="0" spc="0" strike="noStrike" sz="1800" u="none" kumimoji="0" normalizeH="0">
+          <a:defRPr kumimoji="0" sz="1800" b="0" i="0" u="none" strike="noStrike" cap="none" spc="0" normalizeH="0" baseline="0">
             <a:ln>
               <a:noFill/>
             </a:ln>
@@ -8606,7 +8789,7 @@
           <a:buFontTx/>
           <a:buNone/>
           <a:tabLst/>
-          <a:defRPr b="0" baseline="0" cap="none" i="0" spc="0" strike="noStrike" sz="1800" u="none" kumimoji="0" normalizeH="0">
+          <a:defRPr kumimoji="0" sz="1800" b="0" i="0" u="none" strike="noStrike" cap="none" spc="0" normalizeH="0" baseline="0">
             <a:ln>
               <a:noFill/>
             </a:ln>
@@ -8632,7 +8815,7 @@
           <a:buFontTx/>
           <a:buNone/>
           <a:tabLst/>
-          <a:defRPr b="0" baseline="0" cap="none" i="0" spc="0" strike="noStrike" sz="1800" u="none" kumimoji="0" normalizeH="0">
+          <a:defRPr kumimoji="0" sz="1800" b="0" i="0" u="none" strike="noStrike" cap="none" spc="0" normalizeH="0" baseline="0">
             <a:ln>
               <a:noFill/>
             </a:ln>
@@ -8658,7 +8841,7 @@
           <a:buFontTx/>
           <a:buNone/>
           <a:tabLst/>
-          <a:defRPr b="0" baseline="0" cap="none" i="0" spc="0" strike="noStrike" sz="1800" u="none" kumimoji="0" normalizeH="0">
+          <a:defRPr kumimoji="0" sz="1800" b="0" i="0" u="none" strike="noStrike" cap="none" spc="0" normalizeH="0" baseline="0">
             <a:ln>
               <a:noFill/>
             </a:ln>
@@ -8684,7 +8867,7 @@
           <a:buFontTx/>
           <a:buNone/>
           <a:tabLst/>
-          <a:defRPr b="0" baseline="0" cap="none" i="0" spc="0" strike="noStrike" sz="1800" u="none" kumimoji="0" normalizeH="0">
+          <a:defRPr kumimoji="0" sz="1800" b="0" i="0" u="none" strike="noStrike" cap="none" spc="0" normalizeH="0" baseline="0">
             <a:ln>
               <a:noFill/>
             </a:ln>
@@ -8710,7 +8893,7 @@
           <a:buFontTx/>
           <a:buNone/>
           <a:tabLst/>
-          <a:defRPr b="0" baseline="0" cap="none" i="0" spc="0" strike="noStrike" sz="1800" u="none" kumimoji="0" normalizeH="0">
+          <a:defRPr kumimoji="0" sz="1800" b="0" i="0" u="none" strike="noStrike" cap="none" spc="0" normalizeH="0" baseline="0">
             <a:ln>
               <a:noFill/>
             </a:ln>
@@ -8736,7 +8919,7 @@
           <a:buFontTx/>
           <a:buNone/>
           <a:tabLst/>
-          <a:defRPr b="0" baseline="0" cap="none" i="0" spc="0" strike="noStrike" sz="1800" u="none" kumimoji="0" normalizeH="0">
+          <a:defRPr kumimoji="0" sz="1800" b="0" i="0" u="none" strike="noStrike" cap="none" spc="0" normalizeH="0" baseline="0">
             <a:ln>
               <a:noFill/>
             </a:ln>
@@ -8749,9 +8932,15 @@
         </a:lvl9pPr>
       </a:lstStyle>
       <a:style>
-        <a:lnRef idx="0"/>
-        <a:fillRef idx="0"/>
-        <a:effectRef idx="0"/>
+        <a:lnRef idx="0">
+          <a:scrgbClr r="0" g="0" b="0"/>
+        </a:lnRef>
+        <a:fillRef idx="0">
+          <a:scrgbClr r="0" g="0" b="0"/>
+        </a:fillRef>
+        <a:effectRef idx="0">
+          <a:scrgbClr r="0" g="0" b="0"/>
+        </a:effectRef>
         <a:fontRef idx="none"/>
       </a:style>
     </a:lnDef>
@@ -8765,7 +8954,7 @@
         <a:effectLst/>
         <a:sp3d/>
       </a:spPr>
-      <a:bodyPr rot="0" spcFirstLastPara="1" vertOverflow="overflow" horzOverflow="overflow" vert="horz" wrap="square" lIns="50800" tIns="50800" rIns="50800" bIns="50800" numCol="1" spcCol="38100" rtlCol="0" anchor="ctr" upright="0">
+      <a:bodyPr rot="0" spcFirstLastPara="1" vertOverflow="overflow" horzOverflow="overflow" vert="horz" wrap="square" lIns="50800" tIns="50800" rIns="50800" bIns="50800" numCol="1" spcCol="38100" rtlCol="0" anchor="ctr">
         <a:spAutoFit/>
       </a:bodyPr>
       <a:lstStyle>
@@ -8784,7 +8973,7 @@
           <a:buFontTx/>
           <a:buNone/>
           <a:tabLst/>
-          <a:defRPr b="0" baseline="0" cap="none" i="0" spc="0" strike="noStrike" sz="2000" u="none" kumimoji="0" normalizeH="0">
+          <a:defRPr kumimoji="0" sz="2000" b="0" i="0" u="none" strike="noStrike" cap="none" spc="0" normalizeH="0" baseline="0">
             <a:ln>
               <a:noFill/>
             </a:ln>
@@ -8814,7 +9003,7 @@
           <a:buFontTx/>
           <a:buNone/>
           <a:tabLst/>
-          <a:defRPr b="0" baseline="0" cap="none" i="0" spc="0" strike="noStrike" sz="1800" u="none" kumimoji="0" normalizeH="0">
+          <a:defRPr kumimoji="0" sz="1800" b="0" i="0" u="none" strike="noStrike" cap="none" spc="0" normalizeH="0" baseline="0">
             <a:ln>
               <a:noFill/>
             </a:ln>
@@ -8840,7 +9029,7 @@
           <a:buFontTx/>
           <a:buNone/>
           <a:tabLst/>
-          <a:defRPr b="0" baseline="0" cap="none" i="0" spc="0" strike="noStrike" sz="1800" u="none" kumimoji="0" normalizeH="0">
+          <a:defRPr kumimoji="0" sz="1800" b="0" i="0" u="none" strike="noStrike" cap="none" spc="0" normalizeH="0" baseline="0">
             <a:ln>
               <a:noFill/>
             </a:ln>
@@ -8866,7 +9055,7 @@
           <a:buFontTx/>
           <a:buNone/>
           <a:tabLst/>
-          <a:defRPr b="0" baseline="0" cap="none" i="0" spc="0" strike="noStrike" sz="1800" u="none" kumimoji="0" normalizeH="0">
+          <a:defRPr kumimoji="0" sz="1800" b="0" i="0" u="none" strike="noStrike" cap="none" spc="0" normalizeH="0" baseline="0">
             <a:ln>
               <a:noFill/>
             </a:ln>
@@ -8892,7 +9081,7 @@
           <a:buFontTx/>
           <a:buNone/>
           <a:tabLst/>
-          <a:defRPr b="0" baseline="0" cap="none" i="0" spc="0" strike="noStrike" sz="1800" u="none" kumimoji="0" normalizeH="0">
+          <a:defRPr kumimoji="0" sz="1800" b="0" i="0" u="none" strike="noStrike" cap="none" spc="0" normalizeH="0" baseline="0">
             <a:ln>
               <a:noFill/>
             </a:ln>
@@ -8918,7 +9107,7 @@
           <a:buFontTx/>
           <a:buNone/>
           <a:tabLst/>
-          <a:defRPr b="0" baseline="0" cap="none" i="0" spc="0" strike="noStrike" sz="1800" u="none" kumimoji="0" normalizeH="0">
+          <a:defRPr kumimoji="0" sz="1800" b="0" i="0" u="none" strike="noStrike" cap="none" spc="0" normalizeH="0" baseline="0">
             <a:ln>
               <a:noFill/>
             </a:ln>
@@ -8944,7 +9133,7 @@
           <a:buFontTx/>
           <a:buNone/>
           <a:tabLst/>
-          <a:defRPr b="0" baseline="0" cap="none" i="0" spc="0" strike="noStrike" sz="1800" u="none" kumimoji="0" normalizeH="0">
+          <a:defRPr kumimoji="0" sz="1800" b="0" i="0" u="none" strike="noStrike" cap="none" spc="0" normalizeH="0" baseline="0">
             <a:ln>
               <a:noFill/>
             </a:ln>
@@ -8970,7 +9159,7 @@
           <a:buFontTx/>
           <a:buNone/>
           <a:tabLst/>
-          <a:defRPr b="0" baseline="0" cap="none" i="0" spc="0" strike="noStrike" sz="1800" u="none" kumimoji="0" normalizeH="0">
+          <a:defRPr kumimoji="0" sz="1800" b="0" i="0" u="none" strike="noStrike" cap="none" spc="0" normalizeH="0" baseline="0">
             <a:ln>
               <a:noFill/>
             </a:ln>
@@ -8996,7 +9185,7 @@
           <a:buFontTx/>
           <a:buNone/>
           <a:tabLst/>
-          <a:defRPr b="0" baseline="0" cap="none" i="0" spc="0" strike="noStrike" sz="1800" u="none" kumimoji="0" normalizeH="0">
+          <a:defRPr kumimoji="0" sz="1800" b="0" i="0" u="none" strike="noStrike" cap="none" spc="0" normalizeH="0" baseline="0">
             <a:ln>
               <a:noFill/>
             </a:ln>
@@ -9022,7 +9211,7 @@
           <a:buFontTx/>
           <a:buNone/>
           <a:tabLst/>
-          <a:defRPr b="0" baseline="0" cap="none" i="0" spc="0" strike="noStrike" sz="1800" u="none" kumimoji="0" normalizeH="0">
+          <a:defRPr kumimoji="0" sz="1800" b="0" i="0" u="none" strike="noStrike" cap="none" spc="0" normalizeH="0" baseline="0">
             <a:ln>
               <a:noFill/>
             </a:ln>
@@ -9035,18 +9224,25 @@
         </a:lvl9pPr>
       </a:lstStyle>
       <a:style>
-        <a:lnRef idx="0"/>
-        <a:fillRef idx="0"/>
-        <a:effectRef idx="0"/>
+        <a:lnRef idx="0">
+          <a:scrgbClr r="0" g="0" b="0"/>
+        </a:lnRef>
+        <a:fillRef idx="0">
+          <a:scrgbClr r="0" g="0" b="0"/>
+        </a:fillRef>
+        <a:effectRef idx="0">
+          <a:scrgbClr r="0" g="0" b="0"/>
+        </a:effectRef>
         <a:fontRef idx="none"/>
       </a:style>
     </a:txDef>
   </a:objectDefaults>
+  <a:extraClrSchemeLst/>
 </a:theme>
 </file>
 
 <file path=ppt/theme/theme2.xml><?xml version="1.0" encoding="utf-8"?>
-<a:theme xmlns:a="http://schemas.openxmlformats.org/drawingml/2006/main" xmlns:r="http://schemas.openxmlformats.org/officeDocument/2006/relationships" name="New_Template7">
+<a:theme xmlns:a="http://schemas.openxmlformats.org/drawingml/2006/main" name="New_Template7">
   <a:themeElements>
     <a:clrScheme name="New_Template7">
       <a:dk1>
@@ -9245,7 +9441,7 @@
         <a:effectLst/>
         <a:sp3d/>
       </a:spPr>
-      <a:bodyPr rot="0" spcFirstLastPara="1" vertOverflow="overflow" horzOverflow="overflow" vert="horz" wrap="square" lIns="50800" tIns="50800" rIns="50800" bIns="50800" numCol="1" spcCol="38100" rtlCol="0" anchor="ctr" upright="0">
+      <a:bodyPr rot="0" spcFirstLastPara="1" vertOverflow="overflow" horzOverflow="overflow" vert="horz" wrap="square" lIns="50800" tIns="50800" rIns="50800" bIns="50800" numCol="1" spcCol="38100" rtlCol="0" anchor="ctr">
         <a:spAutoFit/>
       </a:bodyPr>
       <a:lstStyle>
@@ -9264,7 +9460,7 @@
           <a:buFontTx/>
           <a:buNone/>
           <a:tabLst/>
-          <a:defRPr b="0" baseline="0" cap="all" i="0" spc="0" strike="noStrike" sz="2800" u="none" kumimoji="0" normalizeH="0">
+          <a:defRPr kumimoji="0" sz="2800" b="0" i="0" u="none" strike="noStrike" cap="all" spc="0" normalizeH="0" baseline="0">
             <a:ln>
               <a:noFill/>
             </a:ln>
@@ -9294,7 +9490,7 @@
           <a:buFontTx/>
           <a:buNone/>
           <a:tabLst/>
-          <a:defRPr b="0" baseline="0" cap="none" i="0" spc="0" strike="noStrike" sz="1800" u="none" kumimoji="0" normalizeH="0">
+          <a:defRPr kumimoji="0" sz="1800" b="0" i="0" u="none" strike="noStrike" cap="none" spc="0" normalizeH="0" baseline="0">
             <a:ln>
               <a:noFill/>
             </a:ln>
@@ -9320,7 +9516,7 @@
           <a:buFontTx/>
           <a:buNone/>
           <a:tabLst/>
-          <a:defRPr b="0" baseline="0" cap="none" i="0" spc="0" strike="noStrike" sz="1800" u="none" kumimoji="0" normalizeH="0">
+          <a:defRPr kumimoji="0" sz="1800" b="0" i="0" u="none" strike="noStrike" cap="none" spc="0" normalizeH="0" baseline="0">
             <a:ln>
               <a:noFill/>
             </a:ln>
@@ -9346,7 +9542,7 @@
           <a:buFontTx/>
           <a:buNone/>
           <a:tabLst/>
-          <a:defRPr b="0" baseline="0" cap="none" i="0" spc="0" strike="noStrike" sz="1800" u="none" kumimoji="0" normalizeH="0">
+          <a:defRPr kumimoji="0" sz="1800" b="0" i="0" u="none" strike="noStrike" cap="none" spc="0" normalizeH="0" baseline="0">
             <a:ln>
               <a:noFill/>
             </a:ln>
@@ -9372,7 +9568,7 @@
           <a:buFontTx/>
           <a:buNone/>
           <a:tabLst/>
-          <a:defRPr b="0" baseline="0" cap="none" i="0" spc="0" strike="noStrike" sz="1800" u="none" kumimoji="0" normalizeH="0">
+          <a:defRPr kumimoji="0" sz="1800" b="0" i="0" u="none" strike="noStrike" cap="none" spc="0" normalizeH="0" baseline="0">
             <a:ln>
               <a:noFill/>
             </a:ln>
@@ -9398,7 +9594,7 @@
           <a:buFontTx/>
           <a:buNone/>
           <a:tabLst/>
-          <a:defRPr b="0" baseline="0" cap="none" i="0" spc="0" strike="noStrike" sz="1800" u="none" kumimoji="0" normalizeH="0">
+          <a:defRPr kumimoji="0" sz="1800" b="0" i="0" u="none" strike="noStrike" cap="none" spc="0" normalizeH="0" baseline="0">
             <a:ln>
               <a:noFill/>
             </a:ln>
@@ -9424,7 +9620,7 @@
           <a:buFontTx/>
           <a:buNone/>
           <a:tabLst/>
-          <a:defRPr b="0" baseline="0" cap="none" i="0" spc="0" strike="noStrike" sz="1800" u="none" kumimoji="0" normalizeH="0">
+          <a:defRPr kumimoji="0" sz="1800" b="0" i="0" u="none" strike="noStrike" cap="none" spc="0" normalizeH="0" baseline="0">
             <a:ln>
               <a:noFill/>
             </a:ln>
@@ -9450,7 +9646,7 @@
           <a:buFontTx/>
           <a:buNone/>
           <a:tabLst/>
-          <a:defRPr b="0" baseline="0" cap="none" i="0" spc="0" strike="noStrike" sz="1800" u="none" kumimoji="0" normalizeH="0">
+          <a:defRPr kumimoji="0" sz="1800" b="0" i="0" u="none" strike="noStrike" cap="none" spc="0" normalizeH="0" baseline="0">
             <a:ln>
               <a:noFill/>
             </a:ln>
@@ -9476,7 +9672,7 @@
           <a:buFontTx/>
           <a:buNone/>
           <a:tabLst/>
-          <a:defRPr b="0" baseline="0" cap="none" i="0" spc="0" strike="noStrike" sz="1800" u="none" kumimoji="0" normalizeH="0">
+          <a:defRPr kumimoji="0" sz="1800" b="0" i="0" u="none" strike="noStrike" cap="none" spc="0" normalizeH="0" baseline="0">
             <a:ln>
               <a:noFill/>
             </a:ln>
@@ -9502,7 +9698,7 @@
           <a:buFontTx/>
           <a:buNone/>
           <a:tabLst/>
-          <a:defRPr b="0" baseline="0" cap="none" i="0" spc="0" strike="noStrike" sz="1800" u="none" kumimoji="0" normalizeH="0">
+          <a:defRPr kumimoji="0" sz="1800" b="0" i="0" u="none" strike="noStrike" cap="none" spc="0" normalizeH="0" baseline="0">
             <a:ln>
               <a:noFill/>
             </a:ln>
@@ -9515,9 +9711,15 @@
         </a:lvl9pPr>
       </a:lstStyle>
       <a:style>
-        <a:lnRef idx="0"/>
-        <a:fillRef idx="0"/>
-        <a:effectRef idx="0"/>
+        <a:lnRef idx="0">
+          <a:scrgbClr r="0" g="0" b="0"/>
+        </a:lnRef>
+        <a:fillRef idx="0">
+          <a:scrgbClr r="0" g="0" b="0"/>
+        </a:fillRef>
+        <a:effectRef idx="0">
+          <a:scrgbClr r="0" g="0" b="0"/>
+        </a:effectRef>
         <a:fontRef idx="none"/>
       </a:style>
     </a:spDef>
@@ -9534,7 +9736,7 @@
         <a:effectLst/>
         <a:sp3d/>
       </a:spPr>
-      <a:bodyPr rot="0" spcFirstLastPara="1" vertOverflow="overflow" horzOverflow="overflow" vert="horz" wrap="square" lIns="91439" tIns="45719" rIns="91439" bIns="45719" numCol="1" spcCol="38100" rtlCol="0" anchor="t" upright="0">
+      <a:bodyPr rot="0" spcFirstLastPara="1" vertOverflow="overflow" horzOverflow="overflow" vert="horz" wrap="square" lIns="91439" tIns="45719" rIns="91439" bIns="45719" numCol="1" spcCol="38100" rtlCol="0" anchor="t">
         <a:noAutofit/>
       </a:bodyPr>
       <a:lstStyle>
@@ -9553,7 +9755,7 @@
           <a:buFontTx/>
           <a:buNone/>
           <a:tabLst/>
-          <a:defRPr b="0" baseline="0" cap="none" i="0" spc="0" strike="noStrike" sz="1800" u="none" kumimoji="0" normalizeH="0">
+          <a:defRPr kumimoji="0" sz="1800" b="0" i="0" u="none" strike="noStrike" cap="none" spc="0" normalizeH="0" baseline="0">
             <a:ln>
               <a:noFill/>
             </a:ln>
@@ -9579,7 +9781,7 @@
           <a:buFontTx/>
           <a:buNone/>
           <a:tabLst/>
-          <a:defRPr b="0" baseline="0" cap="none" i="0" spc="0" strike="noStrike" sz="1800" u="none" kumimoji="0" normalizeH="0">
+          <a:defRPr kumimoji="0" sz="1800" b="0" i="0" u="none" strike="noStrike" cap="none" spc="0" normalizeH="0" baseline="0">
             <a:ln>
               <a:noFill/>
             </a:ln>
@@ -9605,7 +9807,7 @@
           <a:buFontTx/>
           <a:buNone/>
           <a:tabLst/>
-          <a:defRPr b="0" baseline="0" cap="none" i="0" spc="0" strike="noStrike" sz="1800" u="none" kumimoji="0" normalizeH="0">
+          <a:defRPr kumimoji="0" sz="1800" b="0" i="0" u="none" strike="noStrike" cap="none" spc="0" normalizeH="0" baseline="0">
             <a:ln>
               <a:noFill/>
             </a:ln>
@@ -9631,7 +9833,7 @@
           <a:buFontTx/>
           <a:buNone/>
           <a:tabLst/>
-          <a:defRPr b="0" baseline="0" cap="none" i="0" spc="0" strike="noStrike" sz="1800" u="none" kumimoji="0" normalizeH="0">
+          <a:defRPr kumimoji="0" sz="1800" b="0" i="0" u="none" strike="noStrike" cap="none" spc="0" normalizeH="0" baseline="0">
             <a:ln>
               <a:noFill/>
             </a:ln>
@@ -9657,7 +9859,7 @@
           <a:buFontTx/>
           <a:buNone/>
           <a:tabLst/>
-          <a:defRPr b="0" baseline="0" cap="none" i="0" spc="0" strike="noStrike" sz="1800" u="none" kumimoji="0" normalizeH="0">
+          <a:defRPr kumimoji="0" sz="1800" b="0" i="0" u="none" strike="noStrike" cap="none" spc="0" normalizeH="0" baseline="0">
             <a:ln>
               <a:noFill/>
             </a:ln>
@@ -9683,7 +9885,7 @@
           <a:buFontTx/>
           <a:buNone/>
           <a:tabLst/>
-          <a:defRPr b="0" baseline="0" cap="none" i="0" spc="0" strike="noStrike" sz="1800" u="none" kumimoji="0" normalizeH="0">
+          <a:defRPr kumimoji="0" sz="1800" b="0" i="0" u="none" strike="noStrike" cap="none" spc="0" normalizeH="0" baseline="0">
             <a:ln>
               <a:noFill/>
             </a:ln>
@@ -9709,7 +9911,7 @@
           <a:buFontTx/>
           <a:buNone/>
           <a:tabLst/>
-          <a:defRPr b="0" baseline="0" cap="none" i="0" spc="0" strike="noStrike" sz="1800" u="none" kumimoji="0" normalizeH="0">
+          <a:defRPr kumimoji="0" sz="1800" b="0" i="0" u="none" strike="noStrike" cap="none" spc="0" normalizeH="0" baseline="0">
             <a:ln>
               <a:noFill/>
             </a:ln>
@@ -9735,7 +9937,7 @@
           <a:buFontTx/>
           <a:buNone/>
           <a:tabLst/>
-          <a:defRPr b="0" baseline="0" cap="none" i="0" spc="0" strike="noStrike" sz="1800" u="none" kumimoji="0" normalizeH="0">
+          <a:defRPr kumimoji="0" sz="1800" b="0" i="0" u="none" strike="noStrike" cap="none" spc="0" normalizeH="0" baseline="0">
             <a:ln>
               <a:noFill/>
             </a:ln>
@@ -9761,7 +9963,7 @@
           <a:buFontTx/>
           <a:buNone/>
           <a:tabLst/>
-          <a:defRPr b="0" baseline="0" cap="none" i="0" spc="0" strike="noStrike" sz="1800" u="none" kumimoji="0" normalizeH="0">
+          <a:defRPr kumimoji="0" sz="1800" b="0" i="0" u="none" strike="noStrike" cap="none" spc="0" normalizeH="0" baseline="0">
             <a:ln>
               <a:noFill/>
             </a:ln>
@@ -9787,7 +9989,7 @@
           <a:buFontTx/>
           <a:buNone/>
           <a:tabLst/>
-          <a:defRPr b="0" baseline="0" cap="none" i="0" spc="0" strike="noStrike" sz="1800" u="none" kumimoji="0" normalizeH="0">
+          <a:defRPr kumimoji="0" sz="1800" b="0" i="0" u="none" strike="noStrike" cap="none" spc="0" normalizeH="0" baseline="0">
             <a:ln>
               <a:noFill/>
             </a:ln>
@@ -9800,9 +10002,15 @@
         </a:lvl9pPr>
       </a:lstStyle>
       <a:style>
-        <a:lnRef idx="0"/>
-        <a:fillRef idx="0"/>
-        <a:effectRef idx="0"/>
+        <a:lnRef idx="0">
+          <a:scrgbClr r="0" g="0" b="0"/>
+        </a:lnRef>
+        <a:fillRef idx="0">
+          <a:scrgbClr r="0" g="0" b="0"/>
+        </a:fillRef>
+        <a:effectRef idx="0">
+          <a:scrgbClr r="0" g="0" b="0"/>
+        </a:effectRef>
         <a:fontRef idx="none"/>
       </a:style>
     </a:lnDef>
@@ -9816,7 +10024,7 @@
         <a:effectLst/>
         <a:sp3d/>
       </a:spPr>
-      <a:bodyPr rot="0" spcFirstLastPara="1" vertOverflow="overflow" horzOverflow="overflow" vert="horz" wrap="square" lIns="50800" tIns="50800" rIns="50800" bIns="50800" numCol="1" spcCol="38100" rtlCol="0" anchor="ctr" upright="0">
+      <a:bodyPr rot="0" spcFirstLastPara="1" vertOverflow="overflow" horzOverflow="overflow" vert="horz" wrap="square" lIns="50800" tIns="50800" rIns="50800" bIns="50800" numCol="1" spcCol="38100" rtlCol="0" anchor="ctr">
         <a:spAutoFit/>
       </a:bodyPr>
       <a:lstStyle>
@@ -9835,7 +10043,7 @@
           <a:buFontTx/>
           <a:buNone/>
           <a:tabLst/>
-          <a:defRPr b="0" baseline="0" cap="none" i="0" spc="0" strike="noStrike" sz="2000" u="none" kumimoji="0" normalizeH="0">
+          <a:defRPr kumimoji="0" sz="2000" b="0" i="0" u="none" strike="noStrike" cap="none" spc="0" normalizeH="0" baseline="0">
             <a:ln>
               <a:noFill/>
             </a:ln>
@@ -9865,7 +10073,7 @@
           <a:buFontTx/>
           <a:buNone/>
           <a:tabLst/>
-          <a:defRPr b="0" baseline="0" cap="none" i="0" spc="0" strike="noStrike" sz="1800" u="none" kumimoji="0" normalizeH="0">
+          <a:defRPr kumimoji="0" sz="1800" b="0" i="0" u="none" strike="noStrike" cap="none" spc="0" normalizeH="0" baseline="0">
             <a:ln>
               <a:noFill/>
             </a:ln>
@@ -9891,7 +10099,7 @@
           <a:buFontTx/>
           <a:buNone/>
           <a:tabLst/>
-          <a:defRPr b="0" baseline="0" cap="none" i="0" spc="0" strike="noStrike" sz="1800" u="none" kumimoji="0" normalizeH="0">
+          <a:defRPr kumimoji="0" sz="1800" b="0" i="0" u="none" strike="noStrike" cap="none" spc="0" normalizeH="0" baseline="0">
             <a:ln>
               <a:noFill/>
             </a:ln>
@@ -9917,7 +10125,7 @@
           <a:buFontTx/>
           <a:buNone/>
           <a:tabLst/>
-          <a:defRPr b="0" baseline="0" cap="none" i="0" spc="0" strike="noStrike" sz="1800" u="none" kumimoji="0" normalizeH="0">
+          <a:defRPr kumimoji="0" sz="1800" b="0" i="0" u="none" strike="noStrike" cap="none" spc="0" normalizeH="0" baseline="0">
             <a:ln>
               <a:noFill/>
             </a:ln>
@@ -9943,7 +10151,7 @@
           <a:buFontTx/>
           <a:buNone/>
           <a:tabLst/>
-          <a:defRPr b="0" baseline="0" cap="none" i="0" spc="0" strike="noStrike" sz="1800" u="none" kumimoji="0" normalizeH="0">
+          <a:defRPr kumimoji="0" sz="1800" b="0" i="0" u="none" strike="noStrike" cap="none" spc="0" normalizeH="0" baseline="0">
             <a:ln>
               <a:noFill/>
             </a:ln>
@@ -9969,7 +10177,7 @@
           <a:buFontTx/>
           <a:buNone/>
           <a:tabLst/>
-          <a:defRPr b="0" baseline="0" cap="none" i="0" spc="0" strike="noStrike" sz="1800" u="none" kumimoji="0" normalizeH="0">
+          <a:defRPr kumimoji="0" sz="1800" b="0" i="0" u="none" strike="noStrike" cap="none" spc="0" normalizeH="0" baseline="0">
             <a:ln>
               <a:noFill/>
             </a:ln>
@@ -9995,7 +10203,7 @@
           <a:buFontTx/>
           <a:buNone/>
           <a:tabLst/>
-          <a:defRPr b="0" baseline="0" cap="none" i="0" spc="0" strike="noStrike" sz="1800" u="none" kumimoji="0" normalizeH="0">
+          <a:defRPr kumimoji="0" sz="1800" b="0" i="0" u="none" strike="noStrike" cap="none" spc="0" normalizeH="0" baseline="0">
             <a:ln>
               <a:noFill/>
             </a:ln>
@@ -10021,7 +10229,7 @@
           <a:buFontTx/>
           <a:buNone/>
           <a:tabLst/>
-          <a:defRPr b="0" baseline="0" cap="none" i="0" spc="0" strike="noStrike" sz="1800" u="none" kumimoji="0" normalizeH="0">
+          <a:defRPr kumimoji="0" sz="1800" b="0" i="0" u="none" strike="noStrike" cap="none" spc="0" normalizeH="0" baseline="0">
             <a:ln>
               <a:noFill/>
             </a:ln>
@@ -10047,7 +10255,7 @@
           <a:buFontTx/>
           <a:buNone/>
           <a:tabLst/>
-          <a:defRPr b="0" baseline="0" cap="none" i="0" spc="0" strike="noStrike" sz="1800" u="none" kumimoji="0" normalizeH="0">
+          <a:defRPr kumimoji="0" sz="1800" b="0" i="0" u="none" strike="noStrike" cap="none" spc="0" normalizeH="0" baseline="0">
             <a:ln>
               <a:noFill/>
             </a:ln>
@@ -10073,7 +10281,7 @@
           <a:buFontTx/>
           <a:buNone/>
           <a:tabLst/>
-          <a:defRPr b="0" baseline="0" cap="none" i="0" spc="0" strike="noStrike" sz="1800" u="none" kumimoji="0" normalizeH="0">
+          <a:defRPr kumimoji="0" sz="1800" b="0" i="0" u="none" strike="noStrike" cap="none" spc="0" normalizeH="0" baseline="0">
             <a:ln>
               <a:noFill/>
             </a:ln>
@@ -10086,12 +10294,19 @@
         </a:lvl9pPr>
       </a:lstStyle>
       <a:style>
-        <a:lnRef idx="0"/>
-        <a:fillRef idx="0"/>
-        <a:effectRef idx="0"/>
+        <a:lnRef idx="0">
+          <a:scrgbClr r="0" g="0" b="0"/>
+        </a:lnRef>
+        <a:fillRef idx="0">
+          <a:scrgbClr r="0" g="0" b="0"/>
+        </a:fillRef>
+        <a:effectRef idx="0">
+          <a:scrgbClr r="0" g="0" b="0"/>
+        </a:effectRef>
         <a:fontRef idx="none"/>
       </a:style>
     </a:txDef>
   </a:objectDefaults>
+  <a:extraClrSchemeLst/>
 </a:theme>
 </file>
</xml_diff>